<commit_message>
Preprocessing done - Not reviewed
The preprocessing section is done, it is waiting for the advisor's
review.
</commit_message>
<xml_diff>
--- a/ThesisProposal.pptx
+++ b/ThesisProposal.pptx
@@ -1406,6 +1406,43 @@
         </a:p>
       </dgm:t>
     </dgm:pt>
+    <dgm:pt modelId="{D5636B8A-B2CE-417B-831B-DF647402726D}">
+      <dgm:prSet phldrT="[Texto]" custT="1"/>
+      <dgm:spPr/>
+      <dgm:t>
+        <a:bodyPr/>
+        <a:lstStyle/>
+        <a:p>
+          <a:r>
+            <a:rPr lang="en-US" sz="1400" dirty="0" smtClean="0"/>
+            <a:t>Hole filling</a:t>
+          </a:r>
+          <a:endParaRPr lang="en-US" sz="1400" dirty="0"/>
+        </a:p>
+      </dgm:t>
+    </dgm:pt>
+    <dgm:pt modelId="{30984AA9-ED08-4AC5-88D7-55001CB22FDD}" type="parTrans" cxnId="{BAC2F440-D669-4180-865B-040A56D03D19}">
+      <dgm:prSet/>
+      <dgm:spPr/>
+      <dgm:t>
+        <a:bodyPr/>
+        <a:lstStyle/>
+        <a:p>
+          <a:endParaRPr lang="en-US"/>
+        </a:p>
+      </dgm:t>
+    </dgm:pt>
+    <dgm:pt modelId="{37445CD6-6704-4F5A-8641-7CFF5D5790F0}" type="sibTrans" cxnId="{BAC2F440-D669-4180-865B-040A56D03D19}">
+      <dgm:prSet/>
+      <dgm:spPr/>
+      <dgm:t>
+        <a:bodyPr/>
+        <a:lstStyle/>
+        <a:p>
+          <a:endParaRPr lang="en-US"/>
+        </a:p>
+      </dgm:t>
+    </dgm:pt>
     <dgm:pt modelId="{1ADE8E3F-9560-48FC-B9D4-A2A22CC78FC4}" type="pres">
       <dgm:prSet presAssocID="{8926B527-CEC9-406E-B07A-117375327321}" presName="rootnode" presStyleCnt="0">
         <dgm:presLayoutVars>
@@ -1615,9 +1652,9 @@
     <dgm:cxn modelId="{74234F59-0FBD-450E-95F4-6BCA562C66EE}" type="presOf" srcId="{20635D92-A7E6-42FF-A69D-845E61FAD6B0}" destId="{93356A06-D76C-4384-9F2C-5C2F152098A1}" srcOrd="0" destOrd="0" presId="urn:microsoft.com/office/officeart/2005/8/layout/StepDownProcess"/>
     <dgm:cxn modelId="{D1734D50-95F0-4772-AE4E-EC41E5265640}" type="presOf" srcId="{814E853B-4A87-4A8A-9A7F-CDC26721EFE8}" destId="{FC5751CB-FE42-4651-8933-7A7CC30B3865}" srcOrd="0" destOrd="3" presId="urn:microsoft.com/office/officeart/2005/8/layout/StepDownProcess"/>
     <dgm:cxn modelId="{36FDDFFE-C642-4169-A8D4-523F83FBEFCC}" type="presOf" srcId="{5460DD9B-F6BD-4AFC-A266-DE538CF183D7}" destId="{B10D8F44-7CD1-463F-B8DE-A0A1D3101362}" srcOrd="0" destOrd="0" presId="urn:microsoft.com/office/officeart/2005/8/layout/StepDownProcess"/>
-    <dgm:cxn modelId="{BC108C1C-A130-46D3-A724-C61E96A567CC}" srcId="{20635D92-A7E6-42FF-A69D-845E61FAD6B0}" destId="{ED1983E4-5370-4584-A9A8-58C4DC27F7B4}" srcOrd="0" destOrd="0" parTransId="{3808BC1D-A5F7-4522-8B27-3CEC0F070745}" sibTransId="{11B8A425-519C-40FF-AD4E-786A6A863471}"/>
+    <dgm:cxn modelId="{BC108C1C-A130-46D3-A724-C61E96A567CC}" srcId="{20635D92-A7E6-42FF-A69D-845E61FAD6B0}" destId="{ED1983E4-5370-4584-A9A8-58C4DC27F7B4}" srcOrd="1" destOrd="0" parTransId="{3808BC1D-A5F7-4522-8B27-3CEC0F070745}" sibTransId="{11B8A425-519C-40FF-AD4E-786A6A863471}"/>
     <dgm:cxn modelId="{42C2A5F3-BEEE-4998-BAAF-B0122E89C395}" srcId="{8926B527-CEC9-406E-B07A-117375327321}" destId="{5460DD9B-F6BD-4AFC-A266-DE538CF183D7}" srcOrd="0" destOrd="0" parTransId="{A4AD501E-4A44-463E-B895-EB8350427CD8}" sibTransId="{5BD7FCFF-4680-4DFD-BD09-2D28FEC04173}"/>
-    <dgm:cxn modelId="{976A6CE8-2777-45F6-81E7-DAF8835C4314}" type="presOf" srcId="{107C4D31-BE66-4025-8AB3-B45B08425CF1}" destId="{7105A76C-D0A3-4EC3-AC13-A5A8D4365BE4}" srcOrd="0" destOrd="1" presId="urn:microsoft.com/office/officeart/2005/8/layout/StepDownProcess"/>
+    <dgm:cxn modelId="{976A6CE8-2777-45F6-81E7-DAF8835C4314}" type="presOf" srcId="{107C4D31-BE66-4025-8AB3-B45B08425CF1}" destId="{7105A76C-D0A3-4EC3-AC13-A5A8D4365BE4}" srcOrd="0" destOrd="2" presId="urn:microsoft.com/office/officeart/2005/8/layout/StepDownProcess"/>
     <dgm:cxn modelId="{E448ADAF-83FC-4398-94D3-651D5BD35942}" type="presOf" srcId="{D294F512-11CD-4FBC-AF66-3082548BC7E6}" destId="{110872B9-258E-4C73-85A1-643C30A727EF}" srcOrd="0" destOrd="0" presId="urn:microsoft.com/office/officeart/2005/8/layout/StepDownProcess"/>
     <dgm:cxn modelId="{C27FB73D-DF4E-43D9-93BE-9B85612DACEA}" srcId="{5460DD9B-F6BD-4AFC-A266-DE538CF183D7}" destId="{D294F512-11CD-4FBC-AF66-3082548BC7E6}" srcOrd="0" destOrd="0" parTransId="{76BBB533-3E4D-43E7-8DF5-755F1B76FE68}" sibTransId="{421BE465-B086-44FB-B104-9703ADC6109B}"/>
     <dgm:cxn modelId="{D9EFBFB7-3BF0-4FD3-8AF5-5B5E21801EC8}" srcId="{2AF14A38-EBB8-4A29-8FB9-36C926A015D3}" destId="{C14562D0-284D-4440-A8B2-5AF3E9133240}" srcOrd="2" destOrd="0" parTransId="{21D71D77-472E-44DA-96CA-A2A796F84A1B}" sibTransId="{033D6873-94D1-4DA9-A7FE-13EE91EA9F16}"/>
@@ -1627,8 +1664,10 @@
     <dgm:cxn modelId="{A5A9116A-EAD9-4ADD-990C-382F42B92D37}" type="presOf" srcId="{3F10FAB3-990C-4D5A-942C-BA6A1F5BE04D}" destId="{BCDFEA53-6FB2-4975-9B6E-AC0008783243}" srcOrd="0" destOrd="0" presId="urn:microsoft.com/office/officeart/2005/8/layout/StepDownProcess"/>
     <dgm:cxn modelId="{A61F2900-D345-4019-8695-E94C30464651}" type="presOf" srcId="{89E9BDC2-40C9-46F3-9D14-5C92AC5F462B}" destId="{FC5751CB-FE42-4651-8933-7A7CC30B3865}" srcOrd="0" destOrd="1" presId="urn:microsoft.com/office/officeart/2005/8/layout/StepDownProcess"/>
     <dgm:cxn modelId="{D0F61B97-7F49-4FA8-9553-EEF2D2A17FB4}" srcId="{2AF14A38-EBB8-4A29-8FB9-36C926A015D3}" destId="{89E9BDC2-40C9-46F3-9D14-5C92AC5F462B}" srcOrd="1" destOrd="0" parTransId="{658CCB6D-C2F6-4199-B652-AA3644FC84EE}" sibTransId="{796569E6-6040-408D-8339-C6B1C1B9B2A2}"/>
-    <dgm:cxn modelId="{A9E82381-1CE4-440C-80B0-7ECE794DAB6C}" srcId="{20635D92-A7E6-42FF-A69D-845E61FAD6B0}" destId="{107C4D31-BE66-4025-8AB3-B45B08425CF1}" srcOrd="1" destOrd="0" parTransId="{780E9A3F-9FF3-4145-9585-31C2F5DDAC5A}" sibTransId="{8D13BF4A-9E68-4F29-9BBB-CEC393AE03C6}"/>
-    <dgm:cxn modelId="{095F5C3A-59B9-48A2-AAF6-0F8640D04D33}" type="presOf" srcId="{ED1983E4-5370-4584-A9A8-58C4DC27F7B4}" destId="{7105A76C-D0A3-4EC3-AC13-A5A8D4365BE4}" srcOrd="0" destOrd="0" presId="urn:microsoft.com/office/officeart/2005/8/layout/StepDownProcess"/>
+    <dgm:cxn modelId="{BAC2F440-D669-4180-865B-040A56D03D19}" srcId="{20635D92-A7E6-42FF-A69D-845E61FAD6B0}" destId="{D5636B8A-B2CE-417B-831B-DF647402726D}" srcOrd="0" destOrd="0" parTransId="{30984AA9-ED08-4AC5-88D7-55001CB22FDD}" sibTransId="{37445CD6-6704-4F5A-8641-7CFF5D5790F0}"/>
+    <dgm:cxn modelId="{A9E82381-1CE4-440C-80B0-7ECE794DAB6C}" srcId="{20635D92-A7E6-42FF-A69D-845E61FAD6B0}" destId="{107C4D31-BE66-4025-8AB3-B45B08425CF1}" srcOrd="2" destOrd="0" parTransId="{780E9A3F-9FF3-4145-9585-31C2F5DDAC5A}" sibTransId="{8D13BF4A-9E68-4F29-9BBB-CEC393AE03C6}"/>
+    <dgm:cxn modelId="{5C716846-F9AB-44FF-B767-9789C7216D3E}" type="presOf" srcId="{D5636B8A-B2CE-417B-831B-DF647402726D}" destId="{7105A76C-D0A3-4EC3-AC13-A5A8D4365BE4}" srcOrd="0" destOrd="0" presId="urn:microsoft.com/office/officeart/2005/8/layout/StepDownProcess"/>
+    <dgm:cxn modelId="{095F5C3A-59B9-48A2-AAF6-0F8640D04D33}" type="presOf" srcId="{ED1983E4-5370-4584-A9A8-58C4DC27F7B4}" destId="{7105A76C-D0A3-4EC3-AC13-A5A8D4365BE4}" srcOrd="0" destOrd="1" presId="urn:microsoft.com/office/officeart/2005/8/layout/StepDownProcess"/>
     <dgm:cxn modelId="{8B8A1FC5-2ED5-4E3B-BBA0-E1F4ACF4542E}" type="presOf" srcId="{8926B527-CEC9-406E-B07A-117375327321}" destId="{1ADE8E3F-9560-48FC-B9D4-A2A22CC78FC4}" srcOrd="0" destOrd="0" presId="urn:microsoft.com/office/officeart/2005/8/layout/StepDownProcess"/>
     <dgm:cxn modelId="{63B9541A-3D0A-4F89-8574-02F6B650CA63}" type="presOf" srcId="{C14562D0-284D-4440-A8B2-5AF3E9133240}" destId="{FC5751CB-FE42-4651-8933-7A7CC30B3865}" srcOrd="0" destOrd="2" presId="urn:microsoft.com/office/officeart/2005/8/layout/StepDownProcess"/>
     <dgm:cxn modelId="{ABC98996-BCBF-4A64-AFBA-99B9726B1167}" type="presParOf" srcId="{1ADE8E3F-9560-48FC-B9D4-A2A22CC78FC4}" destId="{8CD25852-9028-4B04-8470-5F3383965500}" srcOrd="0" destOrd="0" presId="urn:microsoft.com/office/officeart/2005/8/layout/StepDownProcess"/>
@@ -2027,6 +2066,25 @@
           <a:noAutofit/>
         </a:bodyPr>
         <a:lstStyle/>
+        <a:p>
+          <a:pPr marL="114300" lvl="1" indent="-114300" algn="l" defTabSz="622300">
+            <a:lnSpc>
+              <a:spcPct val="90000"/>
+            </a:lnSpc>
+            <a:spcBef>
+              <a:spcPct val="0"/>
+            </a:spcBef>
+            <a:spcAft>
+              <a:spcPct val="15000"/>
+            </a:spcAft>
+            <a:buChar char="••"/>
+          </a:pPr>
+          <a:r>
+            <a:rPr lang="en-US" sz="1400" kern="1200" dirty="0" smtClean="0"/>
+            <a:t>Hole filling</a:t>
+          </a:r>
+          <a:endParaRPr lang="en-US" sz="1400" kern="1200" dirty="0"/>
+        </a:p>
         <a:p>
           <a:pPr marL="114300" lvl="1" indent="-114300" algn="l" defTabSz="622300">
             <a:lnSpc>
@@ -4047,7 +4105,7 @@
             <a:fld id="{B61BEF0D-F0BB-DE4B-95CE-6DB70DBA9567}" type="datetimeFigureOut">
               <a:rPr lang="en-US" dirty="0"/>
               <a:pPr/>
-              <a:t>8/30/2016</a:t>
+              <a:t>9/2/2016</a:t>
             </a:fld>
             <a:endParaRPr lang="en-US" dirty="0"/>
           </a:p>
@@ -4382,7 +4440,7 @@
             <a:fld id="{B61BEF0D-F0BB-DE4B-95CE-6DB70DBA9567}" type="datetimeFigureOut">
               <a:rPr lang="en-US" dirty="0"/>
               <a:pPr/>
-              <a:t>8/30/2016</a:t>
+              <a:t>9/2/2016</a:t>
             </a:fld>
             <a:endParaRPr lang="en-US" dirty="0"/>
           </a:p>
@@ -4780,7 +4838,7 @@
             <a:fld id="{B61BEF0D-F0BB-DE4B-95CE-6DB70DBA9567}" type="datetimeFigureOut">
               <a:rPr lang="en-US" dirty="0"/>
               <a:pPr/>
-              <a:t>8/30/2016</a:t>
+              <a:t>9/2/2016</a:t>
             </a:fld>
             <a:endParaRPr lang="en-US" dirty="0"/>
           </a:p>
@@ -5112,7 +5170,7 @@
             <a:fld id="{B61BEF0D-F0BB-DE4B-95CE-6DB70DBA9567}" type="datetimeFigureOut">
               <a:rPr lang="en-US" dirty="0"/>
               <a:pPr/>
-              <a:t>8/30/2016</a:t>
+              <a:t>9/2/2016</a:t>
             </a:fld>
             <a:endParaRPr lang="en-US" dirty="0"/>
           </a:p>
@@ -5429,7 +5487,7 @@
             <a:fld id="{B61BEF0D-F0BB-DE4B-95CE-6DB70DBA9567}" type="datetimeFigureOut">
               <a:rPr lang="en-US" dirty="0"/>
               <a:pPr/>
-              <a:t>8/30/2016</a:t>
+              <a:t>9/2/2016</a:t>
             </a:fld>
             <a:endParaRPr lang="en-US" dirty="0"/>
           </a:p>
@@ -5822,7 +5880,7 @@
             <a:fld id="{B61BEF0D-F0BB-DE4B-95CE-6DB70DBA9567}" type="datetimeFigureOut">
               <a:rPr lang="en-US" dirty="0"/>
               <a:pPr/>
-              <a:t>8/30/2016</a:t>
+              <a:t>9/2/2016</a:t>
             </a:fld>
             <a:endParaRPr lang="en-US" dirty="0"/>
           </a:p>
@@ -6076,7 +6134,7 @@
             <a:fld id="{B61BEF0D-F0BB-DE4B-95CE-6DB70DBA9567}" type="datetimeFigureOut">
               <a:rPr lang="en-US" dirty="0"/>
               <a:pPr/>
-              <a:t>8/30/2016</a:t>
+              <a:t>9/2/2016</a:t>
             </a:fld>
             <a:endParaRPr lang="en-US" dirty="0"/>
           </a:p>
@@ -6335,7 +6393,7 @@
             <a:fld id="{B61BEF0D-F0BB-DE4B-95CE-6DB70DBA9567}" type="datetimeFigureOut">
               <a:rPr lang="en-US" dirty="0"/>
               <a:pPr/>
-              <a:t>8/30/2016</a:t>
+              <a:t>9/2/2016</a:t>
             </a:fld>
             <a:endParaRPr lang="en-US" dirty="0"/>
           </a:p>
@@ -6594,7 +6652,7 @@
             <a:fld id="{B61BEF0D-F0BB-DE4B-95CE-6DB70DBA9567}" type="datetimeFigureOut">
               <a:rPr lang="en-US" dirty="0"/>
               <a:pPr/>
-              <a:t>8/30/2016</a:t>
+              <a:t>9/2/2016</a:t>
             </a:fld>
             <a:endParaRPr lang="en-US" dirty="0"/>
           </a:p>
@@ -6920,7 +6978,7 @@
             <a:fld id="{B61BEF0D-F0BB-DE4B-95CE-6DB70DBA9567}" type="datetimeFigureOut">
               <a:rPr lang="en-US" dirty="0"/>
               <a:pPr/>
-              <a:t>8/30/2016</a:t>
+              <a:t>9/2/2016</a:t>
             </a:fld>
             <a:endParaRPr lang="en-US" dirty="0"/>
           </a:p>
@@ -7240,7 +7298,7 @@
             <a:fld id="{B61BEF0D-F0BB-DE4B-95CE-6DB70DBA9567}" type="datetimeFigureOut">
               <a:rPr lang="en-US" dirty="0"/>
               <a:pPr/>
-              <a:t>8/30/2016</a:t>
+              <a:t>9/2/2016</a:t>
             </a:fld>
             <a:endParaRPr lang="en-US" dirty="0"/>
           </a:p>
@@ -7694,7 +7752,7 @@
             <a:fld id="{B61BEF0D-F0BB-DE4B-95CE-6DB70DBA9567}" type="datetimeFigureOut">
               <a:rPr lang="en-US" dirty="0"/>
               <a:pPr/>
-              <a:t>8/30/2016</a:t>
+              <a:t>9/2/2016</a:t>
             </a:fld>
             <a:endParaRPr lang="en-US" dirty="0"/>
           </a:p>
@@ -7896,7 +7954,7 @@
             <a:fld id="{B61BEF0D-F0BB-DE4B-95CE-6DB70DBA9567}" type="datetimeFigureOut">
               <a:rPr lang="en-US" dirty="0"/>
               <a:pPr/>
-              <a:t>8/30/2016</a:t>
+              <a:t>9/2/2016</a:t>
             </a:fld>
             <a:endParaRPr lang="en-US" dirty="0"/>
           </a:p>
@@ -8070,7 +8128,7 @@
             <a:fld id="{B61BEF0D-F0BB-DE4B-95CE-6DB70DBA9567}" type="datetimeFigureOut">
               <a:rPr lang="en-US" dirty="0"/>
               <a:pPr/>
-              <a:t>8/30/2016</a:t>
+              <a:t>9/2/2016</a:t>
             </a:fld>
             <a:endParaRPr lang="en-US" dirty="0"/>
           </a:p>
@@ -8400,7 +8458,7 @@
             <a:fld id="{B61BEF0D-F0BB-DE4B-95CE-6DB70DBA9567}" type="datetimeFigureOut">
               <a:rPr lang="en-US" dirty="0"/>
               <a:pPr/>
-              <a:t>8/30/2016</a:t>
+              <a:t>9/2/2016</a:t>
             </a:fld>
             <a:endParaRPr lang="en-US" dirty="0"/>
           </a:p>
@@ -8742,7 +8800,7 @@
             <a:fld id="{B61BEF0D-F0BB-DE4B-95CE-6DB70DBA9567}" type="datetimeFigureOut">
               <a:rPr lang="en-US" dirty="0"/>
               <a:pPr/>
-              <a:t>8/30/2016</a:t>
+              <a:t>9/2/2016</a:t>
             </a:fld>
             <a:endParaRPr lang="en-US" dirty="0"/>
           </a:p>
@@ -10856,7 +10914,7 @@
             <a:fld id="{B61BEF0D-F0BB-DE4B-95CE-6DB70DBA9567}" type="datetimeFigureOut">
               <a:rPr lang="en-US" dirty="0"/>
               <a:pPr/>
-              <a:t>8/30/2016</a:t>
+              <a:t>9/2/2016</a:t>
             </a:fld>
             <a:endParaRPr lang="en-US" dirty="0"/>
           </a:p>
@@ -11762,7 +11820,7 @@
           <p:nvPr>
             <p:extLst>
               <p:ext uri="{D42A27DB-BD31-4B8C-83A1-F6EECF244321}">
-                <p14:modId xmlns:p14="http://schemas.microsoft.com/office/powerpoint/2010/main" val="3818696574"/>
+                <p14:modId xmlns:p14="http://schemas.microsoft.com/office/powerpoint/2010/main" val="859399866"/>
               </p:ext>
             </p:extLst>
           </p:nvPr>

</xml_diff>

<commit_message>
Feature definition and extraction done - Waiting for review
The definition of the features and the extraction is done, it is waiting
for advisor's review.
</commit_message>
<xml_diff>
--- a/ThesisProposal.pptx
+++ b/ThesisProposal.pptx
@@ -9,7 +9,7 @@
     <p:sldId id="257" r:id="rId3"/>
     <p:sldId id="262" r:id="rId4"/>
     <p:sldId id="258" r:id="rId5"/>
-    <p:sldId id="259" r:id="rId6"/>
+    <p:sldId id="273" r:id="rId6"/>
     <p:sldId id="260" r:id="rId7"/>
     <p:sldId id="261" r:id="rId8"/>
     <p:sldId id="263" r:id="rId9"/>
@@ -17,6 +17,11 @@
     <p:sldId id="265" r:id="rId11"/>
     <p:sldId id="266" r:id="rId12"/>
     <p:sldId id="267" r:id="rId13"/>
+    <p:sldId id="268" r:id="rId14"/>
+    <p:sldId id="269" r:id="rId15"/>
+    <p:sldId id="270" r:id="rId16"/>
+    <p:sldId id="271" r:id="rId17"/>
+    <p:sldId id="272" r:id="rId18"/>
   </p:sldIdLst>
   <p:sldSz cx="12192000" cy="6858000"/>
   <p:notesSz cx="6858000" cy="9144000"/>
@@ -1707,859 +1712,6 @@
       <dsp:cNvGrpSpPr/>
     </dsp:nvGrpSpPr>
     <dsp:grpSpPr/>
-    <dsp:sp modelId="{EE05951C-221F-46FC-9D16-5EBF94B77E36}">
-      <dsp:nvSpPr>
-        <dsp:cNvPr id="0" name=""/>
-        <dsp:cNvSpPr/>
-      </dsp:nvSpPr>
-      <dsp:spPr>
-        <a:xfrm rot="5400000">
-          <a:off x="748826" y="1324028"/>
-          <a:ext cx="1162785" cy="1323789"/>
-        </a:xfrm>
-        <a:prstGeom prst="bentUpArrow">
-          <a:avLst>
-            <a:gd name="adj1" fmla="val 32840"/>
-            <a:gd name="adj2" fmla="val 25000"/>
-            <a:gd name="adj3" fmla="val 35780"/>
-          </a:avLst>
-        </a:prstGeom>
-        <a:solidFill>
-          <a:schemeClr val="accent5">
-            <a:tint val="50000"/>
-            <a:hueOff val="0"/>
-            <a:satOff val="0"/>
-            <a:lumOff val="0"/>
-            <a:alphaOff val="0"/>
-          </a:schemeClr>
-        </a:solidFill>
-        <a:ln w="15875" cap="rnd" cmpd="sng" algn="ctr">
-          <a:solidFill>
-            <a:schemeClr val="lt1">
-              <a:hueOff val="0"/>
-              <a:satOff val="0"/>
-              <a:lumOff val="0"/>
-              <a:alphaOff val="0"/>
-            </a:schemeClr>
-          </a:solidFill>
-          <a:prstDash val="solid"/>
-        </a:ln>
-        <a:effectLst/>
-      </dsp:spPr>
-      <dsp:style>
-        <a:lnRef idx="2">
-          <a:scrgbClr r="0" g="0" b="0"/>
-        </a:lnRef>
-        <a:fillRef idx="1">
-          <a:scrgbClr r="0" g="0" b="0"/>
-        </a:fillRef>
-        <a:effectRef idx="0">
-          <a:scrgbClr r="0" g="0" b="0"/>
-        </a:effectRef>
-        <a:fontRef idx="minor"/>
-      </dsp:style>
-    </dsp:sp>
-    <dsp:sp modelId="{B10D8F44-7CD1-463F-B8DE-A0A1D3101362}">
-      <dsp:nvSpPr>
-        <dsp:cNvPr id="0" name=""/>
-        <dsp:cNvSpPr/>
-      </dsp:nvSpPr>
-      <dsp:spPr>
-        <a:xfrm>
-          <a:off x="440759" y="35058"/>
-          <a:ext cx="1957445" cy="1370148"/>
-        </a:xfrm>
-        <a:prstGeom prst="roundRect">
-          <a:avLst>
-            <a:gd name="adj" fmla="val 16670"/>
-          </a:avLst>
-        </a:prstGeom>
-        <a:solidFill>
-          <a:schemeClr val="accent5">
-            <a:hueOff val="0"/>
-            <a:satOff val="0"/>
-            <a:lumOff val="0"/>
-            <a:alphaOff val="0"/>
-          </a:schemeClr>
-        </a:solidFill>
-        <a:ln w="15875" cap="rnd" cmpd="sng" algn="ctr">
-          <a:solidFill>
-            <a:schemeClr val="lt1">
-              <a:hueOff val="0"/>
-              <a:satOff val="0"/>
-              <a:lumOff val="0"/>
-              <a:alphaOff val="0"/>
-            </a:schemeClr>
-          </a:solidFill>
-          <a:prstDash val="solid"/>
-        </a:ln>
-        <a:effectLst/>
-      </dsp:spPr>
-      <dsp:style>
-        <a:lnRef idx="2">
-          <a:scrgbClr r="0" g="0" b="0"/>
-        </a:lnRef>
-        <a:fillRef idx="1">
-          <a:scrgbClr r="0" g="0" b="0"/>
-        </a:fillRef>
-        <a:effectRef idx="0">
-          <a:scrgbClr r="0" g="0" b="0"/>
-        </a:effectRef>
-        <a:fontRef idx="minor">
-          <a:schemeClr val="lt1"/>
-        </a:fontRef>
-      </dsp:style>
-      <dsp:txBody>
-        <a:bodyPr spcFirstLastPara="0" vert="horz" wrap="square" lIns="72390" tIns="72390" rIns="72390" bIns="72390" numCol="1" spcCol="1270" anchor="ctr" anchorCtr="0">
-          <a:noAutofit/>
-        </a:bodyPr>
-        <a:lstStyle/>
-        <a:p>
-          <a:pPr lvl="0" algn="ctr" defTabSz="844550">
-            <a:lnSpc>
-              <a:spcPct val="90000"/>
-            </a:lnSpc>
-            <a:spcBef>
-              <a:spcPct val="0"/>
-            </a:spcBef>
-            <a:spcAft>
-              <a:spcPct val="35000"/>
-            </a:spcAft>
-          </a:pPr>
-          <a:r>
-            <a:rPr lang="en-US" sz="1900" kern="1200" dirty="0" smtClean="0"/>
-            <a:t>Image capture</a:t>
-          </a:r>
-          <a:endParaRPr lang="en-US" sz="1900" kern="1200" dirty="0"/>
-        </a:p>
-      </dsp:txBody>
-      <dsp:txXfrm>
-        <a:off x="507656" y="101955"/>
-        <a:ext cx="1823651" cy="1236354"/>
-      </dsp:txXfrm>
-    </dsp:sp>
-    <dsp:sp modelId="{110872B9-258E-4C73-85A1-643C30A727EF}">
-      <dsp:nvSpPr>
-        <dsp:cNvPr id="0" name=""/>
-        <dsp:cNvSpPr/>
-      </dsp:nvSpPr>
-      <dsp:spPr>
-        <a:xfrm>
-          <a:off x="2471138" y="165733"/>
-          <a:ext cx="1999358" cy="1107414"/>
-        </a:xfrm>
-        <a:prstGeom prst="rect">
-          <a:avLst/>
-        </a:prstGeom>
-        <a:noFill/>
-        <a:ln>
-          <a:noFill/>
-        </a:ln>
-        <a:effectLst/>
-      </dsp:spPr>
-      <dsp:style>
-        <a:lnRef idx="0">
-          <a:scrgbClr r="0" g="0" b="0"/>
-        </a:lnRef>
-        <a:fillRef idx="0">
-          <a:scrgbClr r="0" g="0" b="0"/>
-        </a:fillRef>
-        <a:effectRef idx="0">
-          <a:scrgbClr r="0" g="0" b="0"/>
-        </a:effectRef>
-        <a:fontRef idx="minor"/>
-      </dsp:style>
-      <dsp:txBody>
-        <a:bodyPr spcFirstLastPara="0" vert="horz" wrap="square" lIns="53340" tIns="53340" rIns="53340" bIns="53340" numCol="1" spcCol="1270" anchor="ctr" anchorCtr="0">
-          <a:noAutofit/>
-        </a:bodyPr>
-        <a:lstStyle/>
-        <a:p>
-          <a:pPr marL="114300" lvl="1" indent="-114300" algn="l" defTabSz="622300">
-            <a:lnSpc>
-              <a:spcPct val="90000"/>
-            </a:lnSpc>
-            <a:spcBef>
-              <a:spcPct val="0"/>
-            </a:spcBef>
-            <a:spcAft>
-              <a:spcPct val="15000"/>
-            </a:spcAft>
-            <a:buChar char="••"/>
-          </a:pPr>
-          <a:r>
-            <a:rPr lang="en-US" sz="1400" kern="1200" dirty="0" smtClean="0"/>
-            <a:t>Ideal world definition</a:t>
-          </a:r>
-          <a:endParaRPr lang="en-US" sz="1400" kern="1200" dirty="0"/>
-        </a:p>
-      </dsp:txBody>
-      <dsp:txXfrm>
-        <a:off x="2471138" y="165733"/>
-        <a:ext cx="1999358" cy="1107414"/>
-      </dsp:txXfrm>
-    </dsp:sp>
-    <dsp:sp modelId="{8EBB6F37-B3D1-4DD1-AAB3-F2E789D04B80}">
-      <dsp:nvSpPr>
-        <dsp:cNvPr id="0" name=""/>
-        <dsp:cNvSpPr/>
-      </dsp:nvSpPr>
-      <dsp:spPr>
-        <a:xfrm rot="5400000">
-          <a:off x="2509924" y="2863157"/>
-          <a:ext cx="1162785" cy="1323789"/>
-        </a:xfrm>
-        <a:prstGeom prst="bentUpArrow">
-          <a:avLst>
-            <a:gd name="adj1" fmla="val 32840"/>
-            <a:gd name="adj2" fmla="val 25000"/>
-            <a:gd name="adj3" fmla="val 35780"/>
-          </a:avLst>
-        </a:prstGeom>
-        <a:solidFill>
-          <a:schemeClr val="accent5">
-            <a:tint val="50000"/>
-            <a:hueOff val="0"/>
-            <a:satOff val="0"/>
-            <a:lumOff val="0"/>
-            <a:alphaOff val="0"/>
-          </a:schemeClr>
-        </a:solidFill>
-        <a:ln w="15875" cap="rnd" cmpd="sng" algn="ctr">
-          <a:solidFill>
-            <a:schemeClr val="lt1">
-              <a:hueOff val="0"/>
-              <a:satOff val="0"/>
-              <a:lumOff val="0"/>
-              <a:alphaOff val="0"/>
-            </a:schemeClr>
-          </a:solidFill>
-          <a:prstDash val="solid"/>
-        </a:ln>
-        <a:effectLst/>
-      </dsp:spPr>
-      <dsp:style>
-        <a:lnRef idx="2">
-          <a:scrgbClr r="0" g="0" b="0"/>
-        </a:lnRef>
-        <a:fillRef idx="1">
-          <a:scrgbClr r="0" g="0" b="0"/>
-        </a:fillRef>
-        <a:effectRef idx="0">
-          <a:scrgbClr r="0" g="0" b="0"/>
-        </a:effectRef>
-        <a:fontRef idx="minor"/>
-      </dsp:style>
-    </dsp:sp>
-    <dsp:sp modelId="{93356A06-D76C-4384-9F2C-5C2F152098A1}">
-      <dsp:nvSpPr>
-        <dsp:cNvPr id="0" name=""/>
-        <dsp:cNvSpPr/>
-      </dsp:nvSpPr>
-      <dsp:spPr>
-        <a:xfrm>
-          <a:off x="2201857" y="1574186"/>
-          <a:ext cx="1957445" cy="1370148"/>
-        </a:xfrm>
-        <a:prstGeom prst="roundRect">
-          <a:avLst>
-            <a:gd name="adj" fmla="val 16670"/>
-          </a:avLst>
-        </a:prstGeom>
-        <a:solidFill>
-          <a:schemeClr val="accent5">
-            <a:hueOff val="0"/>
-            <a:satOff val="0"/>
-            <a:lumOff val="0"/>
-            <a:alphaOff val="0"/>
-          </a:schemeClr>
-        </a:solidFill>
-        <a:ln w="15875" cap="rnd" cmpd="sng" algn="ctr">
-          <a:solidFill>
-            <a:schemeClr val="lt1">
-              <a:hueOff val="0"/>
-              <a:satOff val="0"/>
-              <a:lumOff val="0"/>
-              <a:alphaOff val="0"/>
-            </a:schemeClr>
-          </a:solidFill>
-          <a:prstDash val="solid"/>
-        </a:ln>
-        <a:effectLst/>
-      </dsp:spPr>
-      <dsp:style>
-        <a:lnRef idx="2">
-          <a:scrgbClr r="0" g="0" b="0"/>
-        </a:lnRef>
-        <a:fillRef idx="1">
-          <a:scrgbClr r="0" g="0" b="0"/>
-        </a:fillRef>
-        <a:effectRef idx="0">
-          <a:scrgbClr r="0" g="0" b="0"/>
-        </a:effectRef>
-        <a:fontRef idx="minor">
-          <a:schemeClr val="lt1"/>
-        </a:fontRef>
-      </dsp:style>
-      <dsp:txBody>
-        <a:bodyPr spcFirstLastPara="0" vert="horz" wrap="square" lIns="72390" tIns="72390" rIns="72390" bIns="72390" numCol="1" spcCol="1270" anchor="ctr" anchorCtr="0">
-          <a:noAutofit/>
-        </a:bodyPr>
-        <a:lstStyle/>
-        <a:p>
-          <a:pPr lvl="0" algn="ctr" defTabSz="844550">
-            <a:lnSpc>
-              <a:spcPct val="90000"/>
-            </a:lnSpc>
-            <a:spcBef>
-              <a:spcPct val="0"/>
-            </a:spcBef>
-            <a:spcAft>
-              <a:spcPct val="35000"/>
-            </a:spcAft>
-          </a:pPr>
-          <a:r>
-            <a:rPr lang="en-US" sz="1900" kern="1200" dirty="0" smtClean="0"/>
-            <a:t>Preprocessing</a:t>
-          </a:r>
-          <a:endParaRPr lang="en-US" sz="1900" kern="1200" dirty="0"/>
-        </a:p>
-      </dsp:txBody>
-      <dsp:txXfrm>
-        <a:off x="2268754" y="1641083"/>
-        <a:ext cx="1823651" cy="1236354"/>
-      </dsp:txXfrm>
-    </dsp:sp>
-    <dsp:sp modelId="{7105A76C-D0A3-4EC3-AC13-A5A8D4365BE4}">
-      <dsp:nvSpPr>
-        <dsp:cNvPr id="0" name=""/>
-        <dsp:cNvSpPr/>
-      </dsp:nvSpPr>
-      <dsp:spPr>
-        <a:xfrm>
-          <a:off x="4210640" y="1717397"/>
-          <a:ext cx="3402745" cy="1107414"/>
-        </a:xfrm>
-        <a:prstGeom prst="rect">
-          <a:avLst/>
-        </a:prstGeom>
-        <a:noFill/>
-        <a:ln>
-          <a:noFill/>
-        </a:ln>
-        <a:effectLst/>
-      </dsp:spPr>
-      <dsp:style>
-        <a:lnRef idx="0">
-          <a:scrgbClr r="0" g="0" b="0"/>
-        </a:lnRef>
-        <a:fillRef idx="0">
-          <a:scrgbClr r="0" g="0" b="0"/>
-        </a:fillRef>
-        <a:effectRef idx="0">
-          <a:scrgbClr r="0" g="0" b="0"/>
-        </a:effectRef>
-        <a:fontRef idx="minor"/>
-      </dsp:style>
-      <dsp:txBody>
-        <a:bodyPr spcFirstLastPara="0" vert="horz" wrap="square" lIns="53340" tIns="53340" rIns="53340" bIns="53340" numCol="1" spcCol="1270" anchor="ctr" anchorCtr="0">
-          <a:noAutofit/>
-        </a:bodyPr>
-        <a:lstStyle/>
-        <a:p>
-          <a:pPr marL="114300" lvl="1" indent="-114300" algn="l" defTabSz="622300">
-            <a:lnSpc>
-              <a:spcPct val="90000"/>
-            </a:lnSpc>
-            <a:spcBef>
-              <a:spcPct val="0"/>
-            </a:spcBef>
-            <a:spcAft>
-              <a:spcPct val="15000"/>
-            </a:spcAft>
-            <a:buChar char="••"/>
-          </a:pPr>
-          <a:r>
-            <a:rPr lang="en-US" sz="1400" kern="1200" dirty="0" smtClean="0"/>
-            <a:t>Hole filling</a:t>
-          </a:r>
-          <a:endParaRPr lang="en-US" sz="1400" kern="1200" dirty="0"/>
-        </a:p>
-        <a:p>
-          <a:pPr marL="114300" lvl="1" indent="-114300" algn="l" defTabSz="622300">
-            <a:lnSpc>
-              <a:spcPct val="90000"/>
-            </a:lnSpc>
-            <a:spcBef>
-              <a:spcPct val="0"/>
-            </a:spcBef>
-            <a:spcAft>
-              <a:spcPct val="15000"/>
-            </a:spcAft>
-            <a:buChar char="••"/>
-          </a:pPr>
-          <a:r>
-            <a:rPr lang="en-US" sz="1400" kern="1200" dirty="0" smtClean="0"/>
-            <a:t>Extraction</a:t>
-          </a:r>
-          <a:endParaRPr lang="en-US" sz="1400" kern="1200" dirty="0"/>
-        </a:p>
-        <a:p>
-          <a:pPr marL="114300" lvl="1" indent="-114300" algn="l" defTabSz="622300">
-            <a:lnSpc>
-              <a:spcPct val="90000"/>
-            </a:lnSpc>
-            <a:spcBef>
-              <a:spcPct val="0"/>
-            </a:spcBef>
-            <a:spcAft>
-              <a:spcPct val="15000"/>
-            </a:spcAft>
-            <a:buChar char="••"/>
-          </a:pPr>
-          <a:r>
-            <a:rPr lang="en-US" sz="1400" kern="1200" dirty="0" smtClean="0"/>
-            <a:t>Normalization (depth and size</a:t>
-          </a:r>
-          <a:r>
-            <a:rPr lang="en-US" sz="1300" kern="1200" dirty="0" smtClean="0"/>
-            <a:t>)</a:t>
-          </a:r>
-          <a:endParaRPr lang="en-US" sz="1300" kern="1200" dirty="0"/>
-        </a:p>
-      </dsp:txBody>
-      <dsp:txXfrm>
-        <a:off x="4210640" y="1717397"/>
-        <a:ext cx="3402745" cy="1107414"/>
-      </dsp:txXfrm>
-    </dsp:sp>
-    <dsp:sp modelId="{D16A277C-35B0-4647-9468-A14C53C6862F}">
-      <dsp:nvSpPr>
-        <dsp:cNvPr id="0" name=""/>
-        <dsp:cNvSpPr/>
-      </dsp:nvSpPr>
-      <dsp:spPr>
-        <a:xfrm rot="5400000">
-          <a:off x="4271023" y="4402286"/>
-          <a:ext cx="1162785" cy="1323789"/>
-        </a:xfrm>
-        <a:prstGeom prst="bentUpArrow">
-          <a:avLst>
-            <a:gd name="adj1" fmla="val 32840"/>
-            <a:gd name="adj2" fmla="val 25000"/>
-            <a:gd name="adj3" fmla="val 35780"/>
-          </a:avLst>
-        </a:prstGeom>
-        <a:solidFill>
-          <a:schemeClr val="accent5">
-            <a:tint val="50000"/>
-            <a:hueOff val="0"/>
-            <a:satOff val="0"/>
-            <a:lumOff val="0"/>
-            <a:alphaOff val="0"/>
-          </a:schemeClr>
-        </a:solidFill>
-        <a:ln w="15875" cap="rnd" cmpd="sng" algn="ctr">
-          <a:solidFill>
-            <a:schemeClr val="lt1">
-              <a:hueOff val="0"/>
-              <a:satOff val="0"/>
-              <a:lumOff val="0"/>
-              <a:alphaOff val="0"/>
-            </a:schemeClr>
-          </a:solidFill>
-          <a:prstDash val="solid"/>
-        </a:ln>
-        <a:effectLst/>
-      </dsp:spPr>
-      <dsp:style>
-        <a:lnRef idx="2">
-          <a:scrgbClr r="0" g="0" b="0"/>
-        </a:lnRef>
-        <a:fillRef idx="1">
-          <a:scrgbClr r="0" g="0" b="0"/>
-        </a:fillRef>
-        <a:effectRef idx="0">
-          <a:scrgbClr r="0" g="0" b="0"/>
-        </a:effectRef>
-        <a:fontRef idx="minor"/>
-      </dsp:style>
-    </dsp:sp>
-    <dsp:sp modelId="{757783AB-7AF3-4E1E-96E7-7BB317946EAF}">
-      <dsp:nvSpPr>
-        <dsp:cNvPr id="0" name=""/>
-        <dsp:cNvSpPr/>
-      </dsp:nvSpPr>
-      <dsp:spPr>
-        <a:xfrm>
-          <a:off x="3962955" y="3113315"/>
-          <a:ext cx="1957445" cy="1370148"/>
-        </a:xfrm>
-        <a:prstGeom prst="roundRect">
-          <a:avLst>
-            <a:gd name="adj" fmla="val 16670"/>
-          </a:avLst>
-        </a:prstGeom>
-        <a:solidFill>
-          <a:schemeClr val="accent5">
-            <a:hueOff val="0"/>
-            <a:satOff val="0"/>
-            <a:lumOff val="0"/>
-            <a:alphaOff val="0"/>
-          </a:schemeClr>
-        </a:solidFill>
-        <a:ln w="15875" cap="rnd" cmpd="sng" algn="ctr">
-          <a:solidFill>
-            <a:schemeClr val="lt1">
-              <a:hueOff val="0"/>
-              <a:satOff val="0"/>
-              <a:lumOff val="0"/>
-              <a:alphaOff val="0"/>
-            </a:schemeClr>
-          </a:solidFill>
-          <a:prstDash val="solid"/>
-        </a:ln>
-        <a:effectLst/>
-      </dsp:spPr>
-      <dsp:style>
-        <a:lnRef idx="2">
-          <a:scrgbClr r="0" g="0" b="0"/>
-        </a:lnRef>
-        <a:fillRef idx="1">
-          <a:scrgbClr r="0" g="0" b="0"/>
-        </a:fillRef>
-        <a:effectRef idx="0">
-          <a:scrgbClr r="0" g="0" b="0"/>
-        </a:effectRef>
-        <a:fontRef idx="minor">
-          <a:schemeClr val="lt1"/>
-        </a:fontRef>
-      </dsp:style>
-      <dsp:txBody>
-        <a:bodyPr spcFirstLastPara="0" vert="horz" wrap="square" lIns="72390" tIns="72390" rIns="72390" bIns="72390" numCol="1" spcCol="1270" anchor="ctr" anchorCtr="0">
-          <a:noAutofit/>
-        </a:bodyPr>
-        <a:lstStyle/>
-        <a:p>
-          <a:pPr lvl="0" algn="ctr" defTabSz="844550">
-            <a:lnSpc>
-              <a:spcPct val="90000"/>
-            </a:lnSpc>
-            <a:spcBef>
-              <a:spcPct val="0"/>
-            </a:spcBef>
-            <a:spcAft>
-              <a:spcPct val="35000"/>
-            </a:spcAft>
-          </a:pPr>
-          <a:r>
-            <a:rPr lang="en-US" sz="1900" kern="1200" dirty="0" smtClean="0"/>
-            <a:t>Feature definition and extraction</a:t>
-          </a:r>
-          <a:endParaRPr lang="en-US" sz="1900" kern="1200" dirty="0"/>
-        </a:p>
-      </dsp:txBody>
-      <dsp:txXfrm>
-        <a:off x="4029852" y="3180212"/>
-        <a:ext cx="1823651" cy="1236354"/>
-      </dsp:txXfrm>
-    </dsp:sp>
-    <dsp:sp modelId="{FC5751CB-FE42-4651-8933-7A7CC30B3865}">
-      <dsp:nvSpPr>
-        <dsp:cNvPr id="0" name=""/>
-        <dsp:cNvSpPr/>
-      </dsp:nvSpPr>
-      <dsp:spPr>
-        <a:xfrm>
-          <a:off x="5987113" y="3243990"/>
-          <a:ext cx="2766796" cy="1107414"/>
-        </a:xfrm>
-        <a:prstGeom prst="rect">
-          <a:avLst/>
-        </a:prstGeom>
-        <a:noFill/>
-        <a:ln>
-          <a:noFill/>
-        </a:ln>
-        <a:effectLst/>
-      </dsp:spPr>
-      <dsp:style>
-        <a:lnRef idx="0">
-          <a:scrgbClr r="0" g="0" b="0"/>
-        </a:lnRef>
-        <a:fillRef idx="0">
-          <a:scrgbClr r="0" g="0" b="0"/>
-        </a:fillRef>
-        <a:effectRef idx="0">
-          <a:scrgbClr r="0" g="0" b="0"/>
-        </a:effectRef>
-        <a:fontRef idx="minor"/>
-      </dsp:style>
-      <dsp:txBody>
-        <a:bodyPr spcFirstLastPara="0" vert="horz" wrap="square" lIns="53340" tIns="53340" rIns="53340" bIns="53340" numCol="1" spcCol="1270" anchor="ctr" anchorCtr="0">
-          <a:noAutofit/>
-        </a:bodyPr>
-        <a:lstStyle/>
-        <a:p>
-          <a:pPr marL="114300" lvl="1" indent="-114300" algn="l" defTabSz="622300">
-            <a:lnSpc>
-              <a:spcPct val="90000"/>
-            </a:lnSpc>
-            <a:spcBef>
-              <a:spcPct val="0"/>
-            </a:spcBef>
-            <a:spcAft>
-              <a:spcPct val="15000"/>
-            </a:spcAft>
-            <a:buChar char="••"/>
-          </a:pPr>
-          <a:r>
-            <a:rPr lang="en-US" sz="1400" kern="1200" dirty="0" smtClean="0"/>
-            <a:t>Laplace  filter</a:t>
-          </a:r>
-          <a:endParaRPr lang="en-US" sz="1400" kern="1200" dirty="0"/>
-        </a:p>
-        <a:p>
-          <a:pPr marL="114300" lvl="1" indent="-114300" algn="l" defTabSz="622300">
-            <a:lnSpc>
-              <a:spcPct val="90000"/>
-            </a:lnSpc>
-            <a:spcBef>
-              <a:spcPct val="0"/>
-            </a:spcBef>
-            <a:spcAft>
-              <a:spcPct val="15000"/>
-            </a:spcAft>
-            <a:buChar char="••"/>
-          </a:pPr>
-          <a:r>
-            <a:rPr lang="en-US" sz="1400" kern="1200" dirty="0" smtClean="0"/>
-            <a:t>Gabor filter</a:t>
-          </a:r>
-          <a:endParaRPr lang="en-US" sz="1400" kern="1200" dirty="0"/>
-        </a:p>
-        <a:p>
-          <a:pPr marL="114300" lvl="1" indent="-114300" algn="l" defTabSz="622300">
-            <a:lnSpc>
-              <a:spcPct val="90000"/>
-            </a:lnSpc>
-            <a:spcBef>
-              <a:spcPct val="0"/>
-            </a:spcBef>
-            <a:spcAft>
-              <a:spcPct val="15000"/>
-            </a:spcAft>
-            <a:buChar char="••"/>
-          </a:pPr>
-          <a:r>
-            <a:rPr lang="en-US" sz="1400" kern="1200" dirty="0" smtClean="0"/>
-            <a:t>Fourier transform</a:t>
-          </a:r>
-          <a:endParaRPr lang="en-US" sz="1400" kern="1200" dirty="0"/>
-        </a:p>
-        <a:p>
-          <a:pPr marL="114300" lvl="1" indent="-114300" algn="l" defTabSz="622300">
-            <a:lnSpc>
-              <a:spcPct val="90000"/>
-            </a:lnSpc>
-            <a:spcBef>
-              <a:spcPct val="0"/>
-            </a:spcBef>
-            <a:spcAft>
-              <a:spcPct val="15000"/>
-            </a:spcAft>
-            <a:buChar char="••"/>
-          </a:pPr>
-          <a:r>
-            <a:rPr lang="en-US" sz="1400" kern="1200" dirty="0" smtClean="0"/>
-            <a:t>…</a:t>
-          </a:r>
-          <a:endParaRPr lang="en-US" sz="1400" kern="1200" dirty="0"/>
-        </a:p>
-      </dsp:txBody>
-      <dsp:txXfrm>
-        <a:off x="5987113" y="3243990"/>
-        <a:ext cx="2766796" cy="1107414"/>
-      </dsp:txXfrm>
-    </dsp:sp>
-    <dsp:sp modelId="{BCDFEA53-6FB2-4975-9B6E-AC0008783243}">
-      <dsp:nvSpPr>
-        <dsp:cNvPr id="0" name=""/>
-        <dsp:cNvSpPr/>
-      </dsp:nvSpPr>
-      <dsp:spPr>
-        <a:xfrm>
-          <a:off x="5724053" y="4652444"/>
-          <a:ext cx="1957445" cy="1370148"/>
-        </a:xfrm>
-        <a:prstGeom prst="roundRect">
-          <a:avLst>
-            <a:gd name="adj" fmla="val 16670"/>
-          </a:avLst>
-        </a:prstGeom>
-        <a:solidFill>
-          <a:schemeClr val="accent5">
-            <a:hueOff val="0"/>
-            <a:satOff val="0"/>
-            <a:lumOff val="0"/>
-            <a:alphaOff val="0"/>
-          </a:schemeClr>
-        </a:solidFill>
-        <a:ln w="15875" cap="rnd" cmpd="sng" algn="ctr">
-          <a:solidFill>
-            <a:schemeClr val="lt1">
-              <a:hueOff val="0"/>
-              <a:satOff val="0"/>
-              <a:lumOff val="0"/>
-              <a:alphaOff val="0"/>
-            </a:schemeClr>
-          </a:solidFill>
-          <a:prstDash val="solid"/>
-        </a:ln>
-        <a:effectLst/>
-      </dsp:spPr>
-      <dsp:style>
-        <a:lnRef idx="2">
-          <a:scrgbClr r="0" g="0" b="0"/>
-        </a:lnRef>
-        <a:fillRef idx="1">
-          <a:scrgbClr r="0" g="0" b="0"/>
-        </a:fillRef>
-        <a:effectRef idx="0">
-          <a:scrgbClr r="0" g="0" b="0"/>
-        </a:effectRef>
-        <a:fontRef idx="minor">
-          <a:schemeClr val="lt1"/>
-        </a:fontRef>
-      </dsp:style>
-      <dsp:txBody>
-        <a:bodyPr spcFirstLastPara="0" vert="horz" wrap="square" lIns="72390" tIns="72390" rIns="72390" bIns="72390" numCol="1" spcCol="1270" anchor="ctr" anchorCtr="0">
-          <a:noAutofit/>
-        </a:bodyPr>
-        <a:lstStyle/>
-        <a:p>
-          <a:pPr lvl="0" algn="ctr" defTabSz="844550">
-            <a:lnSpc>
-              <a:spcPct val="90000"/>
-            </a:lnSpc>
-            <a:spcBef>
-              <a:spcPct val="0"/>
-            </a:spcBef>
-            <a:spcAft>
-              <a:spcPct val="35000"/>
-            </a:spcAft>
-          </a:pPr>
-          <a:r>
-            <a:rPr lang="en-US" sz="1900" kern="1200" dirty="0" smtClean="0"/>
-            <a:t>Training and classification</a:t>
-          </a:r>
-          <a:endParaRPr lang="en-US" sz="1900" kern="1200" dirty="0"/>
-        </a:p>
-      </dsp:txBody>
-      <dsp:txXfrm>
-        <a:off x="5790950" y="4719341"/>
-        <a:ext cx="1823651" cy="1236354"/>
-      </dsp:txXfrm>
-    </dsp:sp>
-    <dsp:sp modelId="{6D721470-4ADB-4DC0-B998-80D1CE994CBA}">
-      <dsp:nvSpPr>
-        <dsp:cNvPr id="0" name=""/>
-        <dsp:cNvSpPr/>
-      </dsp:nvSpPr>
-      <dsp:spPr>
-        <a:xfrm>
-          <a:off x="7681499" y="4783119"/>
-          <a:ext cx="1423659" cy="1107414"/>
-        </a:xfrm>
-        <a:prstGeom prst="rect">
-          <a:avLst/>
-        </a:prstGeom>
-        <a:noFill/>
-        <a:ln>
-          <a:noFill/>
-        </a:ln>
-        <a:effectLst/>
-      </dsp:spPr>
-      <dsp:style>
-        <a:lnRef idx="0">
-          <a:scrgbClr r="0" g="0" b="0"/>
-        </a:lnRef>
-        <a:fillRef idx="0">
-          <a:scrgbClr r="0" g="0" b="0"/>
-        </a:fillRef>
-        <a:effectRef idx="0">
-          <a:scrgbClr r="0" g="0" b="0"/>
-        </a:effectRef>
-        <a:fontRef idx="minor"/>
-      </dsp:style>
-      <dsp:txBody>
-        <a:bodyPr spcFirstLastPara="0" vert="horz" wrap="square" lIns="53340" tIns="53340" rIns="53340" bIns="53340" numCol="1" spcCol="1270" anchor="ctr" anchorCtr="0">
-          <a:noAutofit/>
-        </a:bodyPr>
-        <a:lstStyle/>
-        <a:p>
-          <a:pPr marL="114300" lvl="1" indent="-114300" algn="l" defTabSz="622300">
-            <a:lnSpc>
-              <a:spcPct val="90000"/>
-            </a:lnSpc>
-            <a:spcBef>
-              <a:spcPct val="0"/>
-            </a:spcBef>
-            <a:spcAft>
-              <a:spcPct val="15000"/>
-            </a:spcAft>
-            <a:buChar char="••"/>
-          </a:pPr>
-          <a:r>
-            <a:rPr lang="en-US" sz="1400" kern="1200" dirty="0" smtClean="0"/>
-            <a:t>ANN</a:t>
-          </a:r>
-          <a:endParaRPr lang="en-US" sz="1400" kern="1200" dirty="0"/>
-        </a:p>
-        <a:p>
-          <a:pPr marL="114300" lvl="1" indent="-114300" algn="l" defTabSz="622300">
-            <a:lnSpc>
-              <a:spcPct val="90000"/>
-            </a:lnSpc>
-            <a:spcBef>
-              <a:spcPct val="0"/>
-            </a:spcBef>
-            <a:spcAft>
-              <a:spcPct val="15000"/>
-            </a:spcAft>
-            <a:buChar char="••"/>
-          </a:pPr>
-          <a:r>
-            <a:rPr lang="en-US" sz="1400" kern="1200" dirty="0" smtClean="0"/>
-            <a:t>RDF</a:t>
-          </a:r>
-          <a:endParaRPr lang="en-US" sz="1400" kern="1200" dirty="0"/>
-        </a:p>
-        <a:p>
-          <a:pPr marL="114300" lvl="1" indent="-114300" algn="l" defTabSz="622300">
-            <a:lnSpc>
-              <a:spcPct val="90000"/>
-            </a:lnSpc>
-            <a:spcBef>
-              <a:spcPct val="0"/>
-            </a:spcBef>
-            <a:spcAft>
-              <a:spcPct val="15000"/>
-            </a:spcAft>
-            <a:buChar char="••"/>
-          </a:pPr>
-          <a:r>
-            <a:rPr lang="en-US" sz="1400" kern="1200" dirty="0" smtClean="0"/>
-            <a:t>…</a:t>
-          </a:r>
-          <a:endParaRPr lang="en-US" sz="1400" kern="1200" dirty="0"/>
-        </a:p>
-      </dsp:txBody>
-      <dsp:txXfrm>
-        <a:off x="7681499" y="4783119"/>
-        <a:ext cx="1423659" cy="1107414"/>
-      </dsp:txXfrm>
-    </dsp:sp>
   </dsp:spTree>
 </dsp:drawing>
 </file>
@@ -4105,7 +3257,7 @@
             <a:fld id="{B61BEF0D-F0BB-DE4B-95CE-6DB70DBA9567}" type="datetimeFigureOut">
               <a:rPr lang="en-US" dirty="0"/>
               <a:pPr/>
-              <a:t>9/2/2016</a:t>
+              <a:t>9/7/2016</a:t>
             </a:fld>
             <a:endParaRPr lang="en-US" dirty="0"/>
           </a:p>
@@ -4440,7 +3592,7 @@
             <a:fld id="{B61BEF0D-F0BB-DE4B-95CE-6DB70DBA9567}" type="datetimeFigureOut">
               <a:rPr lang="en-US" dirty="0"/>
               <a:pPr/>
-              <a:t>9/2/2016</a:t>
+              <a:t>9/7/2016</a:t>
             </a:fld>
             <a:endParaRPr lang="en-US" dirty="0"/>
           </a:p>
@@ -4838,7 +3990,7 @@
             <a:fld id="{B61BEF0D-F0BB-DE4B-95CE-6DB70DBA9567}" type="datetimeFigureOut">
               <a:rPr lang="en-US" dirty="0"/>
               <a:pPr/>
-              <a:t>9/2/2016</a:t>
+              <a:t>9/7/2016</a:t>
             </a:fld>
             <a:endParaRPr lang="en-US" dirty="0"/>
           </a:p>
@@ -5170,7 +4322,7 @@
             <a:fld id="{B61BEF0D-F0BB-DE4B-95CE-6DB70DBA9567}" type="datetimeFigureOut">
               <a:rPr lang="en-US" dirty="0"/>
               <a:pPr/>
-              <a:t>9/2/2016</a:t>
+              <a:t>9/7/2016</a:t>
             </a:fld>
             <a:endParaRPr lang="en-US" dirty="0"/>
           </a:p>
@@ -5487,7 +4639,7 @@
             <a:fld id="{B61BEF0D-F0BB-DE4B-95CE-6DB70DBA9567}" type="datetimeFigureOut">
               <a:rPr lang="en-US" dirty="0"/>
               <a:pPr/>
-              <a:t>9/2/2016</a:t>
+              <a:t>9/7/2016</a:t>
             </a:fld>
             <a:endParaRPr lang="en-US" dirty="0"/>
           </a:p>
@@ -5880,7 +5032,7 @@
             <a:fld id="{B61BEF0D-F0BB-DE4B-95CE-6DB70DBA9567}" type="datetimeFigureOut">
               <a:rPr lang="en-US" dirty="0"/>
               <a:pPr/>
-              <a:t>9/2/2016</a:t>
+              <a:t>9/7/2016</a:t>
             </a:fld>
             <a:endParaRPr lang="en-US" dirty="0"/>
           </a:p>
@@ -6134,7 +5286,7 @@
             <a:fld id="{B61BEF0D-F0BB-DE4B-95CE-6DB70DBA9567}" type="datetimeFigureOut">
               <a:rPr lang="en-US" dirty="0"/>
               <a:pPr/>
-              <a:t>9/2/2016</a:t>
+              <a:t>9/7/2016</a:t>
             </a:fld>
             <a:endParaRPr lang="en-US" dirty="0"/>
           </a:p>
@@ -6393,7 +5545,7 @@
             <a:fld id="{B61BEF0D-F0BB-DE4B-95CE-6DB70DBA9567}" type="datetimeFigureOut">
               <a:rPr lang="en-US" dirty="0"/>
               <a:pPr/>
-              <a:t>9/2/2016</a:t>
+              <a:t>9/7/2016</a:t>
             </a:fld>
             <a:endParaRPr lang="en-US" dirty="0"/>
           </a:p>
@@ -6652,7 +5804,7 @@
             <a:fld id="{B61BEF0D-F0BB-DE4B-95CE-6DB70DBA9567}" type="datetimeFigureOut">
               <a:rPr lang="en-US" dirty="0"/>
               <a:pPr/>
-              <a:t>9/2/2016</a:t>
+              <a:t>9/7/2016</a:t>
             </a:fld>
             <a:endParaRPr lang="en-US" dirty="0"/>
           </a:p>
@@ -6978,7 +6130,7 @@
             <a:fld id="{B61BEF0D-F0BB-DE4B-95CE-6DB70DBA9567}" type="datetimeFigureOut">
               <a:rPr lang="en-US" dirty="0"/>
               <a:pPr/>
-              <a:t>9/2/2016</a:t>
+              <a:t>9/7/2016</a:t>
             </a:fld>
             <a:endParaRPr lang="en-US" dirty="0"/>
           </a:p>
@@ -7298,7 +6450,7 @@
             <a:fld id="{B61BEF0D-F0BB-DE4B-95CE-6DB70DBA9567}" type="datetimeFigureOut">
               <a:rPr lang="en-US" dirty="0"/>
               <a:pPr/>
-              <a:t>9/2/2016</a:t>
+              <a:t>9/7/2016</a:t>
             </a:fld>
             <a:endParaRPr lang="en-US" dirty="0"/>
           </a:p>
@@ -7752,7 +6904,7 @@
             <a:fld id="{B61BEF0D-F0BB-DE4B-95CE-6DB70DBA9567}" type="datetimeFigureOut">
               <a:rPr lang="en-US" dirty="0"/>
               <a:pPr/>
-              <a:t>9/2/2016</a:t>
+              <a:t>9/7/2016</a:t>
             </a:fld>
             <a:endParaRPr lang="en-US" dirty="0"/>
           </a:p>
@@ -7954,7 +7106,7 @@
             <a:fld id="{B61BEF0D-F0BB-DE4B-95CE-6DB70DBA9567}" type="datetimeFigureOut">
               <a:rPr lang="en-US" dirty="0"/>
               <a:pPr/>
-              <a:t>9/2/2016</a:t>
+              <a:t>9/7/2016</a:t>
             </a:fld>
             <a:endParaRPr lang="en-US" dirty="0"/>
           </a:p>
@@ -8128,7 +7280,7 @@
             <a:fld id="{B61BEF0D-F0BB-DE4B-95CE-6DB70DBA9567}" type="datetimeFigureOut">
               <a:rPr lang="en-US" dirty="0"/>
               <a:pPr/>
-              <a:t>9/2/2016</a:t>
+              <a:t>9/7/2016</a:t>
             </a:fld>
             <a:endParaRPr lang="en-US" dirty="0"/>
           </a:p>
@@ -8458,7 +7610,7 @@
             <a:fld id="{B61BEF0D-F0BB-DE4B-95CE-6DB70DBA9567}" type="datetimeFigureOut">
               <a:rPr lang="en-US" dirty="0"/>
               <a:pPr/>
-              <a:t>9/2/2016</a:t>
+              <a:t>9/7/2016</a:t>
             </a:fld>
             <a:endParaRPr lang="en-US" dirty="0"/>
           </a:p>
@@ -8800,7 +7952,7 @@
             <a:fld id="{B61BEF0D-F0BB-DE4B-95CE-6DB70DBA9567}" type="datetimeFigureOut">
               <a:rPr lang="en-US" dirty="0"/>
               <a:pPr/>
-              <a:t>9/2/2016</a:t>
+              <a:t>9/7/2016</a:t>
             </a:fld>
             <a:endParaRPr lang="en-US" dirty="0"/>
           </a:p>
@@ -10914,7 +10066,7 @@
             <a:fld id="{B61BEF0D-F0BB-DE4B-95CE-6DB70DBA9567}" type="datetimeFigureOut">
               <a:rPr lang="en-US" dirty="0"/>
               <a:pPr/>
-              <a:t>9/2/2016</a:t>
+              <a:t>9/7/2016</a:t>
             </a:fld>
             <a:endParaRPr lang="en-US" dirty="0"/>
           </a:p>
@@ -11747,11 +10899,7 @@
           <a:p>
             <a:r>
               <a:rPr lang="en-US" dirty="0" smtClean="0"/>
-              <a:t>Feature </a:t>
-            </a:r>
-            <a:r>
-              <a:rPr lang="en-US" smtClean="0"/>
-              <a:t>definition and extraction</a:t>
+              <a:t>Feature definition and extraction</a:t>
             </a:r>
             <a:endParaRPr lang="en-US" dirty="0"/>
           </a:p>
@@ -11793,6 +10941,943 @@
       </p:par>
     </p:tnLst>
   </p:timing>
+</p:sld>
+</file>
+
+<file path=ppt/slides/slide13.xml><?xml version="1.0" encoding="utf-8"?>
+<p:sld xmlns:a="http://schemas.openxmlformats.org/drawingml/2006/main" xmlns:r="http://schemas.openxmlformats.org/officeDocument/2006/relationships" xmlns:p="http://schemas.openxmlformats.org/presentationml/2006/main">
+  <p:cSld>
+    <p:spTree>
+      <p:nvGrpSpPr>
+        <p:cNvPr id="1" name=""/>
+        <p:cNvGrpSpPr/>
+        <p:nvPr/>
+      </p:nvGrpSpPr>
+      <p:grpSpPr>
+        <a:xfrm>
+          <a:off x="0" y="0"/>
+          <a:ext cx="0" cy="0"/>
+          <a:chOff x="0" y="0"/>
+          <a:chExt cx="0" cy="0"/>
+        </a:xfrm>
+      </p:grpSpPr>
+      <p:sp>
+        <p:nvSpPr>
+          <p:cNvPr id="4" name="Título 3"/>
+          <p:cNvSpPr>
+            <a:spLocks noGrp="1"/>
+          </p:cNvSpPr>
+          <p:nvPr>
+            <p:ph type="title"/>
+          </p:nvPr>
+        </p:nvSpPr>
+        <p:spPr/>
+        <p:txBody>
+          <a:bodyPr/>
+          <a:lstStyle/>
+          <a:p>
+            <a:r>
+              <a:rPr lang="en-US" dirty="0"/>
+              <a:t>Feature definition and extraction</a:t>
+            </a:r>
+          </a:p>
+        </p:txBody>
+      </p:sp>
+      <p:sp>
+        <p:nvSpPr>
+          <p:cNvPr id="5" name="Marcador de contenido 4"/>
+          <p:cNvSpPr>
+            <a:spLocks noGrp="1"/>
+          </p:cNvSpPr>
+          <p:nvPr>
+            <p:ph idx="1"/>
+          </p:nvPr>
+        </p:nvSpPr>
+        <p:spPr/>
+        <p:txBody>
+          <a:bodyPr/>
+          <a:lstStyle/>
+          <a:p>
+            <a:r>
+              <a:rPr lang="en-US" dirty="0" smtClean="0"/>
+              <a:t>For classification purposes we have to define some features to compute from the segmented hand images.</a:t>
+            </a:r>
+          </a:p>
+          <a:p>
+            <a:endParaRPr lang="en-US" dirty="0"/>
+          </a:p>
+          <a:p>
+            <a:r>
+              <a:rPr lang="en-US" dirty="0" smtClean="0"/>
+              <a:t>We have to study which are the best features commonly used in image processing to use them in this problem.</a:t>
+            </a:r>
+          </a:p>
+          <a:p>
+            <a:pPr lvl="1"/>
+            <a:r>
+              <a:rPr lang="en-US" dirty="0" smtClean="0"/>
+              <a:t>Laplace filter.</a:t>
+            </a:r>
+          </a:p>
+          <a:p>
+            <a:pPr lvl="1"/>
+            <a:r>
+              <a:rPr lang="en-US" dirty="0" smtClean="0"/>
+              <a:t>Gabor filter.</a:t>
+            </a:r>
+          </a:p>
+          <a:p>
+            <a:pPr lvl="1"/>
+            <a:r>
+              <a:rPr lang="en-US" dirty="0" smtClean="0"/>
+              <a:t>Fourier Transform.</a:t>
+            </a:r>
+          </a:p>
+          <a:p>
+            <a:pPr lvl="1"/>
+            <a:r>
+              <a:rPr lang="en-US" dirty="0" smtClean="0"/>
+              <a:t>…</a:t>
+            </a:r>
+            <a:endParaRPr lang="en-US" dirty="0"/>
+          </a:p>
+        </p:txBody>
+      </p:sp>
+    </p:spTree>
+    <p:extLst>
+      <p:ext uri="{BB962C8B-B14F-4D97-AF65-F5344CB8AC3E}">
+        <p14:creationId xmlns:p14="http://schemas.microsoft.com/office/powerpoint/2010/main" val="2862672934"/>
+      </p:ext>
+    </p:extLst>
+  </p:cSld>
+  <p:clrMapOvr>
+    <a:masterClrMapping/>
+  </p:clrMapOvr>
+</p:sld>
+</file>
+
+<file path=ppt/slides/slide14.xml><?xml version="1.0" encoding="utf-8"?>
+<p:sld xmlns:a="http://schemas.openxmlformats.org/drawingml/2006/main" xmlns:r="http://schemas.openxmlformats.org/officeDocument/2006/relationships" xmlns:p="http://schemas.openxmlformats.org/presentationml/2006/main">
+  <p:cSld>
+    <p:spTree>
+      <p:nvGrpSpPr>
+        <p:cNvPr id="1" name=""/>
+        <p:cNvGrpSpPr/>
+        <p:nvPr/>
+      </p:nvGrpSpPr>
+      <p:grpSpPr>
+        <a:xfrm>
+          <a:off x="0" y="0"/>
+          <a:ext cx="0" cy="0"/>
+          <a:chOff x="0" y="0"/>
+          <a:chExt cx="0" cy="0"/>
+        </a:xfrm>
+      </p:grpSpPr>
+      <p:sp>
+        <p:nvSpPr>
+          <p:cNvPr id="2" name="Título 1"/>
+          <p:cNvSpPr>
+            <a:spLocks noGrp="1"/>
+          </p:cNvSpPr>
+          <p:nvPr>
+            <p:ph type="title"/>
+          </p:nvPr>
+        </p:nvSpPr>
+        <p:spPr/>
+        <p:txBody>
+          <a:bodyPr/>
+          <a:lstStyle/>
+          <a:p>
+            <a:r>
+              <a:rPr lang="en-US" dirty="0" smtClean="0"/>
+              <a:t>Features – Laplace Filter</a:t>
+            </a:r>
+            <a:endParaRPr lang="en-US" dirty="0"/>
+          </a:p>
+        </p:txBody>
+      </p:sp>
+      <p:sp>
+        <p:nvSpPr>
+          <p:cNvPr id="3" name="Marcador de contenido 2"/>
+          <p:cNvSpPr>
+            <a:spLocks noGrp="1"/>
+          </p:cNvSpPr>
+          <p:nvPr>
+            <p:ph idx="1"/>
+          </p:nvPr>
+        </p:nvSpPr>
+        <p:spPr/>
+        <p:txBody>
+          <a:bodyPr/>
+          <a:lstStyle/>
+          <a:p>
+            <a:r>
+              <a:rPr lang="en-US" dirty="0" smtClean="0"/>
+              <a:t>The </a:t>
+            </a:r>
+            <a:r>
+              <a:rPr lang="en-US" dirty="0" err="1" smtClean="0"/>
+              <a:t>laplacian</a:t>
+            </a:r>
+            <a:r>
+              <a:rPr lang="en-US" dirty="0" smtClean="0"/>
+              <a:t> matrix usually is used to detect the edges or borders in the image.</a:t>
+            </a:r>
+            <a:endParaRPr lang="en-US" dirty="0"/>
+          </a:p>
+        </p:txBody>
+      </p:sp>
+      <p:pic>
+        <p:nvPicPr>
+          <p:cNvPr id="4" name="Imagen 3"/>
+          <p:cNvPicPr>
+            <a:picLocks noChangeAspect="1"/>
+          </p:cNvPicPr>
+          <p:nvPr/>
+        </p:nvPicPr>
+        <p:blipFill>
+          <a:blip r:embed="rId2">
+            <a:extLst>
+              <a:ext uri="{28A0092B-C50C-407E-A947-70E740481C1C}">
+                <a14:useLocalDpi xmlns:a14="http://schemas.microsoft.com/office/drawing/2010/main" val="0"/>
+              </a:ext>
+            </a:extLst>
+          </a:blip>
+          <a:stretch>
+            <a:fillRect/>
+          </a:stretch>
+        </p:blipFill>
+        <p:spPr>
+          <a:xfrm>
+            <a:off x="1859591" y="3119718"/>
+            <a:ext cx="3020104" cy="3020104"/>
+          </a:xfrm>
+          <a:prstGeom prst="rect">
+            <a:avLst/>
+          </a:prstGeom>
+        </p:spPr>
+      </p:pic>
+      <p:pic>
+        <p:nvPicPr>
+          <p:cNvPr id="5" name="Imagen 4"/>
+          <p:cNvPicPr>
+            <a:picLocks noChangeAspect="1"/>
+          </p:cNvPicPr>
+          <p:nvPr/>
+        </p:nvPicPr>
+        <p:blipFill>
+          <a:blip r:embed="rId3">
+            <a:extLst>
+              <a:ext uri="{28A0092B-C50C-407E-A947-70E740481C1C}">
+                <a14:useLocalDpi xmlns:a14="http://schemas.microsoft.com/office/drawing/2010/main" val="0"/>
+              </a:ext>
+            </a:extLst>
+          </a:blip>
+          <a:stretch>
+            <a:fillRect/>
+          </a:stretch>
+        </p:blipFill>
+        <p:spPr>
+          <a:xfrm>
+            <a:off x="8014947" y="3119718"/>
+            <a:ext cx="3020105" cy="3020105"/>
+          </a:xfrm>
+          <a:prstGeom prst="rect">
+            <a:avLst/>
+          </a:prstGeom>
+        </p:spPr>
+      </p:pic>
+      <p:cxnSp>
+        <p:nvCxnSpPr>
+          <p:cNvPr id="7" name="Conector recto de flecha 6"/>
+          <p:cNvCxnSpPr/>
+          <p:nvPr/>
+        </p:nvCxnSpPr>
+        <p:spPr>
+          <a:xfrm>
+            <a:off x="5184000" y="4629770"/>
+            <a:ext cx="2508202" cy="1"/>
+          </a:xfrm>
+          <a:prstGeom prst="straightConnector1">
+            <a:avLst/>
+          </a:prstGeom>
+          <a:ln w="76200">
+            <a:solidFill>
+              <a:schemeClr val="tx2"/>
+            </a:solidFill>
+            <a:tailEnd type="triangle"/>
+          </a:ln>
+        </p:spPr>
+        <p:style>
+          <a:lnRef idx="1">
+            <a:schemeClr val="accent2"/>
+          </a:lnRef>
+          <a:fillRef idx="0">
+            <a:schemeClr val="accent2"/>
+          </a:fillRef>
+          <a:effectRef idx="0">
+            <a:schemeClr val="accent2"/>
+          </a:effectRef>
+          <a:fontRef idx="minor">
+            <a:schemeClr val="tx1"/>
+          </a:fontRef>
+        </p:style>
+      </p:cxnSp>
+      <mc:AlternateContent xmlns:mc="http://schemas.openxmlformats.org/markup-compatibility/2006" xmlns:a14="http://schemas.microsoft.com/office/drawing/2010/main">
+        <mc:Choice Requires="a14">
+          <p:sp>
+            <p:nvSpPr>
+              <p:cNvPr id="8" name="CuadroTexto 7"/>
+              <p:cNvSpPr txBox="1"/>
+              <p:nvPr/>
+            </p:nvSpPr>
+            <p:spPr>
+              <a:xfrm>
+                <a:off x="5890771" y="3416611"/>
+                <a:ext cx="1094659" cy="732573"/>
+              </a:xfrm>
+              <a:prstGeom prst="rect">
+                <a:avLst/>
+              </a:prstGeom>
+              <a:noFill/>
+            </p:spPr>
+            <p:txBody>
+              <a:bodyPr wrap="none" lIns="0" tIns="0" rIns="0" bIns="0" rtlCol="0">
+                <a:spAutoFit/>
+              </a:bodyPr>
+              <a:lstStyle/>
+              <a:p>
+                <a:pPr/>
+                <a14:m>
+                  <m:oMathPara xmlns:m="http://schemas.openxmlformats.org/officeDocument/2006/math">
+                    <m:oMathParaPr>
+                      <m:jc m:val="centerGroup"/>
+                    </m:oMathParaPr>
+                    <m:oMath xmlns:m="http://schemas.openxmlformats.org/officeDocument/2006/math">
+                      <m:d>
+                        <m:dPr>
+                          <m:begChr m:val="["/>
+                          <m:endChr m:val="]"/>
+                          <m:ctrlPr>
+                            <a:rPr lang="en-US" i="1" smtClean="0">
+                              <a:latin typeface="Cambria Math" panose="02040503050406030204" pitchFamily="18" charset="0"/>
+                            </a:rPr>
+                          </m:ctrlPr>
+                        </m:dPr>
+                        <m:e>
+                          <m:m>
+                            <m:mPr>
+                              <m:mcs>
+                                <m:mc>
+                                  <m:mcPr>
+                                    <m:count m:val="3"/>
+                                    <m:mcJc m:val="center"/>
+                                  </m:mcPr>
+                                </m:mc>
+                              </m:mcs>
+                              <m:ctrlPr>
+                                <a:rPr lang="en-US" i="1">
+                                  <a:latin typeface="Cambria Math" panose="02040503050406030204" pitchFamily="18" charset="0"/>
+                                </a:rPr>
+                              </m:ctrlPr>
+                            </m:mPr>
+                            <m:mr>
+                              <m:e>
+                                <m:r>
+                                  <m:rPr>
+                                    <m:brk m:alnAt="7"/>
+                                  </m:rPr>
+                                  <a:rPr lang="es-ES" i="1">
+                                    <a:latin typeface="Cambria Math" panose="02040503050406030204" pitchFamily="18" charset="0"/>
+                                  </a:rPr>
+                                  <m:t>0</m:t>
+                                </m:r>
+                              </m:e>
+                              <m:e>
+                                <m:r>
+                                  <a:rPr lang="es-ES" i="1">
+                                    <a:latin typeface="Cambria Math" panose="02040503050406030204" pitchFamily="18" charset="0"/>
+                                  </a:rPr>
+                                  <m:t>1</m:t>
+                                </m:r>
+                              </m:e>
+                              <m:e>
+                                <m:r>
+                                  <a:rPr lang="es-ES" i="1">
+                                    <a:latin typeface="Cambria Math" panose="02040503050406030204" pitchFamily="18" charset="0"/>
+                                  </a:rPr>
+                                  <m:t>0</m:t>
+                                </m:r>
+                              </m:e>
+                            </m:mr>
+                            <m:mr>
+                              <m:e>
+                                <m:r>
+                                  <a:rPr lang="es-ES" i="1">
+                                    <a:latin typeface="Cambria Math" panose="02040503050406030204" pitchFamily="18" charset="0"/>
+                                  </a:rPr>
+                                  <m:t>1</m:t>
+                                </m:r>
+                              </m:e>
+                              <m:e>
+                                <m:r>
+                                  <a:rPr lang="es-ES" i="1">
+                                    <a:latin typeface="Cambria Math" panose="02040503050406030204" pitchFamily="18" charset="0"/>
+                                  </a:rPr>
+                                  <m:t>4</m:t>
+                                </m:r>
+                              </m:e>
+                              <m:e>
+                                <m:r>
+                                  <a:rPr lang="es-ES" i="1">
+                                    <a:latin typeface="Cambria Math" panose="02040503050406030204" pitchFamily="18" charset="0"/>
+                                  </a:rPr>
+                                  <m:t>1</m:t>
+                                </m:r>
+                              </m:e>
+                            </m:mr>
+                            <m:mr>
+                              <m:e>
+                                <m:r>
+                                  <a:rPr lang="es-ES" i="1">
+                                    <a:latin typeface="Cambria Math" panose="02040503050406030204" pitchFamily="18" charset="0"/>
+                                  </a:rPr>
+                                  <m:t>0</m:t>
+                                </m:r>
+                              </m:e>
+                              <m:e>
+                                <m:r>
+                                  <a:rPr lang="es-ES" i="1">
+                                    <a:latin typeface="Cambria Math" panose="02040503050406030204" pitchFamily="18" charset="0"/>
+                                  </a:rPr>
+                                  <m:t>1</m:t>
+                                </m:r>
+                              </m:e>
+                              <m:e>
+                                <m:r>
+                                  <a:rPr lang="es-ES" i="1">
+                                    <a:latin typeface="Cambria Math" panose="02040503050406030204" pitchFamily="18" charset="0"/>
+                                  </a:rPr>
+                                  <m:t>0</m:t>
+                                </m:r>
+                              </m:e>
+                            </m:mr>
+                          </m:m>
+                        </m:e>
+                      </m:d>
+                    </m:oMath>
+                  </m:oMathPara>
+                </a14:m>
+                <a:endParaRPr lang="en-US" dirty="0"/>
+              </a:p>
+            </p:txBody>
+          </p:sp>
+        </mc:Choice>
+        <mc:Fallback xmlns="">
+          <p:sp>
+            <p:nvSpPr>
+              <p:cNvPr id="8" name="CuadroTexto 7"/>
+              <p:cNvSpPr txBox="1">
+                <a:spLocks noRot="1" noChangeAspect="1" noMove="1" noResize="1" noEditPoints="1" noAdjustHandles="1" noChangeArrowheads="1" noChangeShapeType="1" noTextEdit="1"/>
+              </p:cNvSpPr>
+              <p:nvPr/>
+            </p:nvSpPr>
+            <p:spPr>
+              <a:xfrm>
+                <a:off x="5890771" y="3416611"/>
+                <a:ext cx="1094659" cy="732573"/>
+              </a:xfrm>
+              <a:prstGeom prst="rect">
+                <a:avLst/>
+              </a:prstGeom>
+              <a:blipFill rotWithShape="0">
+                <a:blip r:embed="rId4"/>
+                <a:stretch>
+                  <a:fillRect/>
+                </a:stretch>
+              </a:blipFill>
+            </p:spPr>
+            <p:txBody>
+              <a:bodyPr/>
+              <a:lstStyle/>
+              <a:p>
+                <a:r>
+                  <a:rPr lang="en-US">
+                    <a:noFill/>
+                  </a:rPr>
+                  <a:t> </a:t>
+                </a:r>
+              </a:p>
+            </p:txBody>
+          </p:sp>
+        </mc:Fallback>
+      </mc:AlternateContent>
+      <p:sp>
+        <p:nvSpPr>
+          <p:cNvPr id="10" name="CuadroTexto 9"/>
+          <p:cNvSpPr txBox="1"/>
+          <p:nvPr/>
+        </p:nvSpPr>
+        <p:spPr>
+          <a:xfrm>
+            <a:off x="5697181" y="4207693"/>
+            <a:ext cx="1481838" cy="307777"/>
+          </a:xfrm>
+          <a:prstGeom prst="rect">
+            <a:avLst/>
+          </a:prstGeom>
+          <a:noFill/>
+        </p:spPr>
+        <p:txBody>
+          <a:bodyPr wrap="square" rtlCol="0">
+            <a:spAutoFit/>
+          </a:bodyPr>
+          <a:lstStyle/>
+          <a:p>
+            <a:r>
+              <a:rPr lang="en-US" sz="1400" dirty="0" smtClean="0"/>
+              <a:t>Laplace matrix</a:t>
+            </a:r>
+            <a:endParaRPr lang="en-US" sz="1400" dirty="0"/>
+          </a:p>
+        </p:txBody>
+      </p:sp>
+    </p:spTree>
+    <p:extLst>
+      <p:ext uri="{BB962C8B-B14F-4D97-AF65-F5344CB8AC3E}">
+        <p14:creationId xmlns:p14="http://schemas.microsoft.com/office/powerpoint/2010/main" val="1195804831"/>
+      </p:ext>
+    </p:extLst>
+  </p:cSld>
+  <p:clrMapOvr>
+    <a:masterClrMapping/>
+  </p:clrMapOvr>
+</p:sld>
+</file>
+
+<file path=ppt/slides/slide15.xml><?xml version="1.0" encoding="utf-8"?>
+<p:sld xmlns:a="http://schemas.openxmlformats.org/drawingml/2006/main" xmlns:r="http://schemas.openxmlformats.org/officeDocument/2006/relationships" xmlns:p="http://schemas.openxmlformats.org/presentationml/2006/main">
+  <p:cSld>
+    <p:spTree>
+      <p:nvGrpSpPr>
+        <p:cNvPr id="1" name=""/>
+        <p:cNvGrpSpPr/>
+        <p:nvPr/>
+      </p:nvGrpSpPr>
+      <p:grpSpPr>
+        <a:xfrm>
+          <a:off x="0" y="0"/>
+          <a:ext cx="0" cy="0"/>
+          <a:chOff x="0" y="0"/>
+          <a:chExt cx="0" cy="0"/>
+        </a:xfrm>
+      </p:grpSpPr>
+      <p:sp>
+        <p:nvSpPr>
+          <p:cNvPr id="2" name="Título 1"/>
+          <p:cNvSpPr>
+            <a:spLocks noGrp="1"/>
+          </p:cNvSpPr>
+          <p:nvPr>
+            <p:ph type="title"/>
+          </p:nvPr>
+        </p:nvSpPr>
+        <p:spPr/>
+        <p:txBody>
+          <a:bodyPr/>
+          <a:lstStyle/>
+          <a:p>
+            <a:r>
+              <a:rPr lang="en-US" dirty="0" smtClean="0"/>
+              <a:t>Features – Gabor filter</a:t>
+            </a:r>
+            <a:endParaRPr lang="en-US" dirty="0"/>
+          </a:p>
+        </p:txBody>
+      </p:sp>
+      <p:sp>
+        <p:nvSpPr>
+          <p:cNvPr id="3" name="Marcador de contenido 2"/>
+          <p:cNvSpPr>
+            <a:spLocks noGrp="1"/>
+          </p:cNvSpPr>
+          <p:nvPr>
+            <p:ph idx="1"/>
+          </p:nvPr>
+        </p:nvSpPr>
+        <p:spPr/>
+        <p:txBody>
+          <a:bodyPr/>
+          <a:lstStyle/>
+          <a:p>
+            <a:r>
+              <a:rPr lang="en-US" dirty="0" smtClean="0"/>
+              <a:t>The Gabor filter has been used for edge detection in the frequency domain and for face recognition.</a:t>
+            </a:r>
+          </a:p>
+          <a:p>
+            <a:pPr lvl="1"/>
+            <a:r>
+              <a:rPr lang="en-US" dirty="0" smtClean="0"/>
+              <a:t>This filter uses different frequencies and orientations to detect patterns in the image.</a:t>
+            </a:r>
+            <a:endParaRPr lang="en-US" dirty="0"/>
+          </a:p>
+        </p:txBody>
+      </p:sp>
+      <p:pic>
+        <p:nvPicPr>
+          <p:cNvPr id="4" name="Imagen 3"/>
+          <p:cNvPicPr>
+            <a:picLocks noChangeAspect="1"/>
+          </p:cNvPicPr>
+          <p:nvPr/>
+        </p:nvPicPr>
+        <p:blipFill rotWithShape="1">
+          <a:blip r:embed="rId2">
+            <a:extLst>
+              <a:ext uri="{28A0092B-C50C-407E-A947-70E740481C1C}">
+                <a14:useLocalDpi xmlns:a14="http://schemas.microsoft.com/office/drawing/2010/main" val="0"/>
+              </a:ext>
+            </a:extLst>
+          </a:blip>
+          <a:srcRect l="2640" t="7349" r="30436" b="7590"/>
+          <a:stretch/>
+        </p:blipFill>
+        <p:spPr>
+          <a:xfrm>
+            <a:off x="3173599" y="3534972"/>
+            <a:ext cx="6732000" cy="3024000"/>
+          </a:xfrm>
+          <a:prstGeom prst="rect">
+            <a:avLst/>
+          </a:prstGeom>
+        </p:spPr>
+      </p:pic>
+    </p:spTree>
+    <p:extLst>
+      <p:ext uri="{BB962C8B-B14F-4D97-AF65-F5344CB8AC3E}">
+        <p14:creationId xmlns:p14="http://schemas.microsoft.com/office/powerpoint/2010/main" val="3479292459"/>
+      </p:ext>
+    </p:extLst>
+  </p:cSld>
+  <p:clrMapOvr>
+    <a:masterClrMapping/>
+  </p:clrMapOvr>
+</p:sld>
+</file>
+
+<file path=ppt/slides/slide16.xml><?xml version="1.0" encoding="utf-8"?>
+<p:sld xmlns:a="http://schemas.openxmlformats.org/drawingml/2006/main" xmlns:r="http://schemas.openxmlformats.org/officeDocument/2006/relationships" xmlns:p="http://schemas.openxmlformats.org/presentationml/2006/main">
+  <p:cSld>
+    <p:spTree>
+      <p:nvGrpSpPr>
+        <p:cNvPr id="1" name=""/>
+        <p:cNvGrpSpPr/>
+        <p:nvPr/>
+      </p:nvGrpSpPr>
+      <p:grpSpPr>
+        <a:xfrm>
+          <a:off x="0" y="0"/>
+          <a:ext cx="0" cy="0"/>
+          <a:chOff x="0" y="0"/>
+          <a:chExt cx="0" cy="0"/>
+        </a:xfrm>
+      </p:grpSpPr>
+      <p:sp>
+        <p:nvSpPr>
+          <p:cNvPr id="2" name="Título 1"/>
+          <p:cNvSpPr>
+            <a:spLocks noGrp="1"/>
+          </p:cNvSpPr>
+          <p:nvPr>
+            <p:ph type="title"/>
+          </p:nvPr>
+        </p:nvSpPr>
+        <p:spPr/>
+        <p:txBody>
+          <a:bodyPr/>
+          <a:lstStyle/>
+          <a:p>
+            <a:r>
+              <a:rPr lang="en-US" dirty="0" smtClean="0"/>
+              <a:t>Features – Fourier transform</a:t>
+            </a:r>
+            <a:endParaRPr lang="en-US" dirty="0"/>
+          </a:p>
+        </p:txBody>
+      </p:sp>
+      <p:sp>
+        <p:nvSpPr>
+          <p:cNvPr id="3" name="Marcador de contenido 2"/>
+          <p:cNvSpPr>
+            <a:spLocks noGrp="1"/>
+          </p:cNvSpPr>
+          <p:nvPr>
+            <p:ph idx="1"/>
+          </p:nvPr>
+        </p:nvSpPr>
+        <p:spPr/>
+        <p:txBody>
+          <a:bodyPr/>
+          <a:lstStyle/>
+          <a:p>
+            <a:r>
+              <a:rPr lang="en-US" dirty="0" smtClean="0"/>
+              <a:t>The Fourier transform encodes the image in the frequency domain. This transformation is invariant to the scale an rotation.</a:t>
+            </a:r>
+            <a:endParaRPr lang="en-US" dirty="0"/>
+          </a:p>
+        </p:txBody>
+      </p:sp>
+      <p:pic>
+        <p:nvPicPr>
+          <p:cNvPr id="4" name="Imagen 3"/>
+          <p:cNvPicPr>
+            <a:picLocks noChangeAspect="1"/>
+          </p:cNvPicPr>
+          <p:nvPr/>
+        </p:nvPicPr>
+        <p:blipFill rotWithShape="1">
+          <a:blip r:embed="rId2">
+            <a:extLst>
+              <a:ext uri="{28A0092B-C50C-407E-A947-70E740481C1C}">
+                <a14:useLocalDpi xmlns:a14="http://schemas.microsoft.com/office/drawing/2010/main" val="0"/>
+              </a:ext>
+            </a:extLst>
+          </a:blip>
+          <a:srcRect l="3510" t="13600" r="56881" b="9379"/>
+          <a:stretch/>
+        </p:blipFill>
+        <p:spPr>
+          <a:xfrm>
+            <a:off x="2651979" y="3357856"/>
+            <a:ext cx="2737095" cy="2781965"/>
+          </a:xfrm>
+          <a:prstGeom prst="rect">
+            <a:avLst/>
+          </a:prstGeom>
+        </p:spPr>
+      </p:pic>
+      <p:pic>
+        <p:nvPicPr>
+          <p:cNvPr id="5" name="Imagen 4"/>
+          <p:cNvPicPr>
+            <a:picLocks noChangeAspect="1"/>
+          </p:cNvPicPr>
+          <p:nvPr/>
+        </p:nvPicPr>
+        <p:blipFill rotWithShape="1">
+          <a:blip r:embed="rId2">
+            <a:extLst>
+              <a:ext uri="{28A0092B-C50C-407E-A947-70E740481C1C}">
+                <a14:useLocalDpi xmlns:a14="http://schemas.microsoft.com/office/drawing/2010/main" val="0"/>
+              </a:ext>
+            </a:extLst>
+          </a:blip>
+          <a:srcRect l="56405" t="13385" r="3407" b="9728"/>
+          <a:stretch/>
+        </p:blipFill>
+        <p:spPr>
+          <a:xfrm>
+            <a:off x="8399656" y="3357857"/>
+            <a:ext cx="2781965" cy="2781965"/>
+          </a:xfrm>
+          <a:prstGeom prst="rect">
+            <a:avLst/>
+          </a:prstGeom>
+        </p:spPr>
+      </p:pic>
+      <p:cxnSp>
+        <p:nvCxnSpPr>
+          <p:cNvPr id="6" name="Conector recto de flecha 5"/>
+          <p:cNvCxnSpPr/>
+          <p:nvPr/>
+        </p:nvCxnSpPr>
+        <p:spPr>
+          <a:xfrm>
+            <a:off x="5640264" y="4629770"/>
+            <a:ext cx="2508202" cy="1"/>
+          </a:xfrm>
+          <a:prstGeom prst="straightConnector1">
+            <a:avLst/>
+          </a:prstGeom>
+          <a:ln w="76200">
+            <a:solidFill>
+              <a:schemeClr val="tx2"/>
+            </a:solidFill>
+            <a:tailEnd type="triangle"/>
+          </a:ln>
+        </p:spPr>
+        <p:style>
+          <a:lnRef idx="1">
+            <a:schemeClr val="accent2"/>
+          </a:lnRef>
+          <a:fillRef idx="0">
+            <a:schemeClr val="accent2"/>
+          </a:fillRef>
+          <a:effectRef idx="0">
+            <a:schemeClr val="accent2"/>
+          </a:effectRef>
+          <a:fontRef idx="minor">
+            <a:schemeClr val="tx1"/>
+          </a:fontRef>
+        </p:style>
+      </p:cxnSp>
+      <p:sp>
+        <p:nvSpPr>
+          <p:cNvPr id="7" name="CuadroTexto 6"/>
+          <p:cNvSpPr txBox="1"/>
+          <p:nvPr/>
+        </p:nvSpPr>
+        <p:spPr>
+          <a:xfrm>
+            <a:off x="5878365" y="4260438"/>
+            <a:ext cx="2032000" cy="369332"/>
+          </a:xfrm>
+          <a:prstGeom prst="rect">
+            <a:avLst/>
+          </a:prstGeom>
+          <a:noFill/>
+        </p:spPr>
+        <p:txBody>
+          <a:bodyPr wrap="square" rtlCol="0">
+            <a:spAutoFit/>
+          </a:bodyPr>
+          <a:lstStyle/>
+          <a:p>
+            <a:r>
+              <a:rPr lang="en-US" dirty="0" smtClean="0"/>
+              <a:t>Fourier Transform</a:t>
+            </a:r>
+            <a:endParaRPr lang="en-US" dirty="0"/>
+          </a:p>
+        </p:txBody>
+      </p:sp>
+    </p:spTree>
+    <p:extLst>
+      <p:ext uri="{BB962C8B-B14F-4D97-AF65-F5344CB8AC3E}">
+        <p14:creationId xmlns:p14="http://schemas.microsoft.com/office/powerpoint/2010/main" val="1824559020"/>
+      </p:ext>
+    </p:extLst>
+  </p:cSld>
+  <p:clrMapOvr>
+    <a:masterClrMapping/>
+  </p:clrMapOvr>
+</p:sld>
+</file>
+
+<file path=ppt/slides/slide17.xml><?xml version="1.0" encoding="utf-8"?>
+<p:sld xmlns:a="http://schemas.openxmlformats.org/drawingml/2006/main" xmlns:r="http://schemas.openxmlformats.org/officeDocument/2006/relationships" xmlns:p="http://schemas.openxmlformats.org/presentationml/2006/main">
+  <p:cSld>
+    <p:spTree>
+      <p:nvGrpSpPr>
+        <p:cNvPr id="1" name=""/>
+        <p:cNvGrpSpPr/>
+        <p:nvPr/>
+      </p:nvGrpSpPr>
+      <p:grpSpPr>
+        <a:xfrm>
+          <a:off x="0" y="0"/>
+          <a:ext cx="0" cy="0"/>
+          <a:chOff x="0" y="0"/>
+          <a:chExt cx="0" cy="0"/>
+        </a:xfrm>
+      </p:grpSpPr>
+      <p:sp>
+        <p:nvSpPr>
+          <p:cNvPr id="2" name="Título 1"/>
+          <p:cNvSpPr>
+            <a:spLocks noGrp="1"/>
+          </p:cNvSpPr>
+          <p:nvPr>
+            <p:ph type="title"/>
+          </p:nvPr>
+        </p:nvSpPr>
+        <p:spPr/>
+        <p:txBody>
+          <a:bodyPr/>
+          <a:lstStyle/>
+          <a:p>
+            <a:r>
+              <a:rPr lang="en-US" dirty="0" smtClean="0"/>
+              <a:t>Features - Custom</a:t>
+            </a:r>
+            <a:endParaRPr lang="en-US" dirty="0"/>
+          </a:p>
+        </p:txBody>
+      </p:sp>
+      <p:sp>
+        <p:nvSpPr>
+          <p:cNvPr id="3" name="Marcador de contenido 2"/>
+          <p:cNvSpPr>
+            <a:spLocks noGrp="1"/>
+          </p:cNvSpPr>
+          <p:nvPr>
+            <p:ph idx="1"/>
+          </p:nvPr>
+        </p:nvSpPr>
+        <p:spPr/>
+        <p:txBody>
+          <a:bodyPr/>
+          <a:lstStyle/>
+          <a:p>
+            <a:r>
+              <a:rPr lang="en-US" dirty="0" smtClean="0"/>
+              <a:t>Instead of using commonly used filters in images processing we can define our own features, like the one it is used in [</a:t>
+            </a:r>
+            <a:r>
+              <a:rPr lang="en-US" dirty="0" err="1" smtClean="0"/>
+              <a:t>RealTimeHandPoseEstimationUsingDepthSensors</a:t>
+            </a:r>
+            <a:r>
+              <a:rPr lang="en-US" dirty="0" smtClean="0"/>
+              <a:t>].</a:t>
+            </a:r>
+            <a:endParaRPr lang="en-US" dirty="0"/>
+          </a:p>
+        </p:txBody>
+      </p:sp>
+      <p:pic>
+        <p:nvPicPr>
+          <p:cNvPr id="4" name="Imagen 3"/>
+          <p:cNvPicPr>
+            <a:picLocks noChangeAspect="1"/>
+          </p:cNvPicPr>
+          <p:nvPr/>
+        </p:nvPicPr>
+        <p:blipFill>
+          <a:blip r:embed="rId2">
+            <a:extLst>
+              <a:ext uri="{28A0092B-C50C-407E-A947-70E740481C1C}">
+                <a14:useLocalDpi xmlns:a14="http://schemas.microsoft.com/office/drawing/2010/main" val="0"/>
+              </a:ext>
+            </a:extLst>
+          </a:blip>
+          <a:stretch>
+            <a:fillRect/>
+          </a:stretch>
+        </p:blipFill>
+        <p:spPr>
+          <a:xfrm>
+            <a:off x="3521782" y="3374187"/>
+            <a:ext cx="6106377" cy="2257740"/>
+          </a:xfrm>
+          <a:prstGeom prst="rect">
+            <a:avLst/>
+          </a:prstGeom>
+        </p:spPr>
+      </p:pic>
+    </p:spTree>
+    <p:extLst>
+      <p:ext uri="{BB962C8B-B14F-4D97-AF65-F5344CB8AC3E}">
+        <p14:creationId xmlns:p14="http://schemas.microsoft.com/office/powerpoint/2010/main" val="2596938891"/>
+      </p:ext>
+    </p:extLst>
+  </p:cSld>
+  <p:clrMapOvr>
+    <a:masterClrMapping/>
+  </p:clrMapOvr>
 </p:sld>
 </file>
 
@@ -12495,7 +12580,7 @@
     </p:spTree>
     <p:extLst>
       <p:ext uri="{BB962C8B-B14F-4D97-AF65-F5344CB8AC3E}">
-        <p14:creationId xmlns:p14="http://schemas.microsoft.com/office/powerpoint/2010/main" val="3911041880"/>
+        <p14:creationId xmlns:p14="http://schemas.microsoft.com/office/powerpoint/2010/main" val="1530661170"/>
       </p:ext>
     </p:extLst>
   </p:cSld>

</xml_diff>

<commit_message>
Training and classification done - Waiting for review
The Training and classification is finished, it is waiting for the
advisor's review.
</commit_message>
<xml_diff>
--- a/ThesisProposal.pptx
+++ b/ThesisProposal.pptx
@@ -22,6 +22,16 @@
     <p:sldId id="270" r:id="rId16"/>
     <p:sldId id="271" r:id="rId17"/>
     <p:sldId id="272" r:id="rId18"/>
+    <p:sldId id="274" r:id="rId19"/>
+    <p:sldId id="275" r:id="rId20"/>
+    <p:sldId id="276" r:id="rId21"/>
+    <p:sldId id="277" r:id="rId22"/>
+    <p:sldId id="278" r:id="rId23"/>
+    <p:sldId id="279" r:id="rId24"/>
+    <p:sldId id="280" r:id="rId25"/>
+    <p:sldId id="281" r:id="rId26"/>
+    <p:sldId id="282" r:id="rId27"/>
+    <p:sldId id="283" r:id="rId28"/>
   </p:sldIdLst>
   <p:sldSz cx="12192000" cy="6858000"/>
   <p:notesSz cx="6858000" cy="9144000"/>
@@ -1448,6 +1458,43 @@
         </a:p>
       </dgm:t>
     </dgm:pt>
+    <dgm:pt modelId="{E74A41AF-1449-4238-8426-6E0024EFD34B}">
+      <dgm:prSet phldrT="[Texto]" custT="1"/>
+      <dgm:spPr/>
+      <dgm:t>
+        <a:bodyPr/>
+        <a:lstStyle/>
+        <a:p>
+          <a:r>
+            <a:rPr lang="en-US" sz="1400" dirty="0" smtClean="0"/>
+            <a:t>Image operations</a:t>
+          </a:r>
+          <a:endParaRPr lang="en-US" sz="1400" dirty="0"/>
+        </a:p>
+      </dgm:t>
+    </dgm:pt>
+    <dgm:pt modelId="{0CD7FFF9-167C-438C-A701-7A2F14EAC247}" type="parTrans" cxnId="{404DA00A-D083-432E-B147-B112E85C8950}">
+      <dgm:prSet/>
+      <dgm:spPr/>
+      <dgm:t>
+        <a:bodyPr/>
+        <a:lstStyle/>
+        <a:p>
+          <a:endParaRPr lang="en-US"/>
+        </a:p>
+      </dgm:t>
+    </dgm:pt>
+    <dgm:pt modelId="{DBA519AA-0487-4BAB-BB00-FC89DB2EDB2F}" type="sibTrans" cxnId="{404DA00A-D083-432E-B147-B112E85C8950}">
+      <dgm:prSet/>
+      <dgm:spPr/>
+      <dgm:t>
+        <a:bodyPr/>
+        <a:lstStyle/>
+        <a:p>
+          <a:endParaRPr lang="en-US"/>
+        </a:p>
+      </dgm:t>
+    </dgm:pt>
     <dgm:pt modelId="{1ADE8E3F-9560-48FC-B9D4-A2A22CC78FC4}" type="pres">
       <dgm:prSet presAssocID="{8926B527-CEC9-406E-B07A-117375327321}" presName="rootnode" presStyleCnt="0">
         <dgm:presLayoutVars>
@@ -1645,15 +1692,15 @@
   </dgm:ptLst>
   <dgm:cxnLst>
     <dgm:cxn modelId="{FD843CAC-ADA6-4C78-8BFC-B248E171B39D}" srcId="{8926B527-CEC9-406E-B07A-117375327321}" destId="{20635D92-A7E6-42FF-A69D-845E61FAD6B0}" srcOrd="1" destOrd="0" parTransId="{0FA60B8A-0A36-43CE-A718-DEF538B062D6}" sibTransId="{B99C56B8-D4C6-494F-A885-DDB356F4C669}"/>
-    <dgm:cxn modelId="{BAAD9A6B-E491-4E15-8864-E95D4154862A}" type="presOf" srcId="{E6BF69DC-492B-43E6-8414-48564B07BCDC}" destId="{6D721470-4ADB-4DC0-B998-80D1CE994CBA}" srcOrd="0" destOrd="1" presId="urn:microsoft.com/office/officeart/2005/8/layout/StepDownProcess"/>
+    <dgm:cxn modelId="{BAAD9A6B-E491-4E15-8864-E95D4154862A}" type="presOf" srcId="{E6BF69DC-492B-43E6-8414-48564B07BCDC}" destId="{6D721470-4ADB-4DC0-B998-80D1CE994CBA}" srcOrd="0" destOrd="2" presId="urn:microsoft.com/office/officeart/2005/8/layout/StepDownProcess"/>
     <dgm:cxn modelId="{9C2B0469-CB22-4260-96A1-275A6E4C8748}" srcId="{8926B527-CEC9-406E-B07A-117375327321}" destId="{2AF14A38-EBB8-4A29-8FB9-36C926A015D3}" srcOrd="2" destOrd="0" parTransId="{31C127DA-86DF-4B0A-90E2-EE3D4BBD0D97}" sibTransId="{7C927F21-289B-4187-838E-36D198865CBB}"/>
     <dgm:cxn modelId="{7F81B638-4971-464D-87DF-AB12DB2F57A5}" type="presOf" srcId="{700B5583-BCA4-4BA1-A1D9-42819BCD3BB8}" destId="{FC5751CB-FE42-4651-8933-7A7CC30B3865}" srcOrd="0" destOrd="0" presId="urn:microsoft.com/office/officeart/2005/8/layout/StepDownProcess"/>
     <dgm:cxn modelId="{5425AC3D-2BBB-4B44-ADC3-3B08D1AE30C7}" srcId="{8926B527-CEC9-406E-B07A-117375327321}" destId="{3F10FAB3-990C-4D5A-942C-BA6A1F5BE04D}" srcOrd="3" destOrd="0" parTransId="{1BC66237-EEB5-41E0-BD25-955582CC9C65}" sibTransId="{3CB11B9D-485D-44F5-929D-31267696D54A}"/>
     <dgm:cxn modelId="{3E494D85-7AA6-40DA-8705-291DA597ED07}" type="presOf" srcId="{2AF14A38-EBB8-4A29-8FB9-36C926A015D3}" destId="{757783AB-7AF3-4E1E-96E7-7BB317946EAF}" srcOrd="0" destOrd="0" presId="urn:microsoft.com/office/officeart/2005/8/layout/StepDownProcess"/>
-    <dgm:cxn modelId="{9611960A-7458-4055-90B1-260C749D6AC3}" srcId="{3F10FAB3-990C-4D5A-942C-BA6A1F5BE04D}" destId="{47ED396D-AF54-4458-981E-B49C03326D8B}" srcOrd="2" destOrd="0" parTransId="{DAAD7875-F546-47A8-ACCF-9F79370BC373}" sibTransId="{CC8B1C29-ACED-4BA1-891F-E05B3B2CB340}"/>
+    <dgm:cxn modelId="{9611960A-7458-4055-90B1-260C749D6AC3}" srcId="{3F10FAB3-990C-4D5A-942C-BA6A1F5BE04D}" destId="{47ED396D-AF54-4458-981E-B49C03326D8B}" srcOrd="3" destOrd="0" parTransId="{DAAD7875-F546-47A8-ACCF-9F79370BC373}" sibTransId="{CC8B1C29-ACED-4BA1-891F-E05B3B2CB340}"/>
     <dgm:cxn modelId="{AF20575A-B2FC-4656-AB73-EDA20CFCA362}" srcId="{2AF14A38-EBB8-4A29-8FB9-36C926A015D3}" destId="{700B5583-BCA4-4BA1-A1D9-42819BCD3BB8}" srcOrd="0" destOrd="0" parTransId="{F6AB3CEF-189F-47E5-9051-A8D4EBF0AC2D}" sibTransId="{269A3462-3903-4FA4-990A-68069C903245}"/>
-    <dgm:cxn modelId="{1F11F0CD-4255-4699-B4AB-B2DC3F671FC7}" type="presOf" srcId="{EECF208A-A3C5-48EF-8325-358C453B900F}" destId="{6D721470-4ADB-4DC0-B998-80D1CE994CBA}" srcOrd="0" destOrd="0" presId="urn:microsoft.com/office/officeart/2005/8/layout/StepDownProcess"/>
-    <dgm:cxn modelId="{30E93360-5D94-4623-BCC1-FC643F5BF56B}" srcId="{3F10FAB3-990C-4D5A-942C-BA6A1F5BE04D}" destId="{E6BF69DC-492B-43E6-8414-48564B07BCDC}" srcOrd="1" destOrd="0" parTransId="{B0843841-BC57-44B1-8A35-F652A43C7EE6}" sibTransId="{F5C398E9-1B21-49D8-8092-78C3E3456B66}"/>
+    <dgm:cxn modelId="{1F11F0CD-4255-4699-B4AB-B2DC3F671FC7}" type="presOf" srcId="{EECF208A-A3C5-48EF-8325-358C453B900F}" destId="{6D721470-4ADB-4DC0-B998-80D1CE994CBA}" srcOrd="0" destOrd="1" presId="urn:microsoft.com/office/officeart/2005/8/layout/StepDownProcess"/>
+    <dgm:cxn modelId="{30E93360-5D94-4623-BCC1-FC643F5BF56B}" srcId="{3F10FAB3-990C-4D5A-942C-BA6A1F5BE04D}" destId="{E6BF69DC-492B-43E6-8414-48564B07BCDC}" srcOrd="2" destOrd="0" parTransId="{B0843841-BC57-44B1-8A35-F652A43C7EE6}" sibTransId="{F5C398E9-1B21-49D8-8092-78C3E3456B66}"/>
     <dgm:cxn modelId="{74234F59-0FBD-450E-95F4-6BCA562C66EE}" type="presOf" srcId="{20635D92-A7E6-42FF-A69D-845E61FAD6B0}" destId="{93356A06-D76C-4384-9F2C-5C2F152098A1}" srcOrd="0" destOrd="0" presId="urn:microsoft.com/office/officeart/2005/8/layout/StepDownProcess"/>
     <dgm:cxn modelId="{D1734D50-95F0-4772-AE4E-EC41E5265640}" type="presOf" srcId="{814E853B-4A87-4A8A-9A7F-CDC26721EFE8}" destId="{FC5751CB-FE42-4651-8933-7A7CC30B3865}" srcOrd="0" destOrd="3" presId="urn:microsoft.com/office/officeart/2005/8/layout/StepDownProcess"/>
     <dgm:cxn modelId="{36FDDFFE-C642-4169-A8D4-523F83FBEFCC}" type="presOf" srcId="{5460DD9B-F6BD-4AFC-A266-DE538CF183D7}" destId="{B10D8F44-7CD1-463F-B8DE-A0A1D3101362}" srcOrd="0" destOrd="0" presId="urn:microsoft.com/office/officeart/2005/8/layout/StepDownProcess"/>
@@ -1662,10 +1709,12 @@
     <dgm:cxn modelId="{976A6CE8-2777-45F6-81E7-DAF8835C4314}" type="presOf" srcId="{107C4D31-BE66-4025-8AB3-B45B08425CF1}" destId="{7105A76C-D0A3-4EC3-AC13-A5A8D4365BE4}" srcOrd="0" destOrd="2" presId="urn:microsoft.com/office/officeart/2005/8/layout/StepDownProcess"/>
     <dgm:cxn modelId="{E448ADAF-83FC-4398-94D3-651D5BD35942}" type="presOf" srcId="{D294F512-11CD-4FBC-AF66-3082548BC7E6}" destId="{110872B9-258E-4C73-85A1-643C30A727EF}" srcOrd="0" destOrd="0" presId="urn:microsoft.com/office/officeart/2005/8/layout/StepDownProcess"/>
     <dgm:cxn modelId="{C27FB73D-DF4E-43D9-93BE-9B85612DACEA}" srcId="{5460DD9B-F6BD-4AFC-A266-DE538CF183D7}" destId="{D294F512-11CD-4FBC-AF66-3082548BC7E6}" srcOrd="0" destOrd="0" parTransId="{76BBB533-3E4D-43E7-8DF5-755F1B76FE68}" sibTransId="{421BE465-B086-44FB-B104-9703ADC6109B}"/>
+    <dgm:cxn modelId="{404DA00A-D083-432E-B147-B112E85C8950}" srcId="{3F10FAB3-990C-4D5A-942C-BA6A1F5BE04D}" destId="{E74A41AF-1449-4238-8426-6E0024EFD34B}" srcOrd="0" destOrd="0" parTransId="{0CD7FFF9-167C-438C-A701-7A2F14EAC247}" sibTransId="{DBA519AA-0487-4BAB-BB00-FC89DB2EDB2F}"/>
     <dgm:cxn modelId="{D9EFBFB7-3BF0-4FD3-8AF5-5B5E21801EC8}" srcId="{2AF14A38-EBB8-4A29-8FB9-36C926A015D3}" destId="{C14562D0-284D-4440-A8B2-5AF3E9133240}" srcOrd="2" destOrd="0" parTransId="{21D71D77-472E-44DA-96CA-A2A796F84A1B}" sibTransId="{033D6873-94D1-4DA9-A7FE-13EE91EA9F16}"/>
     <dgm:cxn modelId="{9CB78540-5114-4E94-8DBC-361296A4E676}" srcId="{2AF14A38-EBB8-4A29-8FB9-36C926A015D3}" destId="{814E853B-4A87-4A8A-9A7F-CDC26721EFE8}" srcOrd="3" destOrd="0" parTransId="{7A2DED5C-F802-411C-955E-49E166C04385}" sibTransId="{0FEE515E-9914-4125-83CD-AADBED11560C}"/>
-    <dgm:cxn modelId="{F040B3AF-5CC6-4D87-8CFC-4770FDECA5CA}" srcId="{3F10FAB3-990C-4D5A-942C-BA6A1F5BE04D}" destId="{EECF208A-A3C5-48EF-8325-358C453B900F}" srcOrd="0" destOrd="0" parTransId="{C3976FD7-23B6-413C-ACCC-6E2AA6FABDEB}" sibTransId="{2A06A584-3E70-4F88-B692-5D6A0E74683A}"/>
-    <dgm:cxn modelId="{2A7F0EF8-B224-4450-8EC0-9098DC416F23}" type="presOf" srcId="{47ED396D-AF54-4458-981E-B49C03326D8B}" destId="{6D721470-4ADB-4DC0-B998-80D1CE994CBA}" srcOrd="0" destOrd="2" presId="urn:microsoft.com/office/officeart/2005/8/layout/StepDownProcess"/>
+    <dgm:cxn modelId="{F040B3AF-5CC6-4D87-8CFC-4770FDECA5CA}" srcId="{3F10FAB3-990C-4D5A-942C-BA6A1F5BE04D}" destId="{EECF208A-A3C5-48EF-8325-358C453B900F}" srcOrd="1" destOrd="0" parTransId="{C3976FD7-23B6-413C-ACCC-6E2AA6FABDEB}" sibTransId="{2A06A584-3E70-4F88-B692-5D6A0E74683A}"/>
+    <dgm:cxn modelId="{2A7F0EF8-B224-4450-8EC0-9098DC416F23}" type="presOf" srcId="{47ED396D-AF54-4458-981E-B49C03326D8B}" destId="{6D721470-4ADB-4DC0-B998-80D1CE994CBA}" srcOrd="0" destOrd="3" presId="urn:microsoft.com/office/officeart/2005/8/layout/StepDownProcess"/>
+    <dgm:cxn modelId="{FBACA0B0-192B-416A-97E7-80C58BFE55CF}" type="presOf" srcId="{E74A41AF-1449-4238-8426-6E0024EFD34B}" destId="{6D721470-4ADB-4DC0-B998-80D1CE994CBA}" srcOrd="0" destOrd="0" presId="urn:microsoft.com/office/officeart/2005/8/layout/StepDownProcess"/>
     <dgm:cxn modelId="{A5A9116A-EAD9-4ADD-990C-382F42B92D37}" type="presOf" srcId="{3F10FAB3-990C-4D5A-942C-BA6A1F5BE04D}" destId="{BCDFEA53-6FB2-4975-9B6E-AC0008783243}" srcOrd="0" destOrd="0" presId="urn:microsoft.com/office/officeart/2005/8/layout/StepDownProcess"/>
     <dgm:cxn modelId="{A61F2900-D345-4019-8695-E94C30464651}" type="presOf" srcId="{89E9BDC2-40C9-46F3-9D14-5C92AC5F462B}" destId="{FC5751CB-FE42-4651-8933-7A7CC30B3865}" srcOrd="0" destOrd="1" presId="urn:microsoft.com/office/officeart/2005/8/layout/StepDownProcess"/>
     <dgm:cxn modelId="{D0F61B97-7F49-4FA8-9553-EEF2D2A17FB4}" srcId="{2AF14A38-EBB8-4A29-8FB9-36C926A015D3}" destId="{89E9BDC2-40C9-46F3-9D14-5C92AC5F462B}" srcOrd="1" destOrd="0" parTransId="{658CCB6D-C2F6-4199-B652-AA3644FC84EE}" sibTransId="{796569E6-6040-408D-8339-C6B1C1B9B2A2}"/>
@@ -1712,6 +1761,878 @@
       <dsp:cNvGrpSpPr/>
     </dsp:nvGrpSpPr>
     <dsp:grpSpPr/>
+    <dsp:sp modelId="{EE05951C-221F-46FC-9D16-5EBF94B77E36}">
+      <dsp:nvSpPr>
+        <dsp:cNvPr id="0" name=""/>
+        <dsp:cNvSpPr/>
+      </dsp:nvSpPr>
+      <dsp:spPr>
+        <a:xfrm rot="5400000">
+          <a:off x="748826" y="1324028"/>
+          <a:ext cx="1162785" cy="1323789"/>
+        </a:xfrm>
+        <a:prstGeom prst="bentUpArrow">
+          <a:avLst>
+            <a:gd name="adj1" fmla="val 32840"/>
+            <a:gd name="adj2" fmla="val 25000"/>
+            <a:gd name="adj3" fmla="val 35780"/>
+          </a:avLst>
+        </a:prstGeom>
+        <a:solidFill>
+          <a:schemeClr val="accent5">
+            <a:tint val="50000"/>
+            <a:hueOff val="0"/>
+            <a:satOff val="0"/>
+            <a:lumOff val="0"/>
+            <a:alphaOff val="0"/>
+          </a:schemeClr>
+        </a:solidFill>
+        <a:ln w="15875" cap="rnd" cmpd="sng" algn="ctr">
+          <a:solidFill>
+            <a:schemeClr val="lt1">
+              <a:hueOff val="0"/>
+              <a:satOff val="0"/>
+              <a:lumOff val="0"/>
+              <a:alphaOff val="0"/>
+            </a:schemeClr>
+          </a:solidFill>
+          <a:prstDash val="solid"/>
+        </a:ln>
+        <a:effectLst/>
+      </dsp:spPr>
+      <dsp:style>
+        <a:lnRef idx="2">
+          <a:scrgbClr r="0" g="0" b="0"/>
+        </a:lnRef>
+        <a:fillRef idx="1">
+          <a:scrgbClr r="0" g="0" b="0"/>
+        </a:fillRef>
+        <a:effectRef idx="0">
+          <a:scrgbClr r="0" g="0" b="0"/>
+        </a:effectRef>
+        <a:fontRef idx="minor"/>
+      </dsp:style>
+    </dsp:sp>
+    <dsp:sp modelId="{B10D8F44-7CD1-463F-B8DE-A0A1D3101362}">
+      <dsp:nvSpPr>
+        <dsp:cNvPr id="0" name=""/>
+        <dsp:cNvSpPr/>
+      </dsp:nvSpPr>
+      <dsp:spPr>
+        <a:xfrm>
+          <a:off x="440759" y="35058"/>
+          <a:ext cx="1957445" cy="1370148"/>
+        </a:xfrm>
+        <a:prstGeom prst="roundRect">
+          <a:avLst>
+            <a:gd name="adj" fmla="val 16670"/>
+          </a:avLst>
+        </a:prstGeom>
+        <a:solidFill>
+          <a:schemeClr val="accent5">
+            <a:hueOff val="0"/>
+            <a:satOff val="0"/>
+            <a:lumOff val="0"/>
+            <a:alphaOff val="0"/>
+          </a:schemeClr>
+        </a:solidFill>
+        <a:ln w="15875" cap="rnd" cmpd="sng" algn="ctr">
+          <a:solidFill>
+            <a:schemeClr val="lt1">
+              <a:hueOff val="0"/>
+              <a:satOff val="0"/>
+              <a:lumOff val="0"/>
+              <a:alphaOff val="0"/>
+            </a:schemeClr>
+          </a:solidFill>
+          <a:prstDash val="solid"/>
+        </a:ln>
+        <a:effectLst/>
+      </dsp:spPr>
+      <dsp:style>
+        <a:lnRef idx="2">
+          <a:scrgbClr r="0" g="0" b="0"/>
+        </a:lnRef>
+        <a:fillRef idx="1">
+          <a:scrgbClr r="0" g="0" b="0"/>
+        </a:fillRef>
+        <a:effectRef idx="0">
+          <a:scrgbClr r="0" g="0" b="0"/>
+        </a:effectRef>
+        <a:fontRef idx="minor">
+          <a:schemeClr val="lt1"/>
+        </a:fontRef>
+      </dsp:style>
+      <dsp:txBody>
+        <a:bodyPr spcFirstLastPara="0" vert="horz" wrap="square" lIns="72390" tIns="72390" rIns="72390" bIns="72390" numCol="1" spcCol="1270" anchor="ctr" anchorCtr="0">
+          <a:noAutofit/>
+        </a:bodyPr>
+        <a:lstStyle/>
+        <a:p>
+          <a:pPr lvl="0" algn="ctr" defTabSz="844550">
+            <a:lnSpc>
+              <a:spcPct val="90000"/>
+            </a:lnSpc>
+            <a:spcBef>
+              <a:spcPct val="0"/>
+            </a:spcBef>
+            <a:spcAft>
+              <a:spcPct val="35000"/>
+            </a:spcAft>
+          </a:pPr>
+          <a:r>
+            <a:rPr lang="en-US" sz="1900" kern="1200" dirty="0" smtClean="0"/>
+            <a:t>Image capture</a:t>
+          </a:r>
+          <a:endParaRPr lang="en-US" sz="1900" kern="1200" dirty="0"/>
+        </a:p>
+      </dsp:txBody>
+      <dsp:txXfrm>
+        <a:off x="507656" y="101955"/>
+        <a:ext cx="1823651" cy="1236354"/>
+      </dsp:txXfrm>
+    </dsp:sp>
+    <dsp:sp modelId="{110872B9-258E-4C73-85A1-643C30A727EF}">
+      <dsp:nvSpPr>
+        <dsp:cNvPr id="0" name=""/>
+        <dsp:cNvSpPr/>
+      </dsp:nvSpPr>
+      <dsp:spPr>
+        <a:xfrm>
+          <a:off x="2471138" y="165733"/>
+          <a:ext cx="1999358" cy="1107414"/>
+        </a:xfrm>
+        <a:prstGeom prst="rect">
+          <a:avLst/>
+        </a:prstGeom>
+        <a:noFill/>
+        <a:ln>
+          <a:noFill/>
+        </a:ln>
+        <a:effectLst/>
+      </dsp:spPr>
+      <dsp:style>
+        <a:lnRef idx="0">
+          <a:scrgbClr r="0" g="0" b="0"/>
+        </a:lnRef>
+        <a:fillRef idx="0">
+          <a:scrgbClr r="0" g="0" b="0"/>
+        </a:fillRef>
+        <a:effectRef idx="0">
+          <a:scrgbClr r="0" g="0" b="0"/>
+        </a:effectRef>
+        <a:fontRef idx="minor"/>
+      </dsp:style>
+      <dsp:txBody>
+        <a:bodyPr spcFirstLastPara="0" vert="horz" wrap="square" lIns="53340" tIns="53340" rIns="53340" bIns="53340" numCol="1" spcCol="1270" anchor="ctr" anchorCtr="0">
+          <a:noAutofit/>
+        </a:bodyPr>
+        <a:lstStyle/>
+        <a:p>
+          <a:pPr marL="114300" lvl="1" indent="-114300" algn="l" defTabSz="622300">
+            <a:lnSpc>
+              <a:spcPct val="90000"/>
+            </a:lnSpc>
+            <a:spcBef>
+              <a:spcPct val="0"/>
+            </a:spcBef>
+            <a:spcAft>
+              <a:spcPct val="15000"/>
+            </a:spcAft>
+            <a:buChar char="••"/>
+          </a:pPr>
+          <a:r>
+            <a:rPr lang="en-US" sz="1400" kern="1200" dirty="0" smtClean="0"/>
+            <a:t>Ideal world definition</a:t>
+          </a:r>
+          <a:endParaRPr lang="en-US" sz="1400" kern="1200" dirty="0"/>
+        </a:p>
+      </dsp:txBody>
+      <dsp:txXfrm>
+        <a:off x="2471138" y="165733"/>
+        <a:ext cx="1999358" cy="1107414"/>
+      </dsp:txXfrm>
+    </dsp:sp>
+    <dsp:sp modelId="{8EBB6F37-B3D1-4DD1-AAB3-F2E789D04B80}">
+      <dsp:nvSpPr>
+        <dsp:cNvPr id="0" name=""/>
+        <dsp:cNvSpPr/>
+      </dsp:nvSpPr>
+      <dsp:spPr>
+        <a:xfrm rot="5400000">
+          <a:off x="2509924" y="2863157"/>
+          <a:ext cx="1162785" cy="1323789"/>
+        </a:xfrm>
+        <a:prstGeom prst="bentUpArrow">
+          <a:avLst>
+            <a:gd name="adj1" fmla="val 32840"/>
+            <a:gd name="adj2" fmla="val 25000"/>
+            <a:gd name="adj3" fmla="val 35780"/>
+          </a:avLst>
+        </a:prstGeom>
+        <a:solidFill>
+          <a:schemeClr val="accent5">
+            <a:tint val="50000"/>
+            <a:hueOff val="0"/>
+            <a:satOff val="0"/>
+            <a:lumOff val="0"/>
+            <a:alphaOff val="0"/>
+          </a:schemeClr>
+        </a:solidFill>
+        <a:ln w="15875" cap="rnd" cmpd="sng" algn="ctr">
+          <a:solidFill>
+            <a:schemeClr val="lt1">
+              <a:hueOff val="0"/>
+              <a:satOff val="0"/>
+              <a:lumOff val="0"/>
+              <a:alphaOff val="0"/>
+            </a:schemeClr>
+          </a:solidFill>
+          <a:prstDash val="solid"/>
+        </a:ln>
+        <a:effectLst/>
+      </dsp:spPr>
+      <dsp:style>
+        <a:lnRef idx="2">
+          <a:scrgbClr r="0" g="0" b="0"/>
+        </a:lnRef>
+        <a:fillRef idx="1">
+          <a:scrgbClr r="0" g="0" b="0"/>
+        </a:fillRef>
+        <a:effectRef idx="0">
+          <a:scrgbClr r="0" g="0" b="0"/>
+        </a:effectRef>
+        <a:fontRef idx="minor"/>
+      </dsp:style>
+    </dsp:sp>
+    <dsp:sp modelId="{93356A06-D76C-4384-9F2C-5C2F152098A1}">
+      <dsp:nvSpPr>
+        <dsp:cNvPr id="0" name=""/>
+        <dsp:cNvSpPr/>
+      </dsp:nvSpPr>
+      <dsp:spPr>
+        <a:xfrm>
+          <a:off x="2201857" y="1574186"/>
+          <a:ext cx="1957445" cy="1370148"/>
+        </a:xfrm>
+        <a:prstGeom prst="roundRect">
+          <a:avLst>
+            <a:gd name="adj" fmla="val 16670"/>
+          </a:avLst>
+        </a:prstGeom>
+        <a:solidFill>
+          <a:schemeClr val="accent5">
+            <a:hueOff val="0"/>
+            <a:satOff val="0"/>
+            <a:lumOff val="0"/>
+            <a:alphaOff val="0"/>
+          </a:schemeClr>
+        </a:solidFill>
+        <a:ln w="15875" cap="rnd" cmpd="sng" algn="ctr">
+          <a:solidFill>
+            <a:schemeClr val="lt1">
+              <a:hueOff val="0"/>
+              <a:satOff val="0"/>
+              <a:lumOff val="0"/>
+              <a:alphaOff val="0"/>
+            </a:schemeClr>
+          </a:solidFill>
+          <a:prstDash val="solid"/>
+        </a:ln>
+        <a:effectLst/>
+      </dsp:spPr>
+      <dsp:style>
+        <a:lnRef idx="2">
+          <a:scrgbClr r="0" g="0" b="0"/>
+        </a:lnRef>
+        <a:fillRef idx="1">
+          <a:scrgbClr r="0" g="0" b="0"/>
+        </a:fillRef>
+        <a:effectRef idx="0">
+          <a:scrgbClr r="0" g="0" b="0"/>
+        </a:effectRef>
+        <a:fontRef idx="minor">
+          <a:schemeClr val="lt1"/>
+        </a:fontRef>
+      </dsp:style>
+      <dsp:txBody>
+        <a:bodyPr spcFirstLastPara="0" vert="horz" wrap="square" lIns="72390" tIns="72390" rIns="72390" bIns="72390" numCol="1" spcCol="1270" anchor="ctr" anchorCtr="0">
+          <a:noAutofit/>
+        </a:bodyPr>
+        <a:lstStyle/>
+        <a:p>
+          <a:pPr lvl="0" algn="ctr" defTabSz="844550">
+            <a:lnSpc>
+              <a:spcPct val="90000"/>
+            </a:lnSpc>
+            <a:spcBef>
+              <a:spcPct val="0"/>
+            </a:spcBef>
+            <a:spcAft>
+              <a:spcPct val="35000"/>
+            </a:spcAft>
+          </a:pPr>
+          <a:r>
+            <a:rPr lang="en-US" sz="1900" kern="1200" dirty="0" smtClean="0"/>
+            <a:t>Preprocessing</a:t>
+          </a:r>
+          <a:endParaRPr lang="en-US" sz="1900" kern="1200" dirty="0"/>
+        </a:p>
+      </dsp:txBody>
+      <dsp:txXfrm>
+        <a:off x="2268754" y="1641083"/>
+        <a:ext cx="1823651" cy="1236354"/>
+      </dsp:txXfrm>
+    </dsp:sp>
+    <dsp:sp modelId="{7105A76C-D0A3-4EC3-AC13-A5A8D4365BE4}">
+      <dsp:nvSpPr>
+        <dsp:cNvPr id="0" name=""/>
+        <dsp:cNvSpPr/>
+      </dsp:nvSpPr>
+      <dsp:spPr>
+        <a:xfrm>
+          <a:off x="4210640" y="1717397"/>
+          <a:ext cx="3402745" cy="1107414"/>
+        </a:xfrm>
+        <a:prstGeom prst="rect">
+          <a:avLst/>
+        </a:prstGeom>
+        <a:noFill/>
+        <a:ln>
+          <a:noFill/>
+        </a:ln>
+        <a:effectLst/>
+      </dsp:spPr>
+      <dsp:style>
+        <a:lnRef idx="0">
+          <a:scrgbClr r="0" g="0" b="0"/>
+        </a:lnRef>
+        <a:fillRef idx="0">
+          <a:scrgbClr r="0" g="0" b="0"/>
+        </a:fillRef>
+        <a:effectRef idx="0">
+          <a:scrgbClr r="0" g="0" b="0"/>
+        </a:effectRef>
+        <a:fontRef idx="minor"/>
+      </dsp:style>
+      <dsp:txBody>
+        <a:bodyPr spcFirstLastPara="0" vert="horz" wrap="square" lIns="53340" tIns="53340" rIns="53340" bIns="53340" numCol="1" spcCol="1270" anchor="ctr" anchorCtr="0">
+          <a:noAutofit/>
+        </a:bodyPr>
+        <a:lstStyle/>
+        <a:p>
+          <a:pPr marL="114300" lvl="1" indent="-114300" algn="l" defTabSz="622300">
+            <a:lnSpc>
+              <a:spcPct val="90000"/>
+            </a:lnSpc>
+            <a:spcBef>
+              <a:spcPct val="0"/>
+            </a:spcBef>
+            <a:spcAft>
+              <a:spcPct val="15000"/>
+            </a:spcAft>
+            <a:buChar char="••"/>
+          </a:pPr>
+          <a:r>
+            <a:rPr lang="en-US" sz="1400" kern="1200" dirty="0" smtClean="0"/>
+            <a:t>Hole filling</a:t>
+          </a:r>
+          <a:endParaRPr lang="en-US" sz="1400" kern="1200" dirty="0"/>
+        </a:p>
+        <a:p>
+          <a:pPr marL="114300" lvl="1" indent="-114300" algn="l" defTabSz="622300">
+            <a:lnSpc>
+              <a:spcPct val="90000"/>
+            </a:lnSpc>
+            <a:spcBef>
+              <a:spcPct val="0"/>
+            </a:spcBef>
+            <a:spcAft>
+              <a:spcPct val="15000"/>
+            </a:spcAft>
+            <a:buChar char="••"/>
+          </a:pPr>
+          <a:r>
+            <a:rPr lang="en-US" sz="1400" kern="1200" dirty="0" smtClean="0"/>
+            <a:t>Extraction</a:t>
+          </a:r>
+          <a:endParaRPr lang="en-US" sz="1400" kern="1200" dirty="0"/>
+        </a:p>
+        <a:p>
+          <a:pPr marL="114300" lvl="1" indent="-114300" algn="l" defTabSz="622300">
+            <a:lnSpc>
+              <a:spcPct val="90000"/>
+            </a:lnSpc>
+            <a:spcBef>
+              <a:spcPct val="0"/>
+            </a:spcBef>
+            <a:spcAft>
+              <a:spcPct val="15000"/>
+            </a:spcAft>
+            <a:buChar char="••"/>
+          </a:pPr>
+          <a:r>
+            <a:rPr lang="en-US" sz="1400" kern="1200" dirty="0" smtClean="0"/>
+            <a:t>Normalization (depth and size</a:t>
+          </a:r>
+          <a:r>
+            <a:rPr lang="en-US" sz="1300" kern="1200" dirty="0" smtClean="0"/>
+            <a:t>)</a:t>
+          </a:r>
+          <a:endParaRPr lang="en-US" sz="1300" kern="1200" dirty="0"/>
+        </a:p>
+      </dsp:txBody>
+      <dsp:txXfrm>
+        <a:off x="4210640" y="1717397"/>
+        <a:ext cx="3402745" cy="1107414"/>
+      </dsp:txXfrm>
+    </dsp:sp>
+    <dsp:sp modelId="{D16A277C-35B0-4647-9468-A14C53C6862F}">
+      <dsp:nvSpPr>
+        <dsp:cNvPr id="0" name=""/>
+        <dsp:cNvSpPr/>
+      </dsp:nvSpPr>
+      <dsp:spPr>
+        <a:xfrm rot="5400000">
+          <a:off x="4271023" y="4402286"/>
+          <a:ext cx="1162785" cy="1323789"/>
+        </a:xfrm>
+        <a:prstGeom prst="bentUpArrow">
+          <a:avLst>
+            <a:gd name="adj1" fmla="val 32840"/>
+            <a:gd name="adj2" fmla="val 25000"/>
+            <a:gd name="adj3" fmla="val 35780"/>
+          </a:avLst>
+        </a:prstGeom>
+        <a:solidFill>
+          <a:schemeClr val="accent5">
+            <a:tint val="50000"/>
+            <a:hueOff val="0"/>
+            <a:satOff val="0"/>
+            <a:lumOff val="0"/>
+            <a:alphaOff val="0"/>
+          </a:schemeClr>
+        </a:solidFill>
+        <a:ln w="15875" cap="rnd" cmpd="sng" algn="ctr">
+          <a:solidFill>
+            <a:schemeClr val="lt1">
+              <a:hueOff val="0"/>
+              <a:satOff val="0"/>
+              <a:lumOff val="0"/>
+              <a:alphaOff val="0"/>
+            </a:schemeClr>
+          </a:solidFill>
+          <a:prstDash val="solid"/>
+        </a:ln>
+        <a:effectLst/>
+      </dsp:spPr>
+      <dsp:style>
+        <a:lnRef idx="2">
+          <a:scrgbClr r="0" g="0" b="0"/>
+        </a:lnRef>
+        <a:fillRef idx="1">
+          <a:scrgbClr r="0" g="0" b="0"/>
+        </a:fillRef>
+        <a:effectRef idx="0">
+          <a:scrgbClr r="0" g="0" b="0"/>
+        </a:effectRef>
+        <a:fontRef idx="minor"/>
+      </dsp:style>
+    </dsp:sp>
+    <dsp:sp modelId="{757783AB-7AF3-4E1E-96E7-7BB317946EAF}">
+      <dsp:nvSpPr>
+        <dsp:cNvPr id="0" name=""/>
+        <dsp:cNvSpPr/>
+      </dsp:nvSpPr>
+      <dsp:spPr>
+        <a:xfrm>
+          <a:off x="3962955" y="3113315"/>
+          <a:ext cx="1957445" cy="1370148"/>
+        </a:xfrm>
+        <a:prstGeom prst="roundRect">
+          <a:avLst>
+            <a:gd name="adj" fmla="val 16670"/>
+          </a:avLst>
+        </a:prstGeom>
+        <a:solidFill>
+          <a:schemeClr val="accent5">
+            <a:hueOff val="0"/>
+            <a:satOff val="0"/>
+            <a:lumOff val="0"/>
+            <a:alphaOff val="0"/>
+          </a:schemeClr>
+        </a:solidFill>
+        <a:ln w="15875" cap="rnd" cmpd="sng" algn="ctr">
+          <a:solidFill>
+            <a:schemeClr val="lt1">
+              <a:hueOff val="0"/>
+              <a:satOff val="0"/>
+              <a:lumOff val="0"/>
+              <a:alphaOff val="0"/>
+            </a:schemeClr>
+          </a:solidFill>
+          <a:prstDash val="solid"/>
+        </a:ln>
+        <a:effectLst/>
+      </dsp:spPr>
+      <dsp:style>
+        <a:lnRef idx="2">
+          <a:scrgbClr r="0" g="0" b="0"/>
+        </a:lnRef>
+        <a:fillRef idx="1">
+          <a:scrgbClr r="0" g="0" b="0"/>
+        </a:fillRef>
+        <a:effectRef idx="0">
+          <a:scrgbClr r="0" g="0" b="0"/>
+        </a:effectRef>
+        <a:fontRef idx="minor">
+          <a:schemeClr val="lt1"/>
+        </a:fontRef>
+      </dsp:style>
+      <dsp:txBody>
+        <a:bodyPr spcFirstLastPara="0" vert="horz" wrap="square" lIns="72390" tIns="72390" rIns="72390" bIns="72390" numCol="1" spcCol="1270" anchor="ctr" anchorCtr="0">
+          <a:noAutofit/>
+        </a:bodyPr>
+        <a:lstStyle/>
+        <a:p>
+          <a:pPr lvl="0" algn="ctr" defTabSz="844550">
+            <a:lnSpc>
+              <a:spcPct val="90000"/>
+            </a:lnSpc>
+            <a:spcBef>
+              <a:spcPct val="0"/>
+            </a:spcBef>
+            <a:spcAft>
+              <a:spcPct val="35000"/>
+            </a:spcAft>
+          </a:pPr>
+          <a:r>
+            <a:rPr lang="en-US" sz="1900" kern="1200" dirty="0" smtClean="0"/>
+            <a:t>Feature definition and extraction</a:t>
+          </a:r>
+          <a:endParaRPr lang="en-US" sz="1900" kern="1200" dirty="0"/>
+        </a:p>
+      </dsp:txBody>
+      <dsp:txXfrm>
+        <a:off x="4029852" y="3180212"/>
+        <a:ext cx="1823651" cy="1236354"/>
+      </dsp:txXfrm>
+    </dsp:sp>
+    <dsp:sp modelId="{FC5751CB-FE42-4651-8933-7A7CC30B3865}">
+      <dsp:nvSpPr>
+        <dsp:cNvPr id="0" name=""/>
+        <dsp:cNvSpPr/>
+      </dsp:nvSpPr>
+      <dsp:spPr>
+        <a:xfrm>
+          <a:off x="5987113" y="3243990"/>
+          <a:ext cx="2766796" cy="1107414"/>
+        </a:xfrm>
+        <a:prstGeom prst="rect">
+          <a:avLst/>
+        </a:prstGeom>
+        <a:noFill/>
+        <a:ln>
+          <a:noFill/>
+        </a:ln>
+        <a:effectLst/>
+      </dsp:spPr>
+      <dsp:style>
+        <a:lnRef idx="0">
+          <a:scrgbClr r="0" g="0" b="0"/>
+        </a:lnRef>
+        <a:fillRef idx="0">
+          <a:scrgbClr r="0" g="0" b="0"/>
+        </a:fillRef>
+        <a:effectRef idx="0">
+          <a:scrgbClr r="0" g="0" b="0"/>
+        </a:effectRef>
+        <a:fontRef idx="minor"/>
+      </dsp:style>
+      <dsp:txBody>
+        <a:bodyPr spcFirstLastPara="0" vert="horz" wrap="square" lIns="53340" tIns="53340" rIns="53340" bIns="53340" numCol="1" spcCol="1270" anchor="ctr" anchorCtr="0">
+          <a:noAutofit/>
+        </a:bodyPr>
+        <a:lstStyle/>
+        <a:p>
+          <a:pPr marL="114300" lvl="1" indent="-114300" algn="l" defTabSz="622300">
+            <a:lnSpc>
+              <a:spcPct val="90000"/>
+            </a:lnSpc>
+            <a:spcBef>
+              <a:spcPct val="0"/>
+            </a:spcBef>
+            <a:spcAft>
+              <a:spcPct val="15000"/>
+            </a:spcAft>
+            <a:buChar char="••"/>
+          </a:pPr>
+          <a:r>
+            <a:rPr lang="en-US" sz="1400" kern="1200" dirty="0" smtClean="0"/>
+            <a:t>Laplace  filter</a:t>
+          </a:r>
+          <a:endParaRPr lang="en-US" sz="1400" kern="1200" dirty="0"/>
+        </a:p>
+        <a:p>
+          <a:pPr marL="114300" lvl="1" indent="-114300" algn="l" defTabSz="622300">
+            <a:lnSpc>
+              <a:spcPct val="90000"/>
+            </a:lnSpc>
+            <a:spcBef>
+              <a:spcPct val="0"/>
+            </a:spcBef>
+            <a:spcAft>
+              <a:spcPct val="15000"/>
+            </a:spcAft>
+            <a:buChar char="••"/>
+          </a:pPr>
+          <a:r>
+            <a:rPr lang="en-US" sz="1400" kern="1200" dirty="0" smtClean="0"/>
+            <a:t>Gabor filter</a:t>
+          </a:r>
+          <a:endParaRPr lang="en-US" sz="1400" kern="1200" dirty="0"/>
+        </a:p>
+        <a:p>
+          <a:pPr marL="114300" lvl="1" indent="-114300" algn="l" defTabSz="622300">
+            <a:lnSpc>
+              <a:spcPct val="90000"/>
+            </a:lnSpc>
+            <a:spcBef>
+              <a:spcPct val="0"/>
+            </a:spcBef>
+            <a:spcAft>
+              <a:spcPct val="15000"/>
+            </a:spcAft>
+            <a:buChar char="••"/>
+          </a:pPr>
+          <a:r>
+            <a:rPr lang="en-US" sz="1400" kern="1200" dirty="0" smtClean="0"/>
+            <a:t>Fourier transform</a:t>
+          </a:r>
+          <a:endParaRPr lang="en-US" sz="1400" kern="1200" dirty="0"/>
+        </a:p>
+        <a:p>
+          <a:pPr marL="114300" lvl="1" indent="-114300" algn="l" defTabSz="622300">
+            <a:lnSpc>
+              <a:spcPct val="90000"/>
+            </a:lnSpc>
+            <a:spcBef>
+              <a:spcPct val="0"/>
+            </a:spcBef>
+            <a:spcAft>
+              <a:spcPct val="15000"/>
+            </a:spcAft>
+            <a:buChar char="••"/>
+          </a:pPr>
+          <a:r>
+            <a:rPr lang="en-US" sz="1400" kern="1200" dirty="0" smtClean="0"/>
+            <a:t>…</a:t>
+          </a:r>
+          <a:endParaRPr lang="en-US" sz="1400" kern="1200" dirty="0"/>
+        </a:p>
+      </dsp:txBody>
+      <dsp:txXfrm>
+        <a:off x="5987113" y="3243990"/>
+        <a:ext cx="2766796" cy="1107414"/>
+      </dsp:txXfrm>
+    </dsp:sp>
+    <dsp:sp modelId="{BCDFEA53-6FB2-4975-9B6E-AC0008783243}">
+      <dsp:nvSpPr>
+        <dsp:cNvPr id="0" name=""/>
+        <dsp:cNvSpPr/>
+      </dsp:nvSpPr>
+      <dsp:spPr>
+        <a:xfrm>
+          <a:off x="5724053" y="4652444"/>
+          <a:ext cx="1957445" cy="1370148"/>
+        </a:xfrm>
+        <a:prstGeom prst="roundRect">
+          <a:avLst>
+            <a:gd name="adj" fmla="val 16670"/>
+          </a:avLst>
+        </a:prstGeom>
+        <a:solidFill>
+          <a:schemeClr val="accent5">
+            <a:hueOff val="0"/>
+            <a:satOff val="0"/>
+            <a:lumOff val="0"/>
+            <a:alphaOff val="0"/>
+          </a:schemeClr>
+        </a:solidFill>
+        <a:ln w="15875" cap="rnd" cmpd="sng" algn="ctr">
+          <a:solidFill>
+            <a:schemeClr val="lt1">
+              <a:hueOff val="0"/>
+              <a:satOff val="0"/>
+              <a:lumOff val="0"/>
+              <a:alphaOff val="0"/>
+            </a:schemeClr>
+          </a:solidFill>
+          <a:prstDash val="solid"/>
+        </a:ln>
+        <a:effectLst/>
+      </dsp:spPr>
+      <dsp:style>
+        <a:lnRef idx="2">
+          <a:scrgbClr r="0" g="0" b="0"/>
+        </a:lnRef>
+        <a:fillRef idx="1">
+          <a:scrgbClr r="0" g="0" b="0"/>
+        </a:fillRef>
+        <a:effectRef idx="0">
+          <a:scrgbClr r="0" g="0" b="0"/>
+        </a:effectRef>
+        <a:fontRef idx="minor">
+          <a:schemeClr val="lt1"/>
+        </a:fontRef>
+      </dsp:style>
+      <dsp:txBody>
+        <a:bodyPr spcFirstLastPara="0" vert="horz" wrap="square" lIns="72390" tIns="72390" rIns="72390" bIns="72390" numCol="1" spcCol="1270" anchor="ctr" anchorCtr="0">
+          <a:noAutofit/>
+        </a:bodyPr>
+        <a:lstStyle/>
+        <a:p>
+          <a:pPr lvl="0" algn="ctr" defTabSz="844550">
+            <a:lnSpc>
+              <a:spcPct val="90000"/>
+            </a:lnSpc>
+            <a:spcBef>
+              <a:spcPct val="0"/>
+            </a:spcBef>
+            <a:spcAft>
+              <a:spcPct val="35000"/>
+            </a:spcAft>
+          </a:pPr>
+          <a:r>
+            <a:rPr lang="en-US" sz="1900" kern="1200" dirty="0" smtClean="0"/>
+            <a:t>Training and classification</a:t>
+          </a:r>
+          <a:endParaRPr lang="en-US" sz="1900" kern="1200" dirty="0"/>
+        </a:p>
+      </dsp:txBody>
+      <dsp:txXfrm>
+        <a:off x="5790950" y="4719341"/>
+        <a:ext cx="1823651" cy="1236354"/>
+      </dsp:txXfrm>
+    </dsp:sp>
+    <dsp:sp modelId="{6D721470-4ADB-4DC0-B998-80D1CE994CBA}">
+      <dsp:nvSpPr>
+        <dsp:cNvPr id="0" name=""/>
+        <dsp:cNvSpPr/>
+      </dsp:nvSpPr>
+      <dsp:spPr>
+        <a:xfrm>
+          <a:off x="7681499" y="4783119"/>
+          <a:ext cx="1423659" cy="1107414"/>
+        </a:xfrm>
+        <a:prstGeom prst="rect">
+          <a:avLst/>
+        </a:prstGeom>
+        <a:noFill/>
+        <a:ln>
+          <a:noFill/>
+        </a:ln>
+        <a:effectLst/>
+      </dsp:spPr>
+      <dsp:style>
+        <a:lnRef idx="0">
+          <a:scrgbClr r="0" g="0" b="0"/>
+        </a:lnRef>
+        <a:fillRef idx="0">
+          <a:scrgbClr r="0" g="0" b="0"/>
+        </a:fillRef>
+        <a:effectRef idx="0">
+          <a:scrgbClr r="0" g="0" b="0"/>
+        </a:effectRef>
+        <a:fontRef idx="minor"/>
+      </dsp:style>
+      <dsp:txBody>
+        <a:bodyPr spcFirstLastPara="0" vert="horz" wrap="square" lIns="53340" tIns="53340" rIns="53340" bIns="53340" numCol="1" spcCol="1270" anchor="ctr" anchorCtr="0">
+          <a:noAutofit/>
+        </a:bodyPr>
+        <a:lstStyle/>
+        <a:p>
+          <a:pPr marL="114300" lvl="1" indent="-114300" algn="l" defTabSz="622300">
+            <a:lnSpc>
+              <a:spcPct val="90000"/>
+            </a:lnSpc>
+            <a:spcBef>
+              <a:spcPct val="0"/>
+            </a:spcBef>
+            <a:spcAft>
+              <a:spcPct val="15000"/>
+            </a:spcAft>
+            <a:buChar char="••"/>
+          </a:pPr>
+          <a:r>
+            <a:rPr lang="en-US" sz="1400" kern="1200" dirty="0" smtClean="0"/>
+            <a:t>Image operations</a:t>
+          </a:r>
+          <a:endParaRPr lang="en-US" sz="1400" kern="1200" dirty="0"/>
+        </a:p>
+        <a:p>
+          <a:pPr marL="114300" lvl="1" indent="-114300" algn="l" defTabSz="622300">
+            <a:lnSpc>
+              <a:spcPct val="90000"/>
+            </a:lnSpc>
+            <a:spcBef>
+              <a:spcPct val="0"/>
+            </a:spcBef>
+            <a:spcAft>
+              <a:spcPct val="15000"/>
+            </a:spcAft>
+            <a:buChar char="••"/>
+          </a:pPr>
+          <a:r>
+            <a:rPr lang="en-US" sz="1400" kern="1200" dirty="0" smtClean="0"/>
+            <a:t>ANN</a:t>
+          </a:r>
+          <a:endParaRPr lang="en-US" sz="1400" kern="1200" dirty="0"/>
+        </a:p>
+        <a:p>
+          <a:pPr marL="114300" lvl="1" indent="-114300" algn="l" defTabSz="622300">
+            <a:lnSpc>
+              <a:spcPct val="90000"/>
+            </a:lnSpc>
+            <a:spcBef>
+              <a:spcPct val="0"/>
+            </a:spcBef>
+            <a:spcAft>
+              <a:spcPct val="15000"/>
+            </a:spcAft>
+            <a:buChar char="••"/>
+          </a:pPr>
+          <a:r>
+            <a:rPr lang="en-US" sz="1400" kern="1200" dirty="0" smtClean="0"/>
+            <a:t>RDF</a:t>
+          </a:r>
+          <a:endParaRPr lang="en-US" sz="1400" kern="1200" dirty="0"/>
+        </a:p>
+        <a:p>
+          <a:pPr marL="114300" lvl="1" indent="-114300" algn="l" defTabSz="622300">
+            <a:lnSpc>
+              <a:spcPct val="90000"/>
+            </a:lnSpc>
+            <a:spcBef>
+              <a:spcPct val="0"/>
+            </a:spcBef>
+            <a:spcAft>
+              <a:spcPct val="15000"/>
+            </a:spcAft>
+            <a:buChar char="••"/>
+          </a:pPr>
+          <a:r>
+            <a:rPr lang="en-US" sz="1400" kern="1200" dirty="0" smtClean="0"/>
+            <a:t>…</a:t>
+          </a:r>
+          <a:endParaRPr lang="en-US" sz="1400" kern="1200" dirty="0"/>
+        </a:p>
+      </dsp:txBody>
+      <dsp:txXfrm>
+        <a:off x="7681499" y="4783119"/>
+        <a:ext cx="1423659" cy="1107414"/>
+      </dsp:txXfrm>
+    </dsp:sp>
   </dsp:spTree>
 </dsp:drawing>
 </file>
@@ -3257,7 +4178,7 @@
             <a:fld id="{B61BEF0D-F0BB-DE4B-95CE-6DB70DBA9567}" type="datetimeFigureOut">
               <a:rPr lang="en-US" dirty="0"/>
               <a:pPr/>
-              <a:t>9/7/2016</a:t>
+              <a:t>9/12/2016</a:t>
             </a:fld>
             <a:endParaRPr lang="en-US" dirty="0"/>
           </a:p>
@@ -3592,7 +4513,7 @@
             <a:fld id="{B61BEF0D-F0BB-DE4B-95CE-6DB70DBA9567}" type="datetimeFigureOut">
               <a:rPr lang="en-US" dirty="0"/>
               <a:pPr/>
-              <a:t>9/7/2016</a:t>
+              <a:t>9/12/2016</a:t>
             </a:fld>
             <a:endParaRPr lang="en-US" dirty="0"/>
           </a:p>
@@ -3990,7 +4911,7 @@
             <a:fld id="{B61BEF0D-F0BB-DE4B-95CE-6DB70DBA9567}" type="datetimeFigureOut">
               <a:rPr lang="en-US" dirty="0"/>
               <a:pPr/>
-              <a:t>9/7/2016</a:t>
+              <a:t>9/12/2016</a:t>
             </a:fld>
             <a:endParaRPr lang="en-US" dirty="0"/>
           </a:p>
@@ -4322,7 +5243,7 @@
             <a:fld id="{B61BEF0D-F0BB-DE4B-95CE-6DB70DBA9567}" type="datetimeFigureOut">
               <a:rPr lang="en-US" dirty="0"/>
               <a:pPr/>
-              <a:t>9/7/2016</a:t>
+              <a:t>9/12/2016</a:t>
             </a:fld>
             <a:endParaRPr lang="en-US" dirty="0"/>
           </a:p>
@@ -4639,7 +5560,7 @@
             <a:fld id="{B61BEF0D-F0BB-DE4B-95CE-6DB70DBA9567}" type="datetimeFigureOut">
               <a:rPr lang="en-US" dirty="0"/>
               <a:pPr/>
-              <a:t>9/7/2016</a:t>
+              <a:t>9/12/2016</a:t>
             </a:fld>
             <a:endParaRPr lang="en-US" dirty="0"/>
           </a:p>
@@ -5032,7 +5953,7 @@
             <a:fld id="{B61BEF0D-F0BB-DE4B-95CE-6DB70DBA9567}" type="datetimeFigureOut">
               <a:rPr lang="en-US" dirty="0"/>
               <a:pPr/>
-              <a:t>9/7/2016</a:t>
+              <a:t>9/12/2016</a:t>
             </a:fld>
             <a:endParaRPr lang="en-US" dirty="0"/>
           </a:p>
@@ -5286,7 +6207,7 @@
             <a:fld id="{B61BEF0D-F0BB-DE4B-95CE-6DB70DBA9567}" type="datetimeFigureOut">
               <a:rPr lang="en-US" dirty="0"/>
               <a:pPr/>
-              <a:t>9/7/2016</a:t>
+              <a:t>9/12/2016</a:t>
             </a:fld>
             <a:endParaRPr lang="en-US" dirty="0"/>
           </a:p>
@@ -5545,7 +6466,7 @@
             <a:fld id="{B61BEF0D-F0BB-DE4B-95CE-6DB70DBA9567}" type="datetimeFigureOut">
               <a:rPr lang="en-US" dirty="0"/>
               <a:pPr/>
-              <a:t>9/7/2016</a:t>
+              <a:t>9/12/2016</a:t>
             </a:fld>
             <a:endParaRPr lang="en-US" dirty="0"/>
           </a:p>
@@ -5804,7 +6725,7 @@
             <a:fld id="{B61BEF0D-F0BB-DE4B-95CE-6DB70DBA9567}" type="datetimeFigureOut">
               <a:rPr lang="en-US" dirty="0"/>
               <a:pPr/>
-              <a:t>9/7/2016</a:t>
+              <a:t>9/12/2016</a:t>
             </a:fld>
             <a:endParaRPr lang="en-US" dirty="0"/>
           </a:p>
@@ -6130,7 +7051,7 @@
             <a:fld id="{B61BEF0D-F0BB-DE4B-95CE-6DB70DBA9567}" type="datetimeFigureOut">
               <a:rPr lang="en-US" dirty="0"/>
               <a:pPr/>
-              <a:t>9/7/2016</a:t>
+              <a:t>9/12/2016</a:t>
             </a:fld>
             <a:endParaRPr lang="en-US" dirty="0"/>
           </a:p>
@@ -6450,7 +7371,7 @@
             <a:fld id="{B61BEF0D-F0BB-DE4B-95CE-6DB70DBA9567}" type="datetimeFigureOut">
               <a:rPr lang="en-US" dirty="0"/>
               <a:pPr/>
-              <a:t>9/7/2016</a:t>
+              <a:t>9/12/2016</a:t>
             </a:fld>
             <a:endParaRPr lang="en-US" dirty="0"/>
           </a:p>
@@ -6904,7 +7825,7 @@
             <a:fld id="{B61BEF0D-F0BB-DE4B-95CE-6DB70DBA9567}" type="datetimeFigureOut">
               <a:rPr lang="en-US" dirty="0"/>
               <a:pPr/>
-              <a:t>9/7/2016</a:t>
+              <a:t>9/12/2016</a:t>
             </a:fld>
             <a:endParaRPr lang="en-US" dirty="0"/>
           </a:p>
@@ -7106,7 +8027,7 @@
             <a:fld id="{B61BEF0D-F0BB-DE4B-95CE-6DB70DBA9567}" type="datetimeFigureOut">
               <a:rPr lang="en-US" dirty="0"/>
               <a:pPr/>
-              <a:t>9/7/2016</a:t>
+              <a:t>9/12/2016</a:t>
             </a:fld>
             <a:endParaRPr lang="en-US" dirty="0"/>
           </a:p>
@@ -7280,7 +8201,7 @@
             <a:fld id="{B61BEF0D-F0BB-DE4B-95CE-6DB70DBA9567}" type="datetimeFigureOut">
               <a:rPr lang="en-US" dirty="0"/>
               <a:pPr/>
-              <a:t>9/7/2016</a:t>
+              <a:t>9/12/2016</a:t>
             </a:fld>
             <a:endParaRPr lang="en-US" dirty="0"/>
           </a:p>
@@ -7610,7 +8531,7 @@
             <a:fld id="{B61BEF0D-F0BB-DE4B-95CE-6DB70DBA9567}" type="datetimeFigureOut">
               <a:rPr lang="en-US" dirty="0"/>
               <a:pPr/>
-              <a:t>9/7/2016</a:t>
+              <a:t>9/12/2016</a:t>
             </a:fld>
             <a:endParaRPr lang="en-US" dirty="0"/>
           </a:p>
@@ -7952,7 +8873,7 @@
             <a:fld id="{B61BEF0D-F0BB-DE4B-95CE-6DB70DBA9567}" type="datetimeFigureOut">
               <a:rPr lang="en-US" dirty="0"/>
               <a:pPr/>
-              <a:t>9/7/2016</a:t>
+              <a:t>9/12/2016</a:t>
             </a:fld>
             <a:endParaRPr lang="en-US" dirty="0"/>
           </a:p>
@@ -10066,7 +10987,7 @@
             <a:fld id="{B61BEF0D-F0BB-DE4B-95CE-6DB70DBA9567}" type="datetimeFigureOut">
               <a:rPr lang="en-US" dirty="0"/>
               <a:pPr/>
-              <a:t>9/7/2016</a:t>
+              <a:t>9/12/2016</a:t>
             </a:fld>
             <a:endParaRPr lang="en-US" dirty="0"/>
           </a:p>
@@ -11881,6 +12802,188 @@
 </p:sld>
 </file>
 
+<file path=ppt/slides/slide18.xml><?xml version="1.0" encoding="utf-8"?>
+<p:sld xmlns:a="http://schemas.openxmlformats.org/drawingml/2006/main" xmlns:r="http://schemas.openxmlformats.org/officeDocument/2006/relationships" xmlns:p="http://schemas.openxmlformats.org/presentationml/2006/main">
+  <p:cSld>
+    <p:spTree>
+      <p:nvGrpSpPr>
+        <p:cNvPr id="1" name=""/>
+        <p:cNvGrpSpPr/>
+        <p:nvPr/>
+      </p:nvGrpSpPr>
+      <p:grpSpPr>
+        <a:xfrm>
+          <a:off x="0" y="0"/>
+          <a:ext cx="0" cy="0"/>
+          <a:chOff x="0" y="0"/>
+          <a:chExt cx="0" cy="0"/>
+        </a:xfrm>
+      </p:grpSpPr>
+      <p:sp>
+        <p:nvSpPr>
+          <p:cNvPr id="2" name="Título 1"/>
+          <p:cNvSpPr>
+            <a:spLocks noGrp="1"/>
+          </p:cNvSpPr>
+          <p:nvPr>
+            <p:ph type="title"/>
+          </p:nvPr>
+        </p:nvSpPr>
+        <p:spPr/>
+        <p:txBody>
+          <a:bodyPr/>
+          <a:lstStyle/>
+          <a:p>
+            <a:r>
+              <a:rPr lang="en-US" dirty="0" smtClean="0"/>
+              <a:t>Gesture recognition</a:t>
+            </a:r>
+            <a:endParaRPr lang="en-US" dirty="0"/>
+          </a:p>
+        </p:txBody>
+      </p:sp>
+      <p:sp>
+        <p:nvSpPr>
+          <p:cNvPr id="3" name="Marcador de texto 2"/>
+          <p:cNvSpPr>
+            <a:spLocks noGrp="1"/>
+          </p:cNvSpPr>
+          <p:nvPr>
+            <p:ph type="body" idx="1"/>
+          </p:nvPr>
+        </p:nvSpPr>
+        <p:spPr/>
+        <p:txBody>
+          <a:bodyPr/>
+          <a:lstStyle/>
+          <a:p>
+            <a:endParaRPr lang="en-US"/>
+          </a:p>
+        </p:txBody>
+      </p:sp>
+    </p:spTree>
+    <p:extLst>
+      <p:ext uri="{BB962C8B-B14F-4D97-AF65-F5344CB8AC3E}">
+        <p14:creationId xmlns:p14="http://schemas.microsoft.com/office/powerpoint/2010/main" val="1840225194"/>
+      </p:ext>
+    </p:extLst>
+  </p:cSld>
+  <p:clrMapOvr>
+    <a:masterClrMapping/>
+  </p:clrMapOvr>
+  <p:timing>
+    <p:tnLst>
+      <p:par>
+        <p:cTn id="1" dur="indefinite" restart="never" nodeType="tmRoot"/>
+      </p:par>
+    </p:tnLst>
+  </p:timing>
+</p:sld>
+</file>
+
+<file path=ppt/slides/slide19.xml><?xml version="1.0" encoding="utf-8"?>
+<p:sld xmlns:a="http://schemas.openxmlformats.org/drawingml/2006/main" xmlns:r="http://schemas.openxmlformats.org/officeDocument/2006/relationships" xmlns:p="http://schemas.openxmlformats.org/presentationml/2006/main">
+  <p:cSld>
+    <p:spTree>
+      <p:nvGrpSpPr>
+        <p:cNvPr id="1" name=""/>
+        <p:cNvGrpSpPr/>
+        <p:nvPr/>
+      </p:nvGrpSpPr>
+      <p:grpSpPr>
+        <a:xfrm>
+          <a:off x="0" y="0"/>
+          <a:ext cx="0" cy="0"/>
+          <a:chOff x="0" y="0"/>
+          <a:chExt cx="0" cy="0"/>
+        </a:xfrm>
+      </p:grpSpPr>
+      <p:sp>
+        <p:nvSpPr>
+          <p:cNvPr id="4" name="Título 3"/>
+          <p:cNvSpPr>
+            <a:spLocks noGrp="1"/>
+          </p:cNvSpPr>
+          <p:nvPr>
+            <p:ph type="title"/>
+          </p:nvPr>
+        </p:nvSpPr>
+        <p:spPr/>
+        <p:txBody>
+          <a:bodyPr/>
+          <a:lstStyle/>
+          <a:p>
+            <a:r>
+              <a:rPr lang="en-US" dirty="0" smtClean="0"/>
+              <a:t>Gesture recognition</a:t>
+            </a:r>
+            <a:endParaRPr lang="en-US" dirty="0"/>
+          </a:p>
+        </p:txBody>
+      </p:sp>
+      <p:sp>
+        <p:nvSpPr>
+          <p:cNvPr id="5" name="Marcador de contenido 4"/>
+          <p:cNvSpPr>
+            <a:spLocks noGrp="1"/>
+          </p:cNvSpPr>
+          <p:nvPr>
+            <p:ph idx="1"/>
+          </p:nvPr>
+        </p:nvSpPr>
+        <p:spPr/>
+        <p:txBody>
+          <a:bodyPr/>
+          <a:lstStyle/>
+          <a:p>
+            <a:r>
+              <a:rPr lang="en-US" dirty="0" smtClean="0"/>
+              <a:t>At this moment we propose two different ways, which have to be studied, to recognize the gestures.</a:t>
+            </a:r>
+          </a:p>
+          <a:p>
+            <a:pPr lvl="1"/>
+            <a:r>
+              <a:rPr lang="en-US" dirty="0" smtClean="0"/>
+              <a:t>Operations between images.</a:t>
+            </a:r>
+          </a:p>
+          <a:p>
+            <a:pPr lvl="1"/>
+            <a:r>
+              <a:rPr lang="en-US" smtClean="0"/>
+              <a:t>Machine Learning models</a:t>
+            </a:r>
+            <a:r>
+              <a:rPr lang="en-US" dirty="0" smtClean="0"/>
+              <a:t>.</a:t>
+            </a:r>
+          </a:p>
+          <a:p>
+            <a:pPr lvl="1"/>
+            <a:endParaRPr lang="en-US" dirty="0"/>
+          </a:p>
+          <a:p>
+            <a:r>
+              <a:rPr lang="en-US" dirty="0" smtClean="0"/>
+              <a:t>The recognition is not limited to these two approaches, if we consider that there is another option that fits better with the system requirements we are going to use it.</a:t>
+            </a:r>
+          </a:p>
+        </p:txBody>
+      </p:sp>
+    </p:spTree>
+    <p:extLst>
+      <p:ext uri="{BB962C8B-B14F-4D97-AF65-F5344CB8AC3E}">
+        <p14:creationId xmlns:p14="http://schemas.microsoft.com/office/powerpoint/2010/main" val="516137811"/>
+      </p:ext>
+    </p:extLst>
+  </p:cSld>
+  <p:clrMapOvr>
+    <a:masterClrMapping/>
+  </p:clrMapOvr>
+</p:sld>
+</file>
+
 <file path=ppt/slides/slide2.xml><?xml version="1.0" encoding="utf-8"?>
 <p:sld xmlns:a="http://schemas.openxmlformats.org/drawingml/2006/main" xmlns:r="http://schemas.openxmlformats.org/officeDocument/2006/relationships" xmlns:p="http://schemas.openxmlformats.org/presentationml/2006/main">
   <p:cSld>
@@ -11905,7 +13008,7 @@
           <p:nvPr>
             <p:extLst>
               <p:ext uri="{D42A27DB-BD31-4B8C-83A1-F6EECF244321}">
-                <p14:modId xmlns:p14="http://schemas.microsoft.com/office/powerpoint/2010/main" val="859399866"/>
+                <p14:modId xmlns:p14="http://schemas.microsoft.com/office/powerpoint/2010/main" val="3698457134"/>
               </p:ext>
             </p:extLst>
           </p:nvPr>
@@ -11937,6 +13040,1874 @@
       </p:par>
     </p:tnLst>
   </p:timing>
+</p:sld>
+</file>
+
+<file path=ppt/slides/slide20.xml><?xml version="1.0" encoding="utf-8"?>
+<p:sld xmlns:a="http://schemas.openxmlformats.org/drawingml/2006/main" xmlns:r="http://schemas.openxmlformats.org/officeDocument/2006/relationships" xmlns:p="http://schemas.openxmlformats.org/presentationml/2006/main">
+  <p:cSld>
+    <p:spTree>
+      <p:nvGrpSpPr>
+        <p:cNvPr id="1" name=""/>
+        <p:cNvGrpSpPr/>
+        <p:nvPr/>
+      </p:nvGrpSpPr>
+      <p:grpSpPr>
+        <a:xfrm>
+          <a:off x="0" y="0"/>
+          <a:ext cx="0" cy="0"/>
+          <a:chOff x="0" y="0"/>
+          <a:chExt cx="0" cy="0"/>
+        </a:xfrm>
+      </p:grpSpPr>
+      <p:sp>
+        <p:nvSpPr>
+          <p:cNvPr id="2" name="Título 1"/>
+          <p:cNvSpPr>
+            <a:spLocks noGrp="1"/>
+          </p:cNvSpPr>
+          <p:nvPr>
+            <p:ph type="title"/>
+          </p:nvPr>
+        </p:nvSpPr>
+        <p:spPr/>
+        <p:txBody>
+          <a:bodyPr/>
+          <a:lstStyle/>
+          <a:p>
+            <a:r>
+              <a:rPr lang="en-US" dirty="0" smtClean="0"/>
+              <a:t>Gesture recognition – Operations between images</a:t>
+            </a:r>
+            <a:endParaRPr lang="en-US" dirty="0"/>
+          </a:p>
+        </p:txBody>
+      </p:sp>
+      <p:sp>
+        <p:nvSpPr>
+          <p:cNvPr id="3" name="Marcador de contenido 2"/>
+          <p:cNvSpPr>
+            <a:spLocks noGrp="1"/>
+          </p:cNvSpPr>
+          <p:nvPr>
+            <p:ph sz="half" idx="1"/>
+          </p:nvPr>
+        </p:nvSpPr>
+        <p:spPr/>
+        <p:txBody>
+          <a:bodyPr>
+            <a:normAutofit/>
+          </a:bodyPr>
+          <a:lstStyle/>
+          <a:p>
+            <a:r>
+              <a:rPr lang="en-US" dirty="0" smtClean="0"/>
+              <a:t>We can use two different methods for image comparison:</a:t>
+            </a:r>
+          </a:p>
+          <a:p>
+            <a:pPr lvl="1"/>
+            <a:r>
+              <a:rPr lang="en-US" dirty="0"/>
+              <a:t>Difference between images</a:t>
+            </a:r>
+            <a:r>
+              <a:rPr lang="en-US" dirty="0" smtClean="0"/>
+              <a:t>.</a:t>
+            </a:r>
+          </a:p>
+          <a:p>
+            <a:pPr lvl="1"/>
+            <a:r>
+              <a:rPr lang="en-US" dirty="0" smtClean="0"/>
+              <a:t>Correlation between images.</a:t>
+            </a:r>
+          </a:p>
+          <a:p>
+            <a:endParaRPr lang="en-US" dirty="0"/>
+          </a:p>
+          <a:p>
+            <a:r>
+              <a:rPr lang="en-US" dirty="0" smtClean="0"/>
+              <a:t>The two approaches have the same base: from the known gestures compute the average of the images for each gesture, then we can compare against this new image instead of all of them.</a:t>
+            </a:r>
+          </a:p>
+          <a:p>
+            <a:endParaRPr lang="en-US" dirty="0"/>
+          </a:p>
+        </p:txBody>
+      </p:sp>
+      <p:pic>
+        <p:nvPicPr>
+          <p:cNvPr id="4" name="Imagen 3"/>
+          <p:cNvPicPr>
+            <a:picLocks noChangeAspect="1"/>
+          </p:cNvPicPr>
+          <p:nvPr/>
+        </p:nvPicPr>
+        <p:blipFill>
+          <a:blip r:embed="rId2">
+            <a:extLst>
+              <a:ext uri="{28A0092B-C50C-407E-A947-70E740481C1C}">
+                <a14:useLocalDpi xmlns:a14="http://schemas.microsoft.com/office/drawing/2010/main" val="0"/>
+              </a:ext>
+            </a:extLst>
+          </a:blip>
+          <a:stretch>
+            <a:fillRect/>
+          </a:stretch>
+        </p:blipFill>
+        <p:spPr>
+          <a:xfrm>
+            <a:off x="7960659" y="2609851"/>
+            <a:ext cx="2822761" cy="2822761"/>
+          </a:xfrm>
+          <a:prstGeom prst="rect">
+            <a:avLst/>
+          </a:prstGeom>
+        </p:spPr>
+      </p:pic>
+    </p:spTree>
+    <p:extLst>
+      <p:ext uri="{BB962C8B-B14F-4D97-AF65-F5344CB8AC3E}">
+        <p14:creationId xmlns:p14="http://schemas.microsoft.com/office/powerpoint/2010/main" val="2596349980"/>
+      </p:ext>
+    </p:extLst>
+  </p:cSld>
+  <p:clrMapOvr>
+    <a:masterClrMapping/>
+  </p:clrMapOvr>
+</p:sld>
+</file>
+
+<file path=ppt/slides/slide21.xml><?xml version="1.0" encoding="utf-8"?>
+<p:sld xmlns:a="http://schemas.openxmlformats.org/drawingml/2006/main" xmlns:r="http://schemas.openxmlformats.org/officeDocument/2006/relationships" xmlns:p="http://schemas.openxmlformats.org/presentationml/2006/main">
+  <p:cSld>
+    <p:spTree>
+      <p:nvGrpSpPr>
+        <p:cNvPr id="1" name=""/>
+        <p:cNvGrpSpPr/>
+        <p:nvPr/>
+      </p:nvGrpSpPr>
+      <p:grpSpPr>
+        <a:xfrm>
+          <a:off x="0" y="0"/>
+          <a:ext cx="0" cy="0"/>
+          <a:chOff x="0" y="0"/>
+          <a:chExt cx="0" cy="0"/>
+        </a:xfrm>
+      </p:grpSpPr>
+      <p:sp>
+        <p:nvSpPr>
+          <p:cNvPr id="5" name="Título 4"/>
+          <p:cNvSpPr>
+            <a:spLocks noGrp="1"/>
+          </p:cNvSpPr>
+          <p:nvPr>
+            <p:ph type="title"/>
+          </p:nvPr>
+        </p:nvSpPr>
+        <p:spPr/>
+        <p:txBody>
+          <a:bodyPr/>
+          <a:lstStyle/>
+          <a:p>
+            <a:r>
+              <a:rPr lang="en-US" dirty="0" smtClean="0"/>
+              <a:t>Gesture recognition – Operations between images – </a:t>
+            </a:r>
+            <a:r>
+              <a:rPr lang="en-US" sz="2800" dirty="0" smtClean="0"/>
+              <a:t>Difference</a:t>
+            </a:r>
+            <a:r>
+              <a:rPr lang="en-US" dirty="0" smtClean="0"/>
+              <a:t> </a:t>
+            </a:r>
+            <a:endParaRPr lang="en-US" dirty="0"/>
+          </a:p>
+        </p:txBody>
+      </p:sp>
+      <p:sp>
+        <p:nvSpPr>
+          <p:cNvPr id="6" name="Marcador de contenido 5"/>
+          <p:cNvSpPr>
+            <a:spLocks noGrp="1"/>
+          </p:cNvSpPr>
+          <p:nvPr>
+            <p:ph idx="1"/>
+          </p:nvPr>
+        </p:nvSpPr>
+        <p:spPr/>
+        <p:txBody>
+          <a:bodyPr/>
+          <a:lstStyle/>
+          <a:p>
+            <a:r>
+              <a:rPr lang="en-US" dirty="0" smtClean="0"/>
+              <a:t>We can compute the difference between the average of each gesture and the input gesture.</a:t>
+            </a:r>
+          </a:p>
+          <a:p>
+            <a:pPr lvl="1"/>
+            <a:r>
+              <a:rPr lang="en-US" dirty="0" smtClean="0"/>
+              <a:t>We will know how similar is the gesture to one of the known gestures in the database.</a:t>
+            </a:r>
+          </a:p>
+          <a:p>
+            <a:pPr lvl="1"/>
+            <a:r>
+              <a:rPr lang="en-US" dirty="0" smtClean="0"/>
+              <a:t>There are different metrics to know how similar are two images from the difference:</a:t>
+            </a:r>
+          </a:p>
+          <a:p>
+            <a:pPr lvl="2"/>
+            <a:r>
+              <a:rPr lang="en-US" dirty="0" smtClean="0"/>
+              <a:t>Average error.</a:t>
+            </a:r>
+          </a:p>
+          <a:p>
+            <a:pPr lvl="2"/>
+            <a:r>
+              <a:rPr lang="en-US" dirty="0" smtClean="0"/>
+              <a:t>Min Square Error.</a:t>
+            </a:r>
+          </a:p>
+          <a:p>
+            <a:pPr lvl="2"/>
+            <a:r>
+              <a:rPr lang="en-US" dirty="0" smtClean="0"/>
+              <a:t>Standard deviation.</a:t>
+            </a:r>
+          </a:p>
+          <a:p>
+            <a:pPr lvl="2"/>
+            <a:r>
+              <a:rPr lang="en-US" dirty="0" smtClean="0"/>
+              <a:t>… </a:t>
+            </a:r>
+            <a:endParaRPr lang="en-US" dirty="0"/>
+          </a:p>
+        </p:txBody>
+      </p:sp>
+    </p:spTree>
+    <p:extLst>
+      <p:ext uri="{BB962C8B-B14F-4D97-AF65-F5344CB8AC3E}">
+        <p14:creationId xmlns:p14="http://schemas.microsoft.com/office/powerpoint/2010/main" val="1083770515"/>
+      </p:ext>
+    </p:extLst>
+  </p:cSld>
+  <p:clrMapOvr>
+    <a:masterClrMapping/>
+  </p:clrMapOvr>
+</p:sld>
+</file>
+
+<file path=ppt/slides/slide22.xml><?xml version="1.0" encoding="utf-8"?>
+<p:sld xmlns:a="http://schemas.openxmlformats.org/drawingml/2006/main" xmlns:r="http://schemas.openxmlformats.org/officeDocument/2006/relationships" xmlns:p="http://schemas.openxmlformats.org/presentationml/2006/main">
+  <p:cSld>
+    <p:spTree>
+      <p:nvGrpSpPr>
+        <p:cNvPr id="1" name=""/>
+        <p:cNvGrpSpPr/>
+        <p:nvPr/>
+      </p:nvGrpSpPr>
+      <p:grpSpPr>
+        <a:xfrm>
+          <a:off x="0" y="0"/>
+          <a:ext cx="0" cy="0"/>
+          <a:chOff x="0" y="0"/>
+          <a:chExt cx="0" cy="0"/>
+        </a:xfrm>
+      </p:grpSpPr>
+      <p:sp>
+        <p:nvSpPr>
+          <p:cNvPr id="2" name="Título 1"/>
+          <p:cNvSpPr>
+            <a:spLocks noGrp="1"/>
+          </p:cNvSpPr>
+          <p:nvPr>
+            <p:ph type="title"/>
+          </p:nvPr>
+        </p:nvSpPr>
+        <p:spPr/>
+        <p:txBody>
+          <a:bodyPr/>
+          <a:lstStyle/>
+          <a:p>
+            <a:r>
+              <a:rPr lang="en-US" dirty="0"/>
+              <a:t>Gesture recognition – Operations between images – </a:t>
+            </a:r>
+            <a:r>
+              <a:rPr lang="en-US" sz="2800" dirty="0" smtClean="0"/>
+              <a:t>Image correlation</a:t>
+            </a:r>
+            <a:endParaRPr lang="en-US" dirty="0"/>
+          </a:p>
+        </p:txBody>
+      </p:sp>
+      <p:sp>
+        <p:nvSpPr>
+          <p:cNvPr id="3" name="Marcador de contenido 2"/>
+          <p:cNvSpPr>
+            <a:spLocks noGrp="1"/>
+          </p:cNvSpPr>
+          <p:nvPr>
+            <p:ph idx="1"/>
+          </p:nvPr>
+        </p:nvSpPr>
+        <p:spPr/>
+        <p:txBody>
+          <a:bodyPr/>
+          <a:lstStyle/>
+          <a:p>
+            <a:r>
+              <a:rPr lang="en-US" dirty="0" smtClean="0"/>
+              <a:t>Correlation between two images provides the similarity of them.</a:t>
+            </a:r>
+          </a:p>
+          <a:p>
+            <a:pPr lvl="1"/>
+            <a:r>
+              <a:rPr lang="en-US" dirty="0" smtClean="0"/>
+              <a:t>When the images are of different sizes, all the pixels have to be considered as starting points and the window (the smaller image) has to be shifted over the bigger image.</a:t>
+            </a:r>
+          </a:p>
+          <a:p>
+            <a:pPr lvl="2"/>
+            <a:r>
+              <a:rPr lang="en-US" dirty="0" smtClean="0"/>
+              <a:t>This provides a metric for each pixel in which the value is the correlation value for that starting point.</a:t>
+            </a:r>
+            <a:endParaRPr lang="en-US" dirty="0"/>
+          </a:p>
+        </p:txBody>
+      </p:sp>
+      <mc:AlternateContent xmlns:mc="http://schemas.openxmlformats.org/markup-compatibility/2006" xmlns:a14="http://schemas.microsoft.com/office/drawing/2010/main">
+        <mc:Choice Requires="a14">
+          <p:sp>
+            <p:nvSpPr>
+              <p:cNvPr id="14" name="Rectángulo 13"/>
+              <p:cNvSpPr/>
+              <p:nvPr/>
+            </p:nvSpPr>
+            <p:spPr>
+              <a:xfrm>
+                <a:off x="2589212" y="4350149"/>
+                <a:ext cx="6690421" cy="1313758"/>
+              </a:xfrm>
+              <a:prstGeom prst="rect">
+                <a:avLst/>
+              </a:prstGeom>
+            </p:spPr>
+            <p:txBody>
+              <a:bodyPr wrap="none">
+                <a:spAutoFit/>
+              </a:bodyPr>
+              <a:lstStyle/>
+              <a:p>
+                <a:pPr/>
+                <a14:m>
+                  <m:oMathPara xmlns:m="http://schemas.openxmlformats.org/officeDocument/2006/math">
+                    <m:oMathParaPr>
+                      <m:jc m:val="centerGroup"/>
+                    </m:oMathParaPr>
+                    <m:oMath xmlns:m="http://schemas.openxmlformats.org/officeDocument/2006/math">
+                      <m:sSub>
+                        <m:sSubPr>
+                          <m:ctrlPr>
+                            <a:rPr lang="en-US" sz="2400" i="1">
+                              <a:latin typeface="Cambria Math" panose="02040503050406030204" pitchFamily="18" charset="0"/>
+                            </a:rPr>
+                          </m:ctrlPr>
+                        </m:sSubPr>
+                        <m:e>
+                          <m:r>
+                            <a:rPr lang="en-US" sz="2400" i="1">
+                              <a:latin typeface="Cambria Math" panose="02040503050406030204" pitchFamily="18" charset="0"/>
+                            </a:rPr>
+                            <m:t>𝑟</m:t>
+                          </m:r>
+                        </m:e>
+                        <m:sub>
+                          <m:r>
+                            <a:rPr lang="en-US" sz="2400" i="1">
+                              <a:latin typeface="Cambria Math" panose="02040503050406030204" pitchFamily="18" charset="0"/>
+                            </a:rPr>
+                            <m:t>𝑖𝑗</m:t>
+                          </m:r>
+                        </m:sub>
+                      </m:sSub>
+                      <m:r>
+                        <a:rPr lang="en-US" sz="2400" i="0">
+                          <a:latin typeface="Cambria Math" panose="02040503050406030204" pitchFamily="18" charset="0"/>
+                        </a:rPr>
+                        <m:t>= </m:t>
+                      </m:r>
+                      <m:f>
+                        <m:fPr>
+                          <m:ctrlPr>
+                            <a:rPr lang="en-US" sz="2400" i="1">
+                              <a:latin typeface="Cambria Math" panose="02040503050406030204" pitchFamily="18" charset="0"/>
+                            </a:rPr>
+                          </m:ctrlPr>
+                        </m:fPr>
+                        <m:num>
+                          <m:nary>
+                            <m:naryPr>
+                              <m:chr m:val="∑"/>
+                              <m:limLoc m:val="subSup"/>
+                              <m:supHide m:val="on"/>
+                              <m:ctrlPr>
+                                <a:rPr lang="en-US" sz="2400" i="1">
+                                  <a:latin typeface="Cambria Math" panose="02040503050406030204" pitchFamily="18" charset="0"/>
+                                </a:rPr>
+                              </m:ctrlPr>
+                            </m:naryPr>
+                            <m:sub>
+                              <m:r>
+                                <a:rPr lang="en-US" sz="2400" i="1">
+                                  <a:latin typeface="Cambria Math" panose="02040503050406030204" pitchFamily="18" charset="0"/>
+                                </a:rPr>
+                                <m:t>𝑚</m:t>
+                              </m:r>
+                            </m:sub>
+                            <m:sup/>
+                            <m:e>
+                              <m:nary>
+                                <m:naryPr>
+                                  <m:chr m:val="∑"/>
+                                  <m:limLoc m:val="subSup"/>
+                                  <m:supHide m:val="on"/>
+                                  <m:ctrlPr>
+                                    <a:rPr lang="en-US" sz="2400" i="1">
+                                      <a:latin typeface="Cambria Math" panose="02040503050406030204" pitchFamily="18" charset="0"/>
+                                    </a:rPr>
+                                  </m:ctrlPr>
+                                </m:naryPr>
+                                <m:sub>
+                                  <m:r>
+                                    <a:rPr lang="en-US" sz="2400" i="1">
+                                      <a:latin typeface="Cambria Math" panose="02040503050406030204" pitchFamily="18" charset="0"/>
+                                    </a:rPr>
+                                    <m:t>𝑛</m:t>
+                                  </m:r>
+                                </m:sub>
+                                <m:sup/>
+                                <m:e>
+                                  <m:d>
+                                    <m:dPr>
+                                      <m:begChr m:val=""/>
+                                      <m:endChr m:val="]"/>
+                                      <m:ctrlPr>
+                                        <a:rPr lang="en-US" sz="2400" i="1">
+                                          <a:latin typeface="Cambria Math" panose="02040503050406030204" pitchFamily="18" charset="0"/>
+                                        </a:rPr>
+                                      </m:ctrlPr>
+                                    </m:dPr>
+                                    <m:e>
+                                      <m:d>
+                                        <m:dPr>
+                                          <m:begChr m:val="["/>
+                                          <m:endChr m:val="]"/>
+                                          <m:ctrlPr>
+                                            <a:rPr lang="en-US" sz="2400" i="1">
+                                              <a:latin typeface="Cambria Math" panose="02040503050406030204" pitchFamily="18" charset="0"/>
+                                            </a:rPr>
+                                          </m:ctrlPr>
+                                        </m:dPr>
+                                        <m:e>
+                                          <m:r>
+                                            <a:rPr lang="en-US" sz="2400" i="1">
+                                              <a:latin typeface="Cambria Math" panose="02040503050406030204" pitchFamily="18" charset="0"/>
+                                            </a:rPr>
+                                            <m:t>𝑓</m:t>
+                                          </m:r>
+                                          <m:d>
+                                            <m:dPr>
+                                              <m:ctrlPr>
+                                                <a:rPr lang="en-US" sz="2400" i="1">
+                                                  <a:latin typeface="Cambria Math" panose="02040503050406030204" pitchFamily="18" charset="0"/>
+                                                </a:rPr>
+                                              </m:ctrlPr>
+                                            </m:dPr>
+                                            <m:e>
+                                              <m:r>
+                                                <a:rPr lang="en-US" sz="2400" i="1">
+                                                  <a:latin typeface="Cambria Math" panose="02040503050406030204" pitchFamily="18" charset="0"/>
+                                                </a:rPr>
+                                                <m:t>𝑖</m:t>
+                                              </m:r>
+                                              <m:r>
+                                                <a:rPr lang="en-US" sz="2400" i="0">
+                                                  <a:latin typeface="Cambria Math" panose="02040503050406030204" pitchFamily="18" charset="0"/>
+                                                </a:rPr>
+                                                <m:t>+</m:t>
+                                              </m:r>
+                                              <m:r>
+                                                <a:rPr lang="en-US" sz="2400" i="1">
+                                                  <a:latin typeface="Cambria Math" panose="02040503050406030204" pitchFamily="18" charset="0"/>
+                                                </a:rPr>
+                                                <m:t>𝑚</m:t>
+                                              </m:r>
+                                              <m:r>
+                                                <a:rPr lang="en-US" sz="2400" i="0">
+                                                  <a:latin typeface="Cambria Math" panose="02040503050406030204" pitchFamily="18" charset="0"/>
+                                                </a:rPr>
+                                                <m:t>, </m:t>
+                                              </m:r>
+                                              <m:r>
+                                                <a:rPr lang="en-US" sz="2400" i="1">
+                                                  <a:latin typeface="Cambria Math" panose="02040503050406030204" pitchFamily="18" charset="0"/>
+                                                </a:rPr>
+                                                <m:t>𝑗</m:t>
+                                              </m:r>
+                                              <m:r>
+                                                <a:rPr lang="en-US" sz="2400" i="0">
+                                                  <a:latin typeface="Cambria Math" panose="02040503050406030204" pitchFamily="18" charset="0"/>
+                                                </a:rPr>
+                                                <m:t>+</m:t>
+                                              </m:r>
+                                              <m:r>
+                                                <a:rPr lang="en-US" sz="2400" i="1">
+                                                  <a:latin typeface="Cambria Math" panose="02040503050406030204" pitchFamily="18" charset="0"/>
+                                                </a:rPr>
+                                                <m:t>𝑛</m:t>
+                                              </m:r>
+                                            </m:e>
+                                          </m:d>
+                                          <m:r>
+                                            <a:rPr lang="en-US" sz="2400" i="0">
+                                              <a:latin typeface="Cambria Math" panose="02040503050406030204" pitchFamily="18" charset="0"/>
+                                            </a:rPr>
+                                            <m:t>−</m:t>
+                                          </m:r>
+                                          <m:acc>
+                                            <m:accPr>
+                                              <m:chr m:val="̅"/>
+                                              <m:ctrlPr>
+                                                <a:rPr lang="en-US" sz="2400" i="1">
+                                                  <a:latin typeface="Cambria Math" panose="02040503050406030204" pitchFamily="18" charset="0"/>
+                                                </a:rPr>
+                                              </m:ctrlPr>
+                                            </m:accPr>
+                                            <m:e>
+                                              <m:r>
+                                                <a:rPr lang="en-US" sz="2400" i="1">
+                                                  <a:latin typeface="Cambria Math" panose="02040503050406030204" pitchFamily="18" charset="0"/>
+                                                </a:rPr>
+                                                <m:t>𝑓</m:t>
+                                              </m:r>
+                                            </m:e>
+                                          </m:acc>
+                                        </m:e>
+                                      </m:d>
+                                      <m:r>
+                                        <a:rPr lang="en-US" sz="2400" i="0">
+                                          <a:latin typeface="Cambria Math" panose="02040503050406030204" pitchFamily="18" charset="0"/>
+                                        </a:rPr>
+                                        <m:t>[</m:t>
+                                      </m:r>
+                                      <m:r>
+                                        <a:rPr lang="en-US" sz="2400" i="1">
+                                          <a:latin typeface="Cambria Math" panose="02040503050406030204" pitchFamily="18" charset="0"/>
+                                        </a:rPr>
+                                        <m:t>𝑔</m:t>
+                                      </m:r>
+                                      <m:d>
+                                        <m:dPr>
+                                          <m:ctrlPr>
+                                            <a:rPr lang="en-US" sz="2400" i="1">
+                                              <a:latin typeface="Cambria Math" panose="02040503050406030204" pitchFamily="18" charset="0"/>
+                                            </a:rPr>
+                                          </m:ctrlPr>
+                                        </m:dPr>
+                                        <m:e>
+                                          <m:r>
+                                            <a:rPr lang="en-US" sz="2400" i="1">
+                                              <a:latin typeface="Cambria Math" panose="02040503050406030204" pitchFamily="18" charset="0"/>
+                                            </a:rPr>
+                                            <m:t>𝑚</m:t>
+                                          </m:r>
+                                          <m:r>
+                                            <a:rPr lang="en-US" sz="2400" i="0">
+                                              <a:latin typeface="Cambria Math" panose="02040503050406030204" pitchFamily="18" charset="0"/>
+                                            </a:rPr>
+                                            <m:t>,</m:t>
+                                          </m:r>
+                                          <m:r>
+                                            <a:rPr lang="en-US" sz="2400" i="1">
+                                              <a:latin typeface="Cambria Math" panose="02040503050406030204" pitchFamily="18" charset="0"/>
+                                            </a:rPr>
+                                            <m:t>𝑛</m:t>
+                                          </m:r>
+                                        </m:e>
+                                      </m:d>
+                                      <m:r>
+                                        <a:rPr lang="en-US" sz="2400" i="0">
+                                          <a:latin typeface="Cambria Math" panose="02040503050406030204" pitchFamily="18" charset="0"/>
+                                        </a:rPr>
+                                        <m:t>−</m:t>
+                                      </m:r>
+                                      <m:acc>
+                                        <m:accPr>
+                                          <m:chr m:val="̅"/>
+                                          <m:ctrlPr>
+                                            <a:rPr lang="en-US" sz="2400" i="1">
+                                              <a:latin typeface="Cambria Math" panose="02040503050406030204" pitchFamily="18" charset="0"/>
+                                            </a:rPr>
+                                          </m:ctrlPr>
+                                        </m:accPr>
+                                        <m:e>
+                                          <m:r>
+                                            <a:rPr lang="en-US" sz="2400" i="1">
+                                              <a:latin typeface="Cambria Math" panose="02040503050406030204" pitchFamily="18" charset="0"/>
+                                            </a:rPr>
+                                            <m:t>𝑔</m:t>
+                                          </m:r>
+                                        </m:e>
+                                      </m:acc>
+                                    </m:e>
+                                  </m:d>
+                                </m:e>
+                              </m:nary>
+                            </m:e>
+                          </m:nary>
+                        </m:num>
+                        <m:den>
+                          <m:rad>
+                            <m:radPr>
+                              <m:degHide m:val="on"/>
+                              <m:ctrlPr>
+                                <a:rPr lang="en-US" sz="2400" i="1">
+                                  <a:latin typeface="Cambria Math" panose="02040503050406030204" pitchFamily="18" charset="0"/>
+                                </a:rPr>
+                              </m:ctrlPr>
+                            </m:radPr>
+                            <m:deg/>
+                            <m:e>
+                              <m:nary>
+                                <m:naryPr>
+                                  <m:chr m:val="∑"/>
+                                  <m:limLoc m:val="subSup"/>
+                                  <m:supHide m:val="on"/>
+                                  <m:ctrlPr>
+                                    <a:rPr lang="en-US" sz="2400" i="1">
+                                      <a:latin typeface="Cambria Math" panose="02040503050406030204" pitchFamily="18" charset="0"/>
+                                    </a:rPr>
+                                  </m:ctrlPr>
+                                </m:naryPr>
+                                <m:sub>
+                                  <m:r>
+                                    <a:rPr lang="en-US" sz="2400" i="1">
+                                      <a:latin typeface="Cambria Math" panose="02040503050406030204" pitchFamily="18" charset="0"/>
+                                    </a:rPr>
+                                    <m:t>𝑥</m:t>
+                                  </m:r>
+                                </m:sub>
+                                <m:sup/>
+                                <m:e>
+                                  <m:nary>
+                                    <m:naryPr>
+                                      <m:chr m:val="∑"/>
+                                      <m:limLoc m:val="subSup"/>
+                                      <m:supHide m:val="on"/>
+                                      <m:ctrlPr>
+                                        <a:rPr lang="en-US" sz="2400" i="1">
+                                          <a:latin typeface="Cambria Math" panose="02040503050406030204" pitchFamily="18" charset="0"/>
+                                        </a:rPr>
+                                      </m:ctrlPr>
+                                    </m:naryPr>
+                                    <m:sub>
+                                      <m:r>
+                                        <a:rPr lang="en-US" sz="2400" i="1">
+                                          <a:latin typeface="Cambria Math" panose="02040503050406030204" pitchFamily="18" charset="0"/>
+                                        </a:rPr>
+                                        <m:t>𝑦</m:t>
+                                      </m:r>
+                                    </m:sub>
+                                    <m:sup/>
+                                    <m:e>
+                                      <m:sSup>
+                                        <m:sSupPr>
+                                          <m:ctrlPr>
+                                            <a:rPr lang="en-US" sz="2400" i="1">
+                                              <a:latin typeface="Cambria Math" panose="02040503050406030204" pitchFamily="18" charset="0"/>
+                                            </a:rPr>
+                                          </m:ctrlPr>
+                                        </m:sSupPr>
+                                        <m:e>
+                                          <m:d>
+                                            <m:dPr>
+                                              <m:begChr m:val="["/>
+                                              <m:endChr m:val="]"/>
+                                              <m:ctrlPr>
+                                                <a:rPr lang="en-US" sz="2400" i="1">
+                                                  <a:latin typeface="Cambria Math" panose="02040503050406030204" pitchFamily="18" charset="0"/>
+                                                </a:rPr>
+                                              </m:ctrlPr>
+                                            </m:dPr>
+                                            <m:e>
+                                              <m:r>
+                                                <a:rPr lang="en-US" sz="2400" i="1">
+                                                  <a:latin typeface="Cambria Math" panose="02040503050406030204" pitchFamily="18" charset="0"/>
+                                                </a:rPr>
+                                                <m:t>𝑓</m:t>
+                                              </m:r>
+                                              <m:d>
+                                                <m:dPr>
+                                                  <m:ctrlPr>
+                                                    <a:rPr lang="en-US" sz="2400" i="1">
+                                                      <a:latin typeface="Cambria Math" panose="02040503050406030204" pitchFamily="18" charset="0"/>
+                                                    </a:rPr>
+                                                  </m:ctrlPr>
+                                                </m:dPr>
+                                                <m:e>
+                                                  <m:r>
+                                                    <a:rPr lang="en-US" sz="2400" i="1">
+                                                      <a:latin typeface="Cambria Math" panose="02040503050406030204" pitchFamily="18" charset="0"/>
+                                                    </a:rPr>
+                                                    <m:t>𝑥</m:t>
+                                                  </m:r>
+                                                  <m:r>
+                                                    <a:rPr lang="en-US" sz="2400" i="0">
+                                                      <a:latin typeface="Cambria Math" panose="02040503050406030204" pitchFamily="18" charset="0"/>
+                                                    </a:rPr>
+                                                    <m:t>,</m:t>
+                                                  </m:r>
+                                                  <m:r>
+                                                    <a:rPr lang="en-US" sz="2400" i="1">
+                                                      <a:latin typeface="Cambria Math" panose="02040503050406030204" pitchFamily="18" charset="0"/>
+                                                    </a:rPr>
+                                                    <m:t>𝑦</m:t>
+                                                  </m:r>
+                                                </m:e>
+                                              </m:d>
+                                              <m:r>
+                                                <a:rPr lang="en-US" sz="2400" i="0">
+                                                  <a:latin typeface="Cambria Math" panose="02040503050406030204" pitchFamily="18" charset="0"/>
+                                                </a:rPr>
+                                                <m:t>−</m:t>
+                                              </m:r>
+                                              <m:acc>
+                                                <m:accPr>
+                                                  <m:chr m:val="̅"/>
+                                                  <m:ctrlPr>
+                                                    <a:rPr lang="en-US" sz="2400" i="1">
+                                                      <a:latin typeface="Cambria Math" panose="02040503050406030204" pitchFamily="18" charset="0"/>
+                                                    </a:rPr>
+                                                  </m:ctrlPr>
+                                                </m:accPr>
+                                                <m:e>
+                                                  <m:r>
+                                                    <a:rPr lang="en-US" sz="2400" i="1">
+                                                      <a:latin typeface="Cambria Math" panose="02040503050406030204" pitchFamily="18" charset="0"/>
+                                                    </a:rPr>
+                                                    <m:t>𝑓</m:t>
+                                                  </m:r>
+                                                </m:e>
+                                              </m:acc>
+                                            </m:e>
+                                          </m:d>
+                                        </m:e>
+                                        <m:sup>
+                                          <m:r>
+                                            <a:rPr lang="en-US" sz="2400" i="0">
+                                              <a:latin typeface="Cambria Math" panose="02040503050406030204" pitchFamily="18" charset="0"/>
+                                            </a:rPr>
+                                            <m:t>2</m:t>
+                                          </m:r>
+                                        </m:sup>
+                                      </m:sSup>
+                                    </m:e>
+                                  </m:nary>
+                                </m:e>
+                              </m:nary>
+                              <m:nary>
+                                <m:naryPr>
+                                  <m:chr m:val="∑"/>
+                                  <m:limLoc m:val="subSup"/>
+                                  <m:supHide m:val="on"/>
+                                  <m:ctrlPr>
+                                    <a:rPr lang="en-US" sz="2400" i="1">
+                                      <a:latin typeface="Cambria Math" panose="02040503050406030204" pitchFamily="18" charset="0"/>
+                                    </a:rPr>
+                                  </m:ctrlPr>
+                                </m:naryPr>
+                                <m:sub>
+                                  <m:r>
+                                    <a:rPr lang="en-US" sz="2400" i="1">
+                                      <a:latin typeface="Cambria Math" panose="02040503050406030204" pitchFamily="18" charset="0"/>
+                                    </a:rPr>
+                                    <m:t>𝑚</m:t>
+                                  </m:r>
+                                </m:sub>
+                                <m:sup/>
+                                <m:e>
+                                  <m:nary>
+                                    <m:naryPr>
+                                      <m:chr m:val="∑"/>
+                                      <m:limLoc m:val="subSup"/>
+                                      <m:supHide m:val="on"/>
+                                      <m:ctrlPr>
+                                        <a:rPr lang="en-US" sz="2400" i="1">
+                                          <a:latin typeface="Cambria Math" panose="02040503050406030204" pitchFamily="18" charset="0"/>
+                                        </a:rPr>
+                                      </m:ctrlPr>
+                                    </m:naryPr>
+                                    <m:sub>
+                                      <m:r>
+                                        <a:rPr lang="en-US" sz="2400" i="1">
+                                          <a:latin typeface="Cambria Math" panose="02040503050406030204" pitchFamily="18" charset="0"/>
+                                        </a:rPr>
+                                        <m:t>𝑛</m:t>
+                                      </m:r>
+                                    </m:sub>
+                                    <m:sup/>
+                                    <m:e>
+                                      <m:sSup>
+                                        <m:sSupPr>
+                                          <m:ctrlPr>
+                                            <a:rPr lang="en-US" sz="2400" i="1">
+                                              <a:latin typeface="Cambria Math" panose="02040503050406030204" pitchFamily="18" charset="0"/>
+                                            </a:rPr>
+                                          </m:ctrlPr>
+                                        </m:sSupPr>
+                                        <m:e>
+                                          <m:d>
+                                            <m:dPr>
+                                              <m:begChr m:val="["/>
+                                              <m:endChr m:val="]"/>
+                                              <m:ctrlPr>
+                                                <a:rPr lang="en-US" sz="2400" i="1">
+                                                  <a:latin typeface="Cambria Math" panose="02040503050406030204" pitchFamily="18" charset="0"/>
+                                                </a:rPr>
+                                              </m:ctrlPr>
+                                            </m:dPr>
+                                            <m:e>
+                                              <m:r>
+                                                <a:rPr lang="en-US" sz="2400" i="1">
+                                                  <a:latin typeface="Cambria Math" panose="02040503050406030204" pitchFamily="18" charset="0"/>
+                                                </a:rPr>
+                                                <m:t>𝑔</m:t>
+                                              </m:r>
+                                              <m:d>
+                                                <m:dPr>
+                                                  <m:ctrlPr>
+                                                    <a:rPr lang="en-US" sz="2400" i="1">
+                                                      <a:latin typeface="Cambria Math" panose="02040503050406030204" pitchFamily="18" charset="0"/>
+                                                    </a:rPr>
+                                                  </m:ctrlPr>
+                                                </m:dPr>
+                                                <m:e>
+                                                  <m:r>
+                                                    <a:rPr lang="en-US" sz="2400" i="1">
+                                                      <a:latin typeface="Cambria Math" panose="02040503050406030204" pitchFamily="18" charset="0"/>
+                                                    </a:rPr>
+                                                    <m:t>𝑚</m:t>
+                                                  </m:r>
+                                                  <m:r>
+                                                    <a:rPr lang="en-US" sz="2400" i="0">
+                                                      <a:latin typeface="Cambria Math" panose="02040503050406030204" pitchFamily="18" charset="0"/>
+                                                    </a:rPr>
+                                                    <m:t>,</m:t>
+                                                  </m:r>
+                                                  <m:r>
+                                                    <a:rPr lang="en-US" sz="2400" i="1">
+                                                      <a:latin typeface="Cambria Math" panose="02040503050406030204" pitchFamily="18" charset="0"/>
+                                                    </a:rPr>
+                                                    <m:t>𝑛</m:t>
+                                                  </m:r>
+                                                </m:e>
+                                              </m:d>
+                                              <m:r>
+                                                <a:rPr lang="en-US" sz="2400" i="0">
+                                                  <a:latin typeface="Cambria Math" panose="02040503050406030204" pitchFamily="18" charset="0"/>
+                                                </a:rPr>
+                                                <m:t>−</m:t>
+                                              </m:r>
+                                              <m:acc>
+                                                <m:accPr>
+                                                  <m:chr m:val="̅"/>
+                                                  <m:ctrlPr>
+                                                    <a:rPr lang="en-US" sz="2400" i="1">
+                                                      <a:latin typeface="Cambria Math" panose="02040503050406030204" pitchFamily="18" charset="0"/>
+                                                    </a:rPr>
+                                                  </m:ctrlPr>
+                                                </m:accPr>
+                                                <m:e>
+                                                  <m:r>
+                                                    <a:rPr lang="en-US" sz="2400" i="1">
+                                                      <a:latin typeface="Cambria Math" panose="02040503050406030204" pitchFamily="18" charset="0"/>
+                                                    </a:rPr>
+                                                    <m:t>𝑔</m:t>
+                                                  </m:r>
+                                                </m:e>
+                                              </m:acc>
+                                            </m:e>
+                                          </m:d>
+                                        </m:e>
+                                        <m:sup>
+                                          <m:r>
+                                            <a:rPr lang="en-US" sz="2400" i="0">
+                                              <a:latin typeface="Cambria Math" panose="02040503050406030204" pitchFamily="18" charset="0"/>
+                                            </a:rPr>
+                                            <m:t>2</m:t>
+                                          </m:r>
+                                        </m:sup>
+                                      </m:sSup>
+                                    </m:e>
+                                  </m:nary>
+                                </m:e>
+                              </m:nary>
+                            </m:e>
+                          </m:rad>
+                        </m:den>
+                      </m:f>
+                    </m:oMath>
+                  </m:oMathPara>
+                </a14:m>
+                <a:endParaRPr lang="en-US" sz="2400" dirty="0"/>
+              </a:p>
+            </p:txBody>
+          </p:sp>
+        </mc:Choice>
+        <mc:Fallback xmlns="">
+          <p:sp>
+            <p:nvSpPr>
+              <p:cNvPr id="14" name="Rectángulo 13"/>
+              <p:cNvSpPr>
+                <a:spLocks noRot="1" noChangeAspect="1" noMove="1" noResize="1" noEditPoints="1" noAdjustHandles="1" noChangeArrowheads="1" noChangeShapeType="1" noTextEdit="1"/>
+              </p:cNvSpPr>
+              <p:nvPr/>
+            </p:nvSpPr>
+            <p:spPr>
+              <a:xfrm>
+                <a:off x="2589212" y="4350149"/>
+                <a:ext cx="6690421" cy="1313758"/>
+              </a:xfrm>
+              <a:prstGeom prst="rect">
+                <a:avLst/>
+              </a:prstGeom>
+              <a:blipFill rotWithShape="0">
+                <a:blip r:embed="rId2"/>
+                <a:stretch>
+                  <a:fillRect/>
+                </a:stretch>
+              </a:blipFill>
+            </p:spPr>
+            <p:txBody>
+              <a:bodyPr/>
+              <a:lstStyle/>
+              <a:p>
+                <a:r>
+                  <a:rPr lang="en-US">
+                    <a:noFill/>
+                  </a:rPr>
+                  <a:t> </a:t>
+                </a:r>
+              </a:p>
+            </p:txBody>
+          </p:sp>
+        </mc:Fallback>
+      </mc:AlternateContent>
+    </p:spTree>
+    <p:extLst>
+      <p:ext uri="{BB962C8B-B14F-4D97-AF65-F5344CB8AC3E}">
+        <p14:creationId xmlns:p14="http://schemas.microsoft.com/office/powerpoint/2010/main" val="3708698488"/>
+      </p:ext>
+    </p:extLst>
+  </p:cSld>
+  <p:clrMapOvr>
+    <a:masterClrMapping/>
+  </p:clrMapOvr>
+</p:sld>
+</file>
+
+<file path=ppt/slides/slide23.xml><?xml version="1.0" encoding="utf-8"?>
+<p:sld xmlns:a="http://schemas.openxmlformats.org/drawingml/2006/main" xmlns:r="http://schemas.openxmlformats.org/officeDocument/2006/relationships" xmlns:p="http://schemas.openxmlformats.org/presentationml/2006/main">
+  <p:cSld>
+    <p:spTree>
+      <p:nvGrpSpPr>
+        <p:cNvPr id="1" name=""/>
+        <p:cNvGrpSpPr/>
+        <p:nvPr/>
+      </p:nvGrpSpPr>
+      <p:grpSpPr>
+        <a:xfrm>
+          <a:off x="0" y="0"/>
+          <a:ext cx="0" cy="0"/>
+          <a:chOff x="0" y="0"/>
+          <a:chExt cx="0" cy="0"/>
+        </a:xfrm>
+      </p:grpSpPr>
+      <p:sp>
+        <p:nvSpPr>
+          <p:cNvPr id="2" name="Título 1"/>
+          <p:cNvSpPr>
+            <a:spLocks noGrp="1"/>
+          </p:cNvSpPr>
+          <p:nvPr>
+            <p:ph type="title"/>
+          </p:nvPr>
+        </p:nvSpPr>
+        <p:spPr/>
+        <p:txBody>
+          <a:bodyPr/>
+          <a:lstStyle/>
+          <a:p>
+            <a:r>
+              <a:rPr lang="en-US" dirty="0"/>
+              <a:t>Gesture recognition – Operations between images – </a:t>
+            </a:r>
+            <a:r>
+              <a:rPr lang="en-US" sz="2800" dirty="0"/>
+              <a:t>Image correlation</a:t>
+            </a:r>
+            <a:endParaRPr lang="en-US" dirty="0"/>
+          </a:p>
+        </p:txBody>
+      </p:sp>
+      <p:sp>
+        <p:nvSpPr>
+          <p:cNvPr id="3" name="Marcador de contenido 2"/>
+          <p:cNvSpPr>
+            <a:spLocks noGrp="1"/>
+          </p:cNvSpPr>
+          <p:nvPr>
+            <p:ph idx="1"/>
+          </p:nvPr>
+        </p:nvSpPr>
+        <p:spPr/>
+        <p:txBody>
+          <a:bodyPr/>
+          <a:lstStyle/>
+          <a:p>
+            <a:endParaRPr lang="en-US" dirty="0"/>
+          </a:p>
+        </p:txBody>
+      </p:sp>
+      <p:pic>
+        <p:nvPicPr>
+          <p:cNvPr id="4" name="Imagen 3"/>
+          <p:cNvPicPr>
+            <a:picLocks noChangeAspect="1"/>
+          </p:cNvPicPr>
+          <p:nvPr/>
+        </p:nvPicPr>
+        <p:blipFill rotWithShape="1">
+          <a:blip r:embed="rId2">
+            <a:extLst>
+              <a:ext uri="{28A0092B-C50C-407E-A947-70E740481C1C}">
+                <a14:useLocalDpi xmlns:a14="http://schemas.microsoft.com/office/drawing/2010/main" val="0"/>
+              </a:ext>
+            </a:extLst>
+          </a:blip>
+          <a:srcRect l="7613" t="17174" r="69160" b="18812"/>
+          <a:stretch/>
+        </p:blipFill>
+        <p:spPr>
+          <a:xfrm>
+            <a:off x="5261903" y="2830231"/>
+            <a:ext cx="2268000" cy="2268000"/>
+          </a:xfrm>
+          <a:prstGeom prst="rect">
+            <a:avLst/>
+          </a:prstGeom>
+        </p:spPr>
+      </p:pic>
+      <p:pic>
+        <p:nvPicPr>
+          <p:cNvPr id="5" name="Imagen 4"/>
+          <p:cNvPicPr>
+            <a:picLocks noChangeAspect="1"/>
+          </p:cNvPicPr>
+          <p:nvPr/>
+        </p:nvPicPr>
+        <p:blipFill rotWithShape="1">
+          <a:blip r:embed="rId2">
+            <a:extLst>
+              <a:ext uri="{28A0092B-C50C-407E-A947-70E740481C1C}">
+                <a14:useLocalDpi xmlns:a14="http://schemas.microsoft.com/office/drawing/2010/main" val="0"/>
+              </a:ext>
+            </a:extLst>
+          </a:blip>
+          <a:srcRect l="38629" t="17174" r="38513" b="18812"/>
+          <a:stretch/>
+        </p:blipFill>
+        <p:spPr>
+          <a:xfrm>
+            <a:off x="1938203" y="2830231"/>
+            <a:ext cx="2232000" cy="2268000"/>
+          </a:xfrm>
+          <a:prstGeom prst="rect">
+            <a:avLst/>
+          </a:prstGeom>
+        </p:spPr>
+      </p:pic>
+      <p:pic>
+        <p:nvPicPr>
+          <p:cNvPr id="6" name="Imagen 5"/>
+          <p:cNvPicPr>
+            <a:picLocks noChangeAspect="1"/>
+          </p:cNvPicPr>
+          <p:nvPr/>
+        </p:nvPicPr>
+        <p:blipFill rotWithShape="1">
+          <a:blip r:embed="rId2">
+            <a:extLst>
+              <a:ext uri="{28A0092B-C50C-407E-A947-70E740481C1C}">
+                <a14:useLocalDpi xmlns:a14="http://schemas.microsoft.com/office/drawing/2010/main" val="0"/>
+              </a:ext>
+            </a:extLst>
+          </a:blip>
+          <a:srcRect l="69148" t="17174" r="7993" b="18812"/>
+          <a:stretch/>
+        </p:blipFill>
+        <p:spPr>
+          <a:xfrm>
+            <a:off x="8621603" y="2830231"/>
+            <a:ext cx="2232000" cy="2268000"/>
+          </a:xfrm>
+          <a:prstGeom prst="rect">
+            <a:avLst/>
+          </a:prstGeom>
+        </p:spPr>
+      </p:pic>
+      <p:sp>
+        <p:nvSpPr>
+          <p:cNvPr id="7" name="Rectángulo 6"/>
+          <p:cNvSpPr/>
+          <p:nvPr/>
+        </p:nvSpPr>
+        <p:spPr>
+          <a:xfrm>
+            <a:off x="1938203" y="2830231"/>
+            <a:ext cx="137547" cy="115516"/>
+          </a:xfrm>
+          <a:prstGeom prst="rect">
+            <a:avLst/>
+          </a:prstGeom>
+          <a:noFill/>
+          <a:ln w="12700">
+            <a:solidFill>
+              <a:schemeClr val="accent1"/>
+            </a:solidFill>
+          </a:ln>
+        </p:spPr>
+        <p:style>
+          <a:lnRef idx="2">
+            <a:schemeClr val="accent1">
+              <a:shade val="50000"/>
+            </a:schemeClr>
+          </a:lnRef>
+          <a:fillRef idx="1">
+            <a:schemeClr val="accent1"/>
+          </a:fillRef>
+          <a:effectRef idx="0">
+            <a:schemeClr val="accent1"/>
+          </a:effectRef>
+          <a:fontRef idx="minor">
+            <a:schemeClr val="lt1"/>
+          </a:fontRef>
+        </p:style>
+        <p:txBody>
+          <a:bodyPr rtlCol="0" anchor="ctr"/>
+          <a:lstStyle/>
+          <a:p>
+            <a:pPr algn="ctr"/>
+            <a:endParaRPr lang="en-US"/>
+          </a:p>
+        </p:txBody>
+      </p:sp>
+      <p:sp>
+        <p:nvSpPr>
+          <p:cNvPr id="8" name="Rectángulo 7"/>
+          <p:cNvSpPr/>
+          <p:nvPr/>
+        </p:nvSpPr>
+        <p:spPr>
+          <a:xfrm>
+            <a:off x="2075750" y="2830231"/>
+            <a:ext cx="137547" cy="115516"/>
+          </a:xfrm>
+          <a:prstGeom prst="rect">
+            <a:avLst/>
+          </a:prstGeom>
+          <a:noFill/>
+          <a:ln w="12700">
+            <a:solidFill>
+              <a:schemeClr val="accent1"/>
+            </a:solidFill>
+          </a:ln>
+        </p:spPr>
+        <p:style>
+          <a:lnRef idx="2">
+            <a:schemeClr val="accent1">
+              <a:shade val="50000"/>
+            </a:schemeClr>
+          </a:lnRef>
+          <a:fillRef idx="1">
+            <a:schemeClr val="accent1"/>
+          </a:fillRef>
+          <a:effectRef idx="0">
+            <a:schemeClr val="accent1"/>
+          </a:effectRef>
+          <a:fontRef idx="minor">
+            <a:schemeClr val="lt1"/>
+          </a:fontRef>
+        </p:style>
+        <p:txBody>
+          <a:bodyPr rtlCol="0" anchor="ctr"/>
+          <a:lstStyle/>
+          <a:p>
+            <a:pPr algn="ctr"/>
+            <a:endParaRPr lang="en-US"/>
+          </a:p>
+        </p:txBody>
+      </p:sp>
+      <p:sp>
+        <p:nvSpPr>
+          <p:cNvPr id="9" name="Rectángulo 8"/>
+          <p:cNvSpPr/>
+          <p:nvPr/>
+        </p:nvSpPr>
+        <p:spPr>
+          <a:xfrm>
+            <a:off x="2213297" y="2830231"/>
+            <a:ext cx="137547" cy="115516"/>
+          </a:xfrm>
+          <a:prstGeom prst="rect">
+            <a:avLst/>
+          </a:prstGeom>
+          <a:noFill/>
+          <a:ln w="12700">
+            <a:solidFill>
+              <a:schemeClr val="accent1"/>
+            </a:solidFill>
+          </a:ln>
+        </p:spPr>
+        <p:style>
+          <a:lnRef idx="2">
+            <a:schemeClr val="accent1">
+              <a:shade val="50000"/>
+            </a:schemeClr>
+          </a:lnRef>
+          <a:fillRef idx="1">
+            <a:schemeClr val="accent1"/>
+          </a:fillRef>
+          <a:effectRef idx="0">
+            <a:schemeClr val="accent1"/>
+          </a:effectRef>
+          <a:fontRef idx="minor">
+            <a:schemeClr val="lt1"/>
+          </a:fontRef>
+        </p:style>
+        <p:txBody>
+          <a:bodyPr rtlCol="0" anchor="ctr"/>
+          <a:lstStyle/>
+          <a:p>
+            <a:pPr algn="ctr"/>
+            <a:endParaRPr lang="en-US"/>
+          </a:p>
+        </p:txBody>
+      </p:sp>
+      <p:sp>
+        <p:nvSpPr>
+          <p:cNvPr id="10" name="Rectángulo 9"/>
+          <p:cNvSpPr/>
+          <p:nvPr/>
+        </p:nvSpPr>
+        <p:spPr>
+          <a:xfrm>
+            <a:off x="2350844" y="2830231"/>
+            <a:ext cx="137547" cy="115516"/>
+          </a:xfrm>
+          <a:prstGeom prst="rect">
+            <a:avLst/>
+          </a:prstGeom>
+          <a:noFill/>
+          <a:ln w="12700">
+            <a:solidFill>
+              <a:schemeClr val="accent1"/>
+            </a:solidFill>
+          </a:ln>
+        </p:spPr>
+        <p:style>
+          <a:lnRef idx="2">
+            <a:schemeClr val="accent1">
+              <a:shade val="50000"/>
+            </a:schemeClr>
+          </a:lnRef>
+          <a:fillRef idx="1">
+            <a:schemeClr val="accent1"/>
+          </a:fillRef>
+          <a:effectRef idx="0">
+            <a:schemeClr val="accent1"/>
+          </a:effectRef>
+          <a:fontRef idx="minor">
+            <a:schemeClr val="lt1"/>
+          </a:fontRef>
+        </p:style>
+        <p:txBody>
+          <a:bodyPr rtlCol="0" anchor="ctr"/>
+          <a:lstStyle/>
+          <a:p>
+            <a:pPr algn="ctr"/>
+            <a:endParaRPr lang="en-US"/>
+          </a:p>
+        </p:txBody>
+      </p:sp>
+      <p:sp>
+        <p:nvSpPr>
+          <p:cNvPr id="11" name="Rectángulo 10"/>
+          <p:cNvSpPr/>
+          <p:nvPr/>
+        </p:nvSpPr>
+        <p:spPr>
+          <a:xfrm>
+            <a:off x="1938203" y="2945747"/>
+            <a:ext cx="137547" cy="115516"/>
+          </a:xfrm>
+          <a:prstGeom prst="rect">
+            <a:avLst/>
+          </a:prstGeom>
+          <a:noFill/>
+          <a:ln w="12700">
+            <a:solidFill>
+              <a:schemeClr val="accent1"/>
+            </a:solidFill>
+          </a:ln>
+        </p:spPr>
+        <p:style>
+          <a:lnRef idx="2">
+            <a:schemeClr val="accent1">
+              <a:shade val="50000"/>
+            </a:schemeClr>
+          </a:lnRef>
+          <a:fillRef idx="1">
+            <a:schemeClr val="accent1"/>
+          </a:fillRef>
+          <a:effectRef idx="0">
+            <a:schemeClr val="accent1"/>
+          </a:effectRef>
+          <a:fontRef idx="minor">
+            <a:schemeClr val="lt1"/>
+          </a:fontRef>
+        </p:style>
+        <p:txBody>
+          <a:bodyPr rtlCol="0" anchor="ctr"/>
+          <a:lstStyle/>
+          <a:p>
+            <a:pPr algn="ctr"/>
+            <a:endParaRPr lang="en-US"/>
+          </a:p>
+        </p:txBody>
+      </p:sp>
+      <p:sp>
+        <p:nvSpPr>
+          <p:cNvPr id="12" name="Rectángulo 11"/>
+          <p:cNvSpPr/>
+          <p:nvPr/>
+        </p:nvSpPr>
+        <p:spPr>
+          <a:xfrm>
+            <a:off x="2075750" y="2945747"/>
+            <a:ext cx="137547" cy="115516"/>
+          </a:xfrm>
+          <a:prstGeom prst="rect">
+            <a:avLst/>
+          </a:prstGeom>
+          <a:noFill/>
+          <a:ln w="12700">
+            <a:solidFill>
+              <a:schemeClr val="accent1"/>
+            </a:solidFill>
+          </a:ln>
+        </p:spPr>
+        <p:style>
+          <a:lnRef idx="2">
+            <a:schemeClr val="accent1">
+              <a:shade val="50000"/>
+            </a:schemeClr>
+          </a:lnRef>
+          <a:fillRef idx="1">
+            <a:schemeClr val="accent1"/>
+          </a:fillRef>
+          <a:effectRef idx="0">
+            <a:schemeClr val="accent1"/>
+          </a:effectRef>
+          <a:fontRef idx="minor">
+            <a:schemeClr val="lt1"/>
+          </a:fontRef>
+        </p:style>
+        <p:txBody>
+          <a:bodyPr rtlCol="0" anchor="ctr"/>
+          <a:lstStyle/>
+          <a:p>
+            <a:pPr algn="ctr"/>
+            <a:endParaRPr lang="en-US"/>
+          </a:p>
+        </p:txBody>
+      </p:sp>
+      <p:sp>
+        <p:nvSpPr>
+          <p:cNvPr id="13" name="Rectángulo 12"/>
+          <p:cNvSpPr/>
+          <p:nvPr/>
+        </p:nvSpPr>
+        <p:spPr>
+          <a:xfrm>
+            <a:off x="1938202" y="3061263"/>
+            <a:ext cx="137547" cy="115516"/>
+          </a:xfrm>
+          <a:prstGeom prst="rect">
+            <a:avLst/>
+          </a:prstGeom>
+          <a:noFill/>
+          <a:ln w="12700">
+            <a:solidFill>
+              <a:schemeClr val="accent1"/>
+            </a:solidFill>
+          </a:ln>
+        </p:spPr>
+        <p:style>
+          <a:lnRef idx="2">
+            <a:schemeClr val="accent1">
+              <a:shade val="50000"/>
+            </a:schemeClr>
+          </a:lnRef>
+          <a:fillRef idx="1">
+            <a:schemeClr val="accent1"/>
+          </a:fillRef>
+          <a:effectRef idx="0">
+            <a:schemeClr val="accent1"/>
+          </a:effectRef>
+          <a:fontRef idx="minor">
+            <a:schemeClr val="lt1"/>
+          </a:fontRef>
+        </p:style>
+        <p:txBody>
+          <a:bodyPr rtlCol="0" anchor="ctr"/>
+          <a:lstStyle/>
+          <a:p>
+            <a:pPr algn="ctr"/>
+            <a:endParaRPr lang="en-US"/>
+          </a:p>
+        </p:txBody>
+      </p:sp>
+    </p:spTree>
+    <p:extLst>
+      <p:ext uri="{BB962C8B-B14F-4D97-AF65-F5344CB8AC3E}">
+        <p14:creationId xmlns:p14="http://schemas.microsoft.com/office/powerpoint/2010/main" val="4272879077"/>
+      </p:ext>
+    </p:extLst>
+  </p:cSld>
+  <p:clrMapOvr>
+    <a:masterClrMapping/>
+  </p:clrMapOvr>
+</p:sld>
+</file>
+
+<file path=ppt/slides/slide24.xml><?xml version="1.0" encoding="utf-8"?>
+<p:sld xmlns:a="http://schemas.openxmlformats.org/drawingml/2006/main" xmlns:r="http://schemas.openxmlformats.org/officeDocument/2006/relationships" xmlns:p="http://schemas.openxmlformats.org/presentationml/2006/main">
+  <p:cSld>
+    <p:spTree>
+      <p:nvGrpSpPr>
+        <p:cNvPr id="1" name=""/>
+        <p:cNvGrpSpPr/>
+        <p:nvPr/>
+      </p:nvGrpSpPr>
+      <p:grpSpPr>
+        <a:xfrm>
+          <a:off x="0" y="0"/>
+          <a:ext cx="0" cy="0"/>
+          <a:chOff x="0" y="0"/>
+          <a:chExt cx="0" cy="0"/>
+        </a:xfrm>
+      </p:grpSpPr>
+      <p:sp>
+        <p:nvSpPr>
+          <p:cNvPr id="2" name="Título 1"/>
+          <p:cNvSpPr>
+            <a:spLocks noGrp="1"/>
+          </p:cNvSpPr>
+          <p:nvPr>
+            <p:ph type="title"/>
+          </p:nvPr>
+        </p:nvSpPr>
+        <p:spPr/>
+        <p:txBody>
+          <a:bodyPr/>
+          <a:lstStyle/>
+          <a:p>
+            <a:r>
+              <a:rPr lang="en-US" dirty="0" smtClean="0"/>
+              <a:t>Machine </a:t>
+            </a:r>
+            <a:r>
+              <a:rPr lang="en-US" smtClean="0"/>
+              <a:t>Learning models</a:t>
+            </a:r>
+            <a:endParaRPr lang="en-US"/>
+          </a:p>
+        </p:txBody>
+      </p:sp>
+      <p:sp>
+        <p:nvSpPr>
+          <p:cNvPr id="3" name="Marcador de contenido 2"/>
+          <p:cNvSpPr>
+            <a:spLocks noGrp="1"/>
+          </p:cNvSpPr>
+          <p:nvPr>
+            <p:ph idx="1"/>
+          </p:nvPr>
+        </p:nvSpPr>
+        <p:spPr/>
+        <p:txBody>
+          <a:bodyPr/>
+          <a:lstStyle/>
+          <a:p>
+            <a:r>
+              <a:rPr lang="en-US" dirty="0" smtClean="0"/>
+              <a:t>Generating machine learning models from the database to let the system learn is another option we have to consider.</a:t>
+            </a:r>
+          </a:p>
+          <a:p>
+            <a:r>
+              <a:rPr lang="en-US" dirty="0" smtClean="0"/>
+              <a:t>From the captured image database we can train models using different algorithms and study which is the best that fits for this problem.</a:t>
+            </a:r>
+            <a:endParaRPr lang="en-US" dirty="0"/>
+          </a:p>
+          <a:p>
+            <a:r>
+              <a:rPr lang="en-US" dirty="0" smtClean="0"/>
+              <a:t>There are many different algorithms for training, but we are going to focus on the ones that have been used in the prior work: ANN and RDF.</a:t>
+            </a:r>
+          </a:p>
+          <a:p>
+            <a:pPr lvl="1"/>
+            <a:endParaRPr lang="en-US" dirty="0" smtClean="0"/>
+          </a:p>
+        </p:txBody>
+      </p:sp>
+      <p:pic>
+        <p:nvPicPr>
+          <p:cNvPr id="4" name="Imagen 3"/>
+          <p:cNvPicPr>
+            <a:picLocks noChangeAspect="1"/>
+          </p:cNvPicPr>
+          <p:nvPr/>
+        </p:nvPicPr>
+        <p:blipFill>
+          <a:blip r:embed="rId2">
+            <a:extLst>
+              <a:ext uri="{28A0092B-C50C-407E-A947-70E740481C1C}">
+                <a14:useLocalDpi xmlns:a14="http://schemas.microsoft.com/office/drawing/2010/main" val="0"/>
+              </a:ext>
+            </a:extLst>
+          </a:blip>
+          <a:stretch>
+            <a:fillRect/>
+          </a:stretch>
+        </p:blipFill>
+        <p:spPr>
+          <a:xfrm>
+            <a:off x="2589212" y="4450975"/>
+            <a:ext cx="2913267" cy="2070847"/>
+          </a:xfrm>
+          <a:prstGeom prst="rect">
+            <a:avLst/>
+          </a:prstGeom>
+        </p:spPr>
+      </p:pic>
+      <p:pic>
+        <p:nvPicPr>
+          <p:cNvPr id="5" name="Imagen 4"/>
+          <p:cNvPicPr>
+            <a:picLocks noChangeAspect="1"/>
+          </p:cNvPicPr>
+          <p:nvPr/>
+        </p:nvPicPr>
+        <p:blipFill>
+          <a:blip r:embed="rId3">
+            <a:extLst>
+              <a:ext uri="{28A0092B-C50C-407E-A947-70E740481C1C}">
+                <a14:useLocalDpi xmlns:a14="http://schemas.microsoft.com/office/drawing/2010/main" val="0"/>
+              </a:ext>
+            </a:extLst>
+          </a:blip>
+          <a:stretch>
+            <a:fillRect/>
+          </a:stretch>
+        </p:blipFill>
+        <p:spPr>
+          <a:xfrm>
+            <a:off x="7198062" y="4450975"/>
+            <a:ext cx="3537992" cy="2070848"/>
+          </a:xfrm>
+          <a:prstGeom prst="rect">
+            <a:avLst/>
+          </a:prstGeom>
+        </p:spPr>
+      </p:pic>
+    </p:spTree>
+    <p:extLst>
+      <p:ext uri="{BB962C8B-B14F-4D97-AF65-F5344CB8AC3E}">
+        <p14:creationId xmlns:p14="http://schemas.microsoft.com/office/powerpoint/2010/main" val="1341712310"/>
+      </p:ext>
+    </p:extLst>
+  </p:cSld>
+  <p:clrMapOvr>
+    <a:masterClrMapping/>
+  </p:clrMapOvr>
+</p:sld>
+</file>
+
+<file path=ppt/slides/slide25.xml><?xml version="1.0" encoding="utf-8"?>
+<p:sld xmlns:a="http://schemas.openxmlformats.org/drawingml/2006/main" xmlns:r="http://schemas.openxmlformats.org/officeDocument/2006/relationships" xmlns:p="http://schemas.openxmlformats.org/presentationml/2006/main">
+  <p:cSld>
+    <p:spTree>
+      <p:nvGrpSpPr>
+        <p:cNvPr id="1" name=""/>
+        <p:cNvGrpSpPr/>
+        <p:nvPr/>
+      </p:nvGrpSpPr>
+      <p:grpSpPr>
+        <a:xfrm>
+          <a:off x="0" y="0"/>
+          <a:ext cx="0" cy="0"/>
+          <a:chOff x="0" y="0"/>
+          <a:chExt cx="0" cy="0"/>
+        </a:xfrm>
+      </p:grpSpPr>
+      <p:sp>
+        <p:nvSpPr>
+          <p:cNvPr id="2" name="Título 1"/>
+          <p:cNvSpPr>
+            <a:spLocks noGrp="1"/>
+          </p:cNvSpPr>
+          <p:nvPr>
+            <p:ph type="title"/>
+          </p:nvPr>
+        </p:nvSpPr>
+        <p:spPr/>
+        <p:txBody>
+          <a:bodyPr/>
+          <a:lstStyle/>
+          <a:p>
+            <a:r>
+              <a:rPr lang="en-US" dirty="0" smtClean="0"/>
+              <a:t>Machine Learning models - Boosting</a:t>
+            </a:r>
+            <a:endParaRPr lang="en-US" dirty="0"/>
+          </a:p>
+        </p:txBody>
+      </p:sp>
+      <p:sp>
+        <p:nvSpPr>
+          <p:cNvPr id="3" name="Marcador de contenido 2"/>
+          <p:cNvSpPr>
+            <a:spLocks noGrp="1"/>
+          </p:cNvSpPr>
+          <p:nvPr>
+            <p:ph idx="1"/>
+          </p:nvPr>
+        </p:nvSpPr>
+        <p:spPr/>
+        <p:txBody>
+          <a:bodyPr/>
+          <a:lstStyle/>
+          <a:p>
+            <a:r>
+              <a:rPr lang="en-US" dirty="0" smtClean="0"/>
+              <a:t>Since Sign Language has a lot of gestures, in the future we are going to need to add more of them to the database, therefore the resulting precision of the models after retraining will decrease considerably.</a:t>
+            </a:r>
+          </a:p>
+          <a:p>
+            <a:endParaRPr lang="en-US" dirty="0" smtClean="0"/>
+          </a:p>
+          <a:p>
+            <a:r>
+              <a:rPr lang="en-US" dirty="0" smtClean="0"/>
+              <a:t>To avoid this problem we have to consider using  the boosting technique which will allow, using different types of models and configurations, to achieve better accuracy.</a:t>
+            </a:r>
+            <a:endParaRPr lang="en-US" dirty="0"/>
+          </a:p>
+        </p:txBody>
+      </p:sp>
+    </p:spTree>
+    <p:extLst>
+      <p:ext uri="{BB962C8B-B14F-4D97-AF65-F5344CB8AC3E}">
+        <p14:creationId xmlns:p14="http://schemas.microsoft.com/office/powerpoint/2010/main" val="323683520"/>
+      </p:ext>
+    </p:extLst>
+  </p:cSld>
+  <p:clrMapOvr>
+    <a:masterClrMapping/>
+  </p:clrMapOvr>
+</p:sld>
+</file>
+
+<file path=ppt/slides/slide26.xml><?xml version="1.0" encoding="utf-8"?>
+<p:sld xmlns:a="http://schemas.openxmlformats.org/drawingml/2006/main" xmlns:r="http://schemas.openxmlformats.org/officeDocument/2006/relationships" xmlns:p="http://schemas.openxmlformats.org/presentationml/2006/main">
+  <p:cSld>
+    <p:spTree>
+      <p:nvGrpSpPr>
+        <p:cNvPr id="1" name=""/>
+        <p:cNvGrpSpPr/>
+        <p:nvPr/>
+      </p:nvGrpSpPr>
+      <p:grpSpPr>
+        <a:xfrm>
+          <a:off x="0" y="0"/>
+          <a:ext cx="0" cy="0"/>
+          <a:chOff x="0" y="0"/>
+          <a:chExt cx="0" cy="0"/>
+        </a:xfrm>
+      </p:grpSpPr>
+      <p:sp>
+        <p:nvSpPr>
+          <p:cNvPr id="4" name="Título 3"/>
+          <p:cNvSpPr>
+            <a:spLocks noGrp="1"/>
+          </p:cNvSpPr>
+          <p:nvPr>
+            <p:ph type="title"/>
+          </p:nvPr>
+        </p:nvSpPr>
+        <p:spPr/>
+        <p:txBody>
+          <a:bodyPr/>
+          <a:lstStyle/>
+          <a:p>
+            <a:r>
+              <a:rPr lang="en-US" dirty="0" smtClean="0"/>
+              <a:t>Testing in real world</a:t>
+            </a:r>
+            <a:endParaRPr lang="en-US" dirty="0"/>
+          </a:p>
+        </p:txBody>
+      </p:sp>
+      <p:sp>
+        <p:nvSpPr>
+          <p:cNvPr id="5" name="Marcador de texto 4"/>
+          <p:cNvSpPr>
+            <a:spLocks noGrp="1"/>
+          </p:cNvSpPr>
+          <p:nvPr>
+            <p:ph type="body" idx="1"/>
+          </p:nvPr>
+        </p:nvSpPr>
+        <p:spPr/>
+        <p:txBody>
+          <a:bodyPr/>
+          <a:lstStyle/>
+          <a:p>
+            <a:endParaRPr lang="en-US"/>
+          </a:p>
+        </p:txBody>
+      </p:sp>
+    </p:spTree>
+    <p:extLst>
+      <p:ext uri="{BB962C8B-B14F-4D97-AF65-F5344CB8AC3E}">
+        <p14:creationId xmlns:p14="http://schemas.microsoft.com/office/powerpoint/2010/main" val="2011251406"/>
+      </p:ext>
+    </p:extLst>
+  </p:cSld>
+  <p:clrMapOvr>
+    <a:masterClrMapping/>
+  </p:clrMapOvr>
+</p:sld>
+</file>
+
+<file path=ppt/slides/slide27.xml><?xml version="1.0" encoding="utf-8"?>
+<p:sld xmlns:a="http://schemas.openxmlformats.org/drawingml/2006/main" xmlns:r="http://schemas.openxmlformats.org/officeDocument/2006/relationships" xmlns:p="http://schemas.openxmlformats.org/presentationml/2006/main">
+  <p:cSld>
+    <p:spTree>
+      <p:nvGrpSpPr>
+        <p:cNvPr id="1" name=""/>
+        <p:cNvGrpSpPr/>
+        <p:nvPr/>
+      </p:nvGrpSpPr>
+      <p:grpSpPr>
+        <a:xfrm>
+          <a:off x="0" y="0"/>
+          <a:ext cx="0" cy="0"/>
+          <a:chOff x="0" y="0"/>
+          <a:chExt cx="0" cy="0"/>
+        </a:xfrm>
+      </p:grpSpPr>
+      <p:sp>
+        <p:nvSpPr>
+          <p:cNvPr id="4" name="Título 3"/>
+          <p:cNvSpPr>
+            <a:spLocks noGrp="1"/>
+          </p:cNvSpPr>
+          <p:nvPr>
+            <p:ph type="title"/>
+          </p:nvPr>
+        </p:nvSpPr>
+        <p:spPr/>
+        <p:txBody>
+          <a:bodyPr/>
+          <a:lstStyle/>
+          <a:p>
+            <a:r>
+              <a:rPr lang="en-US" dirty="0" smtClean="0"/>
+              <a:t>Testing in real world</a:t>
+            </a:r>
+            <a:endParaRPr lang="en-US" dirty="0"/>
+          </a:p>
+        </p:txBody>
+      </p:sp>
+      <p:sp>
+        <p:nvSpPr>
+          <p:cNvPr id="5" name="Marcador de contenido 4"/>
+          <p:cNvSpPr>
+            <a:spLocks noGrp="1"/>
+          </p:cNvSpPr>
+          <p:nvPr>
+            <p:ph idx="1"/>
+          </p:nvPr>
+        </p:nvSpPr>
+        <p:spPr/>
+        <p:txBody>
+          <a:bodyPr/>
+          <a:lstStyle/>
+          <a:p>
+            <a:r>
+              <a:rPr lang="en-US" dirty="0" smtClean="0"/>
+              <a:t>We are going to ask to the Sign Language department at Boise State University to get some student volunteers to perform some gestures in front of the camera.</a:t>
+            </a:r>
+          </a:p>
+          <a:p>
+            <a:endParaRPr lang="en-US" dirty="0"/>
+          </a:p>
+          <a:p>
+            <a:r>
+              <a:rPr lang="en-US" dirty="0" smtClean="0"/>
+              <a:t>With this test we will know if the system is capable to recognize the gestures, work in real time and if the accuracy is enough for the problem.</a:t>
+            </a:r>
+            <a:endParaRPr lang="en-US" dirty="0"/>
+          </a:p>
+        </p:txBody>
+      </p:sp>
+    </p:spTree>
+    <p:extLst>
+      <p:ext uri="{BB962C8B-B14F-4D97-AF65-F5344CB8AC3E}">
+        <p14:creationId xmlns:p14="http://schemas.microsoft.com/office/powerpoint/2010/main" val="3516071399"/>
+      </p:ext>
+    </p:extLst>
+  </p:cSld>
+  <p:clrMapOvr>
+    <a:masterClrMapping/>
+  </p:clrMapOvr>
 </p:sld>
 </file>
 

</xml_diff>